<commit_message>
Update perf numbers after running Firefox.
</commit_message>
<xml_diff>
--- a/2024/RU.pptx
+++ b/2024/RU.pptx
@@ -245,7 +245,7 @@
           <a:p>
             <a:fld id="{A36A2EB4-42A0-4A9F-94AC-04D10C1F231A}" type="datetimeFigureOut">
               <a:rPr lang="en-US" smtClean="0"/>
-              <a:t>2/10/2024</a:t>
+              <a:t>2/11/2024</a:t>
             </a:fld>
             <a:endParaRPr lang="en-US"/>
           </a:p>
@@ -4774,7 +4774,7 @@
           <a:p>
             <a:fld id="{83D30A23-1FB6-43A1-891F-95145083C4E9}" type="datetime1">
               <a:rPr lang="en-US" smtClean="0"/>
-              <a:t>2/10/2024</a:t>
+              <a:t>2/11/2024</a:t>
             </a:fld>
             <a:endParaRPr lang="en-US"/>
           </a:p>
@@ -4972,7 +4972,7 @@
           <a:p>
             <a:fld id="{A4B03399-60D8-4226-8AC7-3F159D57E860}" type="datetime1">
               <a:rPr lang="en-US" smtClean="0"/>
-              <a:t>2/10/2024</a:t>
+              <a:t>2/11/2024</a:t>
             </a:fld>
             <a:endParaRPr lang="en-US"/>
           </a:p>
@@ -5180,7 +5180,7 @@
           <a:p>
             <a:fld id="{1A646459-A066-416D-8E21-9D451FB1CBED}" type="datetime1">
               <a:rPr lang="en-US" smtClean="0"/>
-              <a:t>2/10/2024</a:t>
+              <a:t>2/11/2024</a:t>
             </a:fld>
             <a:endParaRPr lang="en-US"/>
           </a:p>
@@ -5378,7 +5378,7 @@
           <a:p>
             <a:fld id="{0636B939-1A2A-498F-9013-EEF28820D750}" type="datetime1">
               <a:rPr lang="en-US" smtClean="0"/>
-              <a:t>2/10/2024</a:t>
+              <a:t>2/11/2024</a:t>
             </a:fld>
             <a:endParaRPr lang="en-US"/>
           </a:p>
@@ -5692,7 +5692,7 @@
           <a:p>
             <a:fld id="{97D3760A-E884-42F2-A44C-F32FAA030BF6}" type="datetime1">
               <a:rPr lang="en-US" smtClean="0"/>
-              <a:t>2/10/2024</a:t>
+              <a:t>2/11/2024</a:t>
             </a:fld>
             <a:endParaRPr lang="en-US"/>
           </a:p>
@@ -5957,7 +5957,7 @@
           <a:p>
             <a:fld id="{4FC7535E-ABF1-4A69-B09E-251EF8B13143}" type="datetime1">
               <a:rPr lang="en-US" smtClean="0"/>
-              <a:t>2/10/2024</a:t>
+              <a:t>2/11/2024</a:t>
             </a:fld>
             <a:endParaRPr lang="en-US"/>
           </a:p>
@@ -6369,7 +6369,7 @@
           <a:p>
             <a:fld id="{CE54BCFC-68A7-4C68-9600-D4AAA16CF9A6}" type="datetime1">
               <a:rPr lang="en-US" smtClean="0"/>
-              <a:t>2/10/2024</a:t>
+              <a:t>2/11/2024</a:t>
             </a:fld>
             <a:endParaRPr lang="en-US"/>
           </a:p>
@@ -6510,7 +6510,7 @@
           <a:p>
             <a:fld id="{0F981744-C4F3-4F58-9E0E-AF6C4E78D03B}" type="datetime1">
               <a:rPr lang="en-US" smtClean="0"/>
-              <a:t>2/10/2024</a:t>
+              <a:t>2/11/2024</a:t>
             </a:fld>
             <a:endParaRPr lang="en-US"/>
           </a:p>
@@ -6623,7 +6623,7 @@
           <a:p>
             <a:fld id="{98ED47E1-EA96-4683-9629-E838295B20BC}" type="datetime1">
               <a:rPr lang="en-US" smtClean="0"/>
-              <a:t>2/10/2024</a:t>
+              <a:t>2/11/2024</a:t>
             </a:fld>
             <a:endParaRPr lang="en-US"/>
           </a:p>
@@ -6934,7 +6934,7 @@
           <a:p>
             <a:fld id="{2F2A1627-B435-455B-A0CA-0808E5748D61}" type="datetime1">
               <a:rPr lang="en-US" smtClean="0"/>
-              <a:t>2/10/2024</a:t>
+              <a:t>2/11/2024</a:t>
             </a:fld>
             <a:endParaRPr lang="en-US"/>
           </a:p>
@@ -7222,7 +7222,7 @@
           <a:p>
             <a:fld id="{FE11CB43-EB9E-4C41-ACD2-0EC61FB429F2}" type="datetime1">
               <a:rPr lang="en-US" smtClean="0"/>
-              <a:t>2/10/2024</a:t>
+              <a:t>2/11/2024</a:t>
             </a:fld>
             <a:endParaRPr lang="en-US"/>
           </a:p>
@@ -7463,7 +7463,7 @@
           <a:p>
             <a:fld id="{CC0B8F92-0932-40E4-878B-3E2E4AAA6810}" type="datetime1">
               <a:rPr lang="en-US" smtClean="0"/>
-              <a:t>2/10/2024</a:t>
+              <a:t>2/11/2024</a:t>
             </a:fld>
             <a:endParaRPr lang="en-US"/>
           </a:p>
@@ -17201,15 +17201,7 @@
             <a:pPr lvl="1"/>
             <a:r>
               <a:rPr lang="en-US" dirty="0"/>
-              <a:t>~</a:t>
-            </a:r>
-            <a:r>
-              <a:rPr lang="ru-RU" dirty="0"/>
-              <a:t>8</a:t>
-            </a:r>
-            <a:r>
-              <a:rPr lang="en-US" dirty="0"/>
-              <a:t>00M RAM </a:t>
+              <a:t>~1.2G RAM </a:t>
             </a:r>
             <a:r>
               <a:rPr lang="ru-RU" dirty="0"/>
@@ -17222,6 +17214,10 @@
             <a:r>
               <a:rPr lang="ru-RU" dirty="0"/>
               <a:t>с запущенным </a:t>
+            </a:r>
+            <a:r>
+              <a:rPr lang="en-US" dirty="0"/>
+              <a:t>Firefox/</a:t>
             </a:r>
             <a:r>
               <a:rPr lang="en-US" dirty="0" err="1"/>

</xml_diff>

<commit_message>
Added todos and mention that lazy linking is useless in modern distros.
</commit_message>
<xml_diff>
--- a/2024/RU.pptx
+++ b/2024/RU.pptx
@@ -245,7 +245,7 @@
           <a:p>
             <a:fld id="{A36A2EB4-42A0-4A9F-94AC-04D10C1F231A}" type="datetimeFigureOut">
               <a:rPr lang="en-US" smtClean="0"/>
-              <a:t>2/11/2024</a:t>
+              <a:t>2/12/2024</a:t>
             </a:fld>
             <a:endParaRPr lang="en-US"/>
           </a:p>
@@ -4774,7 +4774,7 @@
           <a:p>
             <a:fld id="{83D30A23-1FB6-43A1-891F-95145083C4E9}" type="datetime1">
               <a:rPr lang="en-US" smtClean="0"/>
-              <a:t>2/11/2024</a:t>
+              <a:t>2/12/2024</a:t>
             </a:fld>
             <a:endParaRPr lang="en-US"/>
           </a:p>
@@ -4972,7 +4972,7 @@
           <a:p>
             <a:fld id="{A4B03399-60D8-4226-8AC7-3F159D57E860}" type="datetime1">
               <a:rPr lang="en-US" smtClean="0"/>
-              <a:t>2/11/2024</a:t>
+              <a:t>2/12/2024</a:t>
             </a:fld>
             <a:endParaRPr lang="en-US"/>
           </a:p>
@@ -5180,7 +5180,7 @@
           <a:p>
             <a:fld id="{1A646459-A066-416D-8E21-9D451FB1CBED}" type="datetime1">
               <a:rPr lang="en-US" smtClean="0"/>
-              <a:t>2/11/2024</a:t>
+              <a:t>2/12/2024</a:t>
             </a:fld>
             <a:endParaRPr lang="en-US"/>
           </a:p>
@@ -5378,7 +5378,7 @@
           <a:p>
             <a:fld id="{0636B939-1A2A-498F-9013-EEF28820D750}" type="datetime1">
               <a:rPr lang="en-US" smtClean="0"/>
-              <a:t>2/11/2024</a:t>
+              <a:t>2/12/2024</a:t>
             </a:fld>
             <a:endParaRPr lang="en-US"/>
           </a:p>
@@ -5692,7 +5692,7 @@
           <a:p>
             <a:fld id="{97D3760A-E884-42F2-A44C-F32FAA030BF6}" type="datetime1">
               <a:rPr lang="en-US" smtClean="0"/>
-              <a:t>2/11/2024</a:t>
+              <a:t>2/12/2024</a:t>
             </a:fld>
             <a:endParaRPr lang="en-US"/>
           </a:p>
@@ -5957,7 +5957,7 @@
           <a:p>
             <a:fld id="{4FC7535E-ABF1-4A69-B09E-251EF8B13143}" type="datetime1">
               <a:rPr lang="en-US" smtClean="0"/>
-              <a:t>2/11/2024</a:t>
+              <a:t>2/12/2024</a:t>
             </a:fld>
             <a:endParaRPr lang="en-US"/>
           </a:p>
@@ -6369,7 +6369,7 @@
           <a:p>
             <a:fld id="{CE54BCFC-68A7-4C68-9600-D4AAA16CF9A6}" type="datetime1">
               <a:rPr lang="en-US" smtClean="0"/>
-              <a:t>2/11/2024</a:t>
+              <a:t>2/12/2024</a:t>
             </a:fld>
             <a:endParaRPr lang="en-US"/>
           </a:p>
@@ -6510,7 +6510,7 @@
           <a:p>
             <a:fld id="{0F981744-C4F3-4F58-9E0E-AF6C4E78D03B}" type="datetime1">
               <a:rPr lang="en-US" smtClean="0"/>
-              <a:t>2/11/2024</a:t>
+              <a:t>2/12/2024</a:t>
             </a:fld>
             <a:endParaRPr lang="en-US"/>
           </a:p>
@@ -6623,7 +6623,7 @@
           <a:p>
             <a:fld id="{98ED47E1-EA96-4683-9629-E838295B20BC}" type="datetime1">
               <a:rPr lang="en-US" smtClean="0"/>
-              <a:t>2/11/2024</a:t>
+              <a:t>2/12/2024</a:t>
             </a:fld>
             <a:endParaRPr lang="en-US"/>
           </a:p>
@@ -6934,7 +6934,7 @@
           <a:p>
             <a:fld id="{2F2A1627-B435-455B-A0CA-0808E5748D61}" type="datetime1">
               <a:rPr lang="en-US" smtClean="0"/>
-              <a:t>2/11/2024</a:t>
+              <a:t>2/12/2024</a:t>
             </a:fld>
             <a:endParaRPr lang="en-US"/>
           </a:p>
@@ -7222,7 +7222,7 @@
           <a:p>
             <a:fld id="{FE11CB43-EB9E-4C41-ACD2-0EC61FB429F2}" type="datetime1">
               <a:rPr lang="en-US" smtClean="0"/>
-              <a:t>2/11/2024</a:t>
+              <a:t>2/12/2024</a:t>
             </a:fld>
             <a:endParaRPr lang="en-US"/>
           </a:p>
@@ -7463,7 +7463,7 @@
           <a:p>
             <a:fld id="{CC0B8F92-0932-40E4-878B-3E2E4AAA6810}" type="datetime1">
               <a:rPr lang="en-US" smtClean="0"/>
-              <a:t>2/11/2024</a:t>
+              <a:t>2/12/2024</a:t>
             </a:fld>
             <a:endParaRPr lang="en-US"/>
           </a:p>
@@ -12459,7 +12459,7 @@
         <p:spPr/>
         <p:txBody>
           <a:bodyPr>
-            <a:normAutofit fontScale="92500" lnSpcReduction="10000"/>
+            <a:normAutofit fontScale="92500" lnSpcReduction="20000"/>
           </a:bodyPr>
           <a:lstStyle/>
           <a:p>
@@ -12614,6 +12614,20 @@
               </a:rPr>
               <a:t>  call GOT[foo]</a:t>
             </a:r>
+          </a:p>
+          <a:p>
+            <a:r>
+              <a:rPr lang="ru-RU" dirty="0"/>
+              <a:t>Бесполезно в современных дистрибутивах </a:t>
+            </a:r>
+            <a:r>
+              <a:rPr lang="en-US" dirty="0"/>
+              <a:t>(RHEL, Ubuntu)</a:t>
+            </a:r>
+            <a:endParaRPr lang="en-US" dirty="0">
+              <a:latin typeface="Courier New" panose="02070309020205020404" pitchFamily="49" charset="0"/>
+              <a:cs typeface="Courier New" panose="02070309020205020404" pitchFamily="49" charset="0"/>
+            </a:endParaRPr>
           </a:p>
         </p:txBody>
       </p:sp>
@@ -13933,6 +13947,57 @@
             </a:r>
             <a:endParaRPr lang="en-US" dirty="0"/>
           </a:p>
+          <a:p>
+            <a:pPr lvl="1"/>
+            <a:r>
+              <a:rPr lang="ru-RU" dirty="0"/>
+              <a:t>В </a:t>
+            </a:r>
+            <a:r>
+              <a:rPr lang="en-US" dirty="0"/>
+              <a:t>RHEL </a:t>
+            </a:r>
+            <a:r>
+              <a:rPr lang="ru-RU" dirty="0"/>
+              <a:t>и </a:t>
+            </a:r>
+            <a:r>
+              <a:rPr lang="en-US" dirty="0"/>
+              <a:t>Ubuntu </a:t>
+            </a:r>
+            <a:r>
+              <a:rPr lang="ru-RU" dirty="0"/>
+              <a:t>функции уже разрешаются на старте </a:t>
+            </a:r>
+            <a:r>
+              <a:rPr lang="en-US" dirty="0"/>
+              <a:t>(-</a:t>
+            </a:r>
+            <a:r>
+              <a:rPr lang="en-US" dirty="0" err="1"/>
+              <a:t>Wl</a:t>
+            </a:r>
+            <a:r>
+              <a:rPr lang="en-US" dirty="0"/>
+              <a:t>,-</a:t>
+            </a:r>
+            <a:r>
+              <a:rPr lang="en-US" dirty="0" err="1"/>
+              <a:t>z,relro</a:t>
+            </a:r>
+            <a:r>
+              <a:rPr lang="en-US" dirty="0"/>
+              <a:t>,-</a:t>
+            </a:r>
+            <a:r>
+              <a:rPr lang="en-US" dirty="0" err="1"/>
+              <a:t>z,now</a:t>
+            </a:r>
+            <a:r>
+              <a:rPr lang="en-US" dirty="0"/>
+              <a:t>)</a:t>
+            </a:r>
+          </a:p>
         </p:txBody>
       </p:sp>
     </p:spTree>
@@ -15978,6 +16043,16 @@
             <a:r>
               <a:rPr lang="ru-RU" dirty="0"/>
               <a:t>Подкрепить цифрами перфоманс</a:t>
+            </a:r>
+          </a:p>
+          <a:p>
+            <a:r>
+              <a:rPr lang="ru-RU" dirty="0"/>
+              <a:t>Другие опции линкера для ускорения работы</a:t>
+            </a:r>
+            <a:r>
+              <a:rPr lang="en-US" dirty="0"/>
+              <a:t>: -hash-style=gnu, -O1, --as-needed</a:t>
             </a:r>
           </a:p>
           <a:p>

</xml_diff>

<commit_message>
Minor updates after review.
</commit_message>
<xml_diff>
--- a/2024/RU.pptx
+++ b/2024/RU.pptx
@@ -13,15 +13,15 @@
     <p:sldId id="301" r:id="rId4"/>
     <p:sldId id="302" r:id="rId5"/>
     <p:sldId id="339" r:id="rId6"/>
-    <p:sldId id="303" r:id="rId7"/>
-    <p:sldId id="304" r:id="rId8"/>
-    <p:sldId id="314" r:id="rId9"/>
+    <p:sldId id="314" r:id="rId7"/>
+    <p:sldId id="303" r:id="rId8"/>
+    <p:sldId id="304" r:id="rId9"/>
     <p:sldId id="305" r:id="rId10"/>
     <p:sldId id="354" r:id="rId11"/>
     <p:sldId id="358" r:id="rId12"/>
     <p:sldId id="359" r:id="rId13"/>
     <p:sldId id="361" r:id="rId14"/>
-    <p:sldId id="360" r:id="rId15"/>
+    <p:sldId id="367" r:id="rId15"/>
     <p:sldId id="340" r:id="rId16"/>
     <p:sldId id="309" r:id="rId17"/>
     <p:sldId id="341" r:id="rId18"/>
@@ -266,7 +266,7 @@
           <a:p>
             <a:fld id="{A36A2EB4-42A0-4A9F-94AC-04D10C1F231A}" type="datetimeFigureOut">
               <a:rPr lang="en-US" smtClean="0"/>
-              <a:t>4/7/2024</a:t>
+              <a:t>4/14/2024</a:t>
             </a:fld>
             <a:endParaRPr lang="en-US"/>
           </a:p>
@@ -1044,7 +1044,7 @@
           <a:p>
             <a:r>
               <a:rPr lang="ru-RU" dirty="0"/>
-              <a:t>Мы создаём специальную таблицу</a:t>
+              <a:t>Мы добавляем специальную таблицу</a:t>
             </a:r>
             <a:r>
               <a:rPr lang="en-US" dirty="0"/>
@@ -1060,7 +1060,7 @@
             </a:r>
             <a:r>
               <a:rPr lang="ru-RU" dirty="0"/>
-              <a:t>, которая заполняется адресами импортированных функций. Вызовы импортируемых функций осуществляются косвенно – по адресу, загруженному из таблицы.</a:t>
+              <a:t>, в которую заносим адреса функций, импортированных из библиотеки. Вызовы импортируемых функций осуществляются косвенно – по адресу, загруженному из таблицы.</a:t>
             </a:r>
             <a:endParaRPr lang="en-US" dirty="0"/>
           </a:p>
@@ -1092,7 +1092,7 @@
     </p:spTree>
     <p:extLst>
       <p:ext uri="{BB962C8B-B14F-4D97-AF65-F5344CB8AC3E}">
-        <p14:creationId xmlns:p14="http://schemas.microsoft.com/office/powerpoint/2010/main" val="2374747975"/>
+        <p14:creationId xmlns:p14="http://schemas.microsoft.com/office/powerpoint/2010/main" val="254919395"/>
       </p:ext>
     </p:extLst>
   </p:cSld>
@@ -1257,6 +1257,16 @@
           <a:p>
             <a:r>
               <a:rPr lang="ru-RU" dirty="0"/>
+              <a:t>Рассмотрим этапы работы загручика. Эта информация потребуется в дальнейшем при анализе накладных расходов.</a:t>
+            </a:r>
+            <a:endParaRPr lang="en-US" dirty="0"/>
+          </a:p>
+          <a:p>
+            <a:endParaRPr lang="en-US" dirty="0"/>
+          </a:p>
+          <a:p>
+            <a:r>
+              <a:rPr lang="ru-RU" dirty="0"/>
               <a:t>Процесс загрузки </a:t>
             </a:r>
             <a:r>
@@ -2063,7 +2073,7 @@
             </a:r>
             <a:r>
               <a:rPr lang="ru-RU" dirty="0"/>
-              <a:t>такой привязки не делается и загрузчик ищет каждый импортируемый во всех загруженных библиотеках. Это делает возможной специальную технику перехвата символов, о которой мы сейчас поговорим.</a:t>
+              <a:t>такой привязки не делается и загрузчик ищет каждый импортируемый во всех загруженных библиотеках. Это делает возможной специальную технику перехвата символов, о которой нужно сказать несколько слов, поскольку она будет в дальнейшем важна при обсуждении перфоманса.</a:t>
             </a:r>
             <a:endParaRPr lang="en-US" dirty="0"/>
           </a:p>
@@ -2205,6 +2215,14 @@
               <a:rPr lang="ru-RU" dirty="0"/>
               <a:t>и других отладчиках памяти.</a:t>
             </a:r>
+            <a:r>
+              <a:rPr lang="en-US" dirty="0"/>
+              <a:t> </a:t>
+            </a:r>
+            <a:r>
+              <a:rPr lang="ru-RU" dirty="0"/>
+              <a:t>В нормальном режиме работы программы перехват символов не используется.</a:t>
+            </a:r>
             <a:endParaRPr lang="en-US" dirty="0"/>
           </a:p>
           <a:p>
@@ -2848,99 +2866,19 @@
           <a:p>
             <a:r>
               <a:rPr lang="ru-RU" dirty="0"/>
-              <a:t>Рассмотрим первый способ ускорения </a:t>
-            </a:r>
-            <a:r>
-              <a:rPr lang="en-US" dirty="0"/>
-              <a:t>DLL, </a:t>
-            </a:r>
-            <a:r>
-              <a:rPr lang="ru-RU" dirty="0"/>
-              <a:t>который</a:t>
-            </a:r>
-            <a:r>
-              <a:rPr lang="en-US" dirty="0"/>
-              <a:t> </a:t>
-            </a:r>
-            <a:r>
-              <a:rPr lang="ru-RU" dirty="0"/>
-              <a:t>заключается в том чтобы просто не загружать их без явной необходимости.</a:t>
-            </a:r>
-          </a:p>
-          <a:p>
-            <a:endParaRPr lang="ru-RU" dirty="0"/>
-          </a:p>
-          <a:p>
-            <a:r>
-              <a:rPr lang="ru-RU" dirty="0"/>
-              <a:t>В самом деле если библиотека используется редко или только в специфических сценариях, то нам нет особого смысла загружать её на старте программы и лучше отложить это до первого использования.</a:t>
-            </a:r>
-          </a:p>
-          <a:p>
-            <a:endParaRPr lang="ru-RU" dirty="0"/>
-          </a:p>
-          <a:p>
-            <a:r>
-              <a:rPr lang="en-US" dirty="0"/>
-              <a:t>Windows </a:t>
-            </a:r>
-            <a:r>
-              <a:rPr lang="ru-RU" dirty="0"/>
-              <a:t>и </a:t>
-            </a:r>
-            <a:r>
-              <a:rPr lang="en-US" dirty="0"/>
-              <a:t>macOS </a:t>
-            </a:r>
-            <a:r>
-              <a:rPr lang="ru-RU" dirty="0"/>
-              <a:t>предоставляют встроенные механизмы для этого. </a:t>
-            </a:r>
-            <a:r>
-              <a:rPr lang="en-US" dirty="0"/>
-              <a:t>Linux, </a:t>
-            </a:r>
-            <a:r>
-              <a:rPr lang="ru-RU" dirty="0"/>
-              <a:t>хотя и унаследовал свои </a:t>
-            </a:r>
-            <a:r>
-              <a:rPr lang="en-US" dirty="0"/>
-              <a:t>DLL</a:t>
-            </a:r>
-            <a:r>
-              <a:rPr lang="ru-RU" dirty="0"/>
-              <a:t> от </a:t>
-            </a:r>
-            <a:r>
-              <a:rPr lang="en-US" dirty="0"/>
-              <a:t>Solaris, </a:t>
-            </a:r>
-            <a:r>
-              <a:rPr lang="ru-RU" dirty="0"/>
-              <a:t>где была аналогичная возможность, не предоставляет встроенной поддежки для отложенной загрузки.</a:t>
-            </a:r>
-          </a:p>
-          <a:p>
-            <a:endParaRPr lang="ru-RU" dirty="0"/>
-          </a:p>
-          <a:p>
-            <a:r>
-              <a:rPr lang="ru-RU" dirty="0"/>
-              <a:t>Но можно воспользоваться </a:t>
-            </a:r>
-            <a:r>
-              <a:rPr lang="en-US" dirty="0"/>
-              <a:t>open-source </a:t>
-            </a:r>
-            <a:r>
-              <a:rPr lang="ru-RU" dirty="0"/>
-              <a:t>утилитой </a:t>
-            </a:r>
-            <a:r>
-              <a:rPr lang="en-US" dirty="0"/>
-              <a:t>Implib.so.</a:t>
-            </a:r>
+              <a:t>В больших программах, таких как дистрибутивы, часто можно указать избыточные наборы библиотек при линковке программы. Наличие таких лишних библиотек приведет к замедлению работы даже если библиотека не используется. Но есть специальный флаг линкера, которые такую ситуацию обнаруживает и игнорирует такие библиотеки.</a:t>
+            </a:r>
+            <a:endParaRPr lang="en-US" dirty="0"/>
+          </a:p>
+          <a:p>
+            <a:endParaRPr lang="en-US" dirty="0"/>
+          </a:p>
+          <a:p>
+            <a:r>
+              <a:rPr lang="ru-RU" dirty="0"/>
+              <a:t>Этот флаг не включён по умолчанию в некоторых дистрибутивах, поэтому может быть полезным указать его вручную.</a:t>
+            </a:r>
+            <a:endParaRPr lang="en-US" dirty="0"/>
           </a:p>
         </p:txBody>
       </p:sp>
@@ -2961,7 +2899,7 @@
           <a:p>
             <a:fld id="{3AC94D10-082F-46D7-A834-266F9222130F}" type="slidenum">
               <a:rPr lang="en-US" smtClean="0"/>
-              <a:t>30</a:t>
+              <a:t>29</a:t>
             </a:fld>
             <a:endParaRPr lang="en-US"/>
           </a:p>
@@ -2970,7 +2908,7 @@
     </p:spTree>
     <p:extLst>
       <p:ext uri="{BB962C8B-B14F-4D97-AF65-F5344CB8AC3E}">
-        <p14:creationId xmlns:p14="http://schemas.microsoft.com/office/powerpoint/2010/main" val="2313320207"/>
+        <p14:creationId xmlns:p14="http://schemas.microsoft.com/office/powerpoint/2010/main" val="1416292603"/>
       </p:ext>
     </p:extLst>
   </p:cSld>
@@ -3141,17 +3079,99 @@
           <a:p>
             <a:r>
               <a:rPr lang="ru-RU" dirty="0"/>
-              <a:t>Рассмотрим теперь поочерёдно перечисленные нами накладные расходы</a:t>
-            </a:r>
-            <a:r>
-              <a:rPr lang="en-US" dirty="0"/>
-              <a:t>. </a:t>
-            </a:r>
-            <a:r>
-              <a:rPr lang="ru-RU" dirty="0"/>
-              <a:t>Начнём с релокации.</a:t>
-            </a:r>
-            <a:endParaRPr lang="en-US" dirty="0"/>
+              <a:t>Рассмотрим первый способ ускорения </a:t>
+            </a:r>
+            <a:r>
+              <a:rPr lang="en-US" dirty="0"/>
+              <a:t>DLL, </a:t>
+            </a:r>
+            <a:r>
+              <a:rPr lang="ru-RU" dirty="0"/>
+              <a:t>который</a:t>
+            </a:r>
+            <a:r>
+              <a:rPr lang="en-US" dirty="0"/>
+              <a:t> </a:t>
+            </a:r>
+            <a:r>
+              <a:rPr lang="ru-RU" dirty="0"/>
+              <a:t>заключается в том чтобы просто не загружать их без явной необходимости.</a:t>
+            </a:r>
+          </a:p>
+          <a:p>
+            <a:endParaRPr lang="ru-RU" dirty="0"/>
+          </a:p>
+          <a:p>
+            <a:r>
+              <a:rPr lang="ru-RU" dirty="0"/>
+              <a:t>В самом деле если библиотека используется редко или только в специфических сценариях, то нам нет особого смысла загружать её на старте программы и лучше отложить это до первого использования.</a:t>
+            </a:r>
+          </a:p>
+          <a:p>
+            <a:endParaRPr lang="ru-RU" dirty="0"/>
+          </a:p>
+          <a:p>
+            <a:r>
+              <a:rPr lang="en-US" dirty="0"/>
+              <a:t>Windows </a:t>
+            </a:r>
+            <a:r>
+              <a:rPr lang="ru-RU" dirty="0"/>
+              <a:t>и </a:t>
+            </a:r>
+            <a:r>
+              <a:rPr lang="en-US" dirty="0"/>
+              <a:t>macOS </a:t>
+            </a:r>
+            <a:r>
+              <a:rPr lang="ru-RU" dirty="0"/>
+              <a:t>предоставляют встроенные механизмы для этого. </a:t>
+            </a:r>
+            <a:r>
+              <a:rPr lang="en-US" dirty="0"/>
+              <a:t>Linux, </a:t>
+            </a:r>
+            <a:r>
+              <a:rPr lang="ru-RU" dirty="0"/>
+              <a:t>хотя и унаследовал свои </a:t>
+            </a:r>
+            <a:r>
+              <a:rPr lang="en-US" dirty="0"/>
+              <a:t>DLL</a:t>
+            </a:r>
+            <a:r>
+              <a:rPr lang="ru-RU" dirty="0"/>
+              <a:t> от </a:t>
+            </a:r>
+            <a:r>
+              <a:rPr lang="en-US" dirty="0"/>
+              <a:t>Solaris, </a:t>
+            </a:r>
+            <a:r>
+              <a:rPr lang="ru-RU" dirty="0"/>
+              <a:t>где была аналогичная возможность, не предоставляет встроенной поддежки для отложенной загрузки.</a:t>
+            </a:r>
+          </a:p>
+          <a:p>
+            <a:endParaRPr lang="ru-RU" dirty="0"/>
+          </a:p>
+          <a:p>
+            <a:r>
+              <a:rPr lang="ru-RU" dirty="0"/>
+              <a:t>Но можно воспользоваться </a:t>
+            </a:r>
+            <a:r>
+              <a:rPr lang="en-US" dirty="0"/>
+              <a:t>open-source </a:t>
+            </a:r>
+            <a:r>
+              <a:rPr lang="ru-RU" dirty="0"/>
+              <a:t>утилитой </a:t>
+            </a:r>
+            <a:r>
+              <a:rPr lang="en-US" dirty="0"/>
+              <a:t>Implib.so.</a:t>
+            </a:r>
           </a:p>
         </p:txBody>
       </p:sp>
@@ -3172,7 +3192,7 @@
           <a:p>
             <a:fld id="{3AC94D10-082F-46D7-A834-266F9222130F}" type="slidenum">
               <a:rPr lang="en-US" smtClean="0"/>
-              <a:t>33</a:t>
+              <a:t>30</a:t>
             </a:fld>
             <a:endParaRPr lang="en-US"/>
           </a:p>
@@ -3181,7 +3201,7 @@
     </p:spTree>
     <p:extLst>
       <p:ext uri="{BB962C8B-B14F-4D97-AF65-F5344CB8AC3E}">
-        <p14:creationId xmlns:p14="http://schemas.microsoft.com/office/powerpoint/2010/main" val="940538028"/>
+        <p14:creationId xmlns:p14="http://schemas.microsoft.com/office/powerpoint/2010/main" val="2313320207"/>
       </p:ext>
     </p:extLst>
   </p:cSld>
@@ -3237,110 +3257,17 @@
           <a:p>
             <a:r>
               <a:rPr lang="ru-RU" dirty="0"/>
-              <a:t>Сразу скажу что решения для этой части в современных </a:t>
-            </a:r>
-            <a:r>
-              <a:rPr lang="en-US" dirty="0"/>
-              <a:t>Windows </a:t>
-            </a:r>
-            <a:r>
-              <a:rPr lang="ru-RU" dirty="0"/>
-              <a:t>и </a:t>
-            </a:r>
-            <a:r>
-              <a:rPr lang="en-US" dirty="0"/>
-              <a:t>Linux </a:t>
-            </a:r>
-            <a:r>
-              <a:rPr lang="ru-RU" dirty="0"/>
-              <a:t>нет. Но они существовали и использовались долгое время и вы до сих пор можете с ними столкнуться в статьях, поэтому посвятим им несколько слов.</a:t>
+              <a:t>Рассмотрим теперь поочерёдно перечисленные нами накладные расходы</a:t>
+            </a:r>
+            <a:r>
+              <a:rPr lang="en-US" dirty="0"/>
+              <a:t>. </a:t>
+            </a:r>
+            <a:r>
+              <a:rPr lang="ru-RU" dirty="0"/>
+              <a:t>Начнём с релокации.</a:t>
             </a:r>
             <a:endParaRPr lang="en-US" dirty="0"/>
-          </a:p>
-          <a:p>
-            <a:endParaRPr lang="en-US" dirty="0"/>
-          </a:p>
-          <a:p>
-            <a:r>
-              <a:rPr lang="ru-RU" dirty="0"/>
-              <a:t>Основная идея заключается в том, что мы можем заранее для всех используемых </a:t>
-            </a:r>
-            <a:r>
-              <a:rPr lang="en-US" dirty="0"/>
-              <a:t>DLL </a:t>
-            </a:r>
-            <a:r>
-              <a:rPr lang="ru-RU" dirty="0"/>
-              <a:t>выбрать непересекающиеся адреса в адресном простанстве процесса и слинковать их, исходя из того что они будут загружены по этим адресам. Загрузчик при загрузке увидит что адреса свободны и не будет проводить релокацию.</a:t>
-            </a:r>
-            <a:endParaRPr lang="en-US" dirty="0"/>
-          </a:p>
-          <a:p>
-            <a:endParaRPr lang="en-US" dirty="0"/>
-          </a:p>
-          <a:p>
-            <a:r>
-              <a:rPr lang="ru-RU" dirty="0"/>
-              <a:t>Решение это было реализовано и для </a:t>
-            </a:r>
-            <a:r>
-              <a:rPr lang="en-US" dirty="0"/>
-              <a:t>Windows, </a:t>
-            </a:r>
-            <a:r>
-              <a:rPr lang="ru-RU" dirty="0"/>
-              <a:t>и для </a:t>
-            </a:r>
-            <a:r>
-              <a:rPr lang="en-US" dirty="0"/>
-              <a:t>Linux, </a:t>
-            </a:r>
-            <a:r>
-              <a:rPr lang="ru-RU" dirty="0"/>
-              <a:t>но к сожалению вошло в противоречие с современными требованиями к безопасности, которые заключаются в том, что адрес загрузки </a:t>
-            </a:r>
-            <a:r>
-              <a:rPr lang="en-US" dirty="0"/>
-              <a:t>DLL </a:t>
-            </a:r>
-            <a:r>
-              <a:rPr lang="ru-RU" dirty="0"/>
-              <a:t>должен быть случайным (чтобы не упрощать подбор адресов хакерам).</a:t>
-            </a:r>
-            <a:endParaRPr lang="en-US" dirty="0"/>
-          </a:p>
-          <a:p>
-            <a:endParaRPr lang="en-US" dirty="0"/>
-          </a:p>
-          <a:p>
-            <a:r>
-              <a:rPr lang="ru-RU" dirty="0"/>
-              <a:t>Поэтому сейчас этот метод не применяется</a:t>
-            </a:r>
-            <a:r>
-              <a:rPr lang="en-US" dirty="0"/>
-              <a:t>, </a:t>
-            </a:r>
-            <a:r>
-              <a:rPr lang="ru-RU" dirty="0"/>
-              <a:t>а поддержка </a:t>
-            </a:r>
-            <a:r>
-              <a:rPr lang="en-US" dirty="0" err="1"/>
-              <a:t>Prelink</a:t>
-            </a:r>
-            <a:r>
-              <a:rPr lang="en-US" dirty="0"/>
-              <a:t> </a:t>
-            </a:r>
-            <a:r>
-              <a:rPr lang="ru-RU" dirty="0"/>
-              <a:t>даже была удалена в последних версиях </a:t>
-            </a:r>
-            <a:r>
-              <a:rPr lang="en-US" dirty="0"/>
-              <a:t>Glibc.</a:t>
-            </a:r>
           </a:p>
         </p:txBody>
       </p:sp>
@@ -3361,7 +3288,7 @@
           <a:p>
             <a:fld id="{3AC94D10-082F-46D7-A834-266F9222130F}" type="slidenum">
               <a:rPr lang="en-US" smtClean="0"/>
-              <a:t>34</a:t>
+              <a:t>33</a:t>
             </a:fld>
             <a:endParaRPr lang="en-US"/>
           </a:p>
@@ -3370,7 +3297,7 @@
     </p:spTree>
     <p:extLst>
       <p:ext uri="{BB962C8B-B14F-4D97-AF65-F5344CB8AC3E}">
-        <p14:creationId xmlns:p14="http://schemas.microsoft.com/office/powerpoint/2010/main" val="3043525197"/>
+        <p14:creationId xmlns:p14="http://schemas.microsoft.com/office/powerpoint/2010/main" val="940538028"/>
       </p:ext>
     </p:extLst>
   </p:cSld>
@@ -3464,73 +3391,6 @@
             </a:r>
             <a:endParaRPr lang="en-US" dirty="0"/>
           </a:p>
-          <a:p>
-            <a:endParaRPr lang="en-US" dirty="0"/>
-          </a:p>
-          <a:p>
-            <a:r>
-              <a:rPr lang="ru-RU" dirty="0"/>
-              <a:t>Решение это было реализовано и для </a:t>
-            </a:r>
-            <a:r>
-              <a:rPr lang="en-US" dirty="0"/>
-              <a:t>Windows, </a:t>
-            </a:r>
-            <a:r>
-              <a:rPr lang="ru-RU" dirty="0"/>
-              <a:t>и для </a:t>
-            </a:r>
-            <a:r>
-              <a:rPr lang="en-US" dirty="0"/>
-              <a:t>Linux, </a:t>
-            </a:r>
-            <a:r>
-              <a:rPr lang="ru-RU" dirty="0"/>
-              <a:t>но к сожалению вошло в противоречие с современными требованиями к безопасности, которые заключаются в том, что адрес загрузки </a:t>
-            </a:r>
-            <a:r>
-              <a:rPr lang="en-US" dirty="0"/>
-              <a:t>DLL </a:t>
-            </a:r>
-            <a:r>
-              <a:rPr lang="ru-RU" dirty="0"/>
-              <a:t>должен быть случайным (чтобы не упрощать подбор адресов хакерам).</a:t>
-            </a:r>
-            <a:endParaRPr lang="en-US" dirty="0"/>
-          </a:p>
-          <a:p>
-            <a:endParaRPr lang="en-US" dirty="0"/>
-          </a:p>
-          <a:p>
-            <a:r>
-              <a:rPr lang="ru-RU" dirty="0"/>
-              <a:t>Поэтому сейчас этот метод не применяется</a:t>
-            </a:r>
-            <a:r>
-              <a:rPr lang="en-US" dirty="0"/>
-              <a:t>, </a:t>
-            </a:r>
-            <a:r>
-              <a:rPr lang="ru-RU" dirty="0"/>
-              <a:t>а поддержка </a:t>
-            </a:r>
-            <a:r>
-              <a:rPr lang="en-US" dirty="0" err="1"/>
-              <a:t>Prelink</a:t>
-            </a:r>
-            <a:r>
-              <a:rPr lang="en-US" dirty="0"/>
-              <a:t> </a:t>
-            </a:r>
-            <a:r>
-              <a:rPr lang="ru-RU" dirty="0"/>
-              <a:t>даже была удалена в последних версиях </a:t>
-            </a:r>
-            <a:r>
-              <a:rPr lang="en-US" dirty="0"/>
-              <a:t>Glibc.</a:t>
-            </a:r>
-          </a:p>
         </p:txBody>
       </p:sp>
       <p:sp>
@@ -3550,7 +3410,7 @@
           <a:p>
             <a:fld id="{3AC94D10-082F-46D7-A834-266F9222130F}" type="slidenum">
               <a:rPr lang="en-US" smtClean="0"/>
-              <a:t>35</a:t>
+              <a:t>34</a:t>
             </a:fld>
             <a:endParaRPr lang="en-US"/>
           </a:p>
@@ -3559,7 +3419,7 @@
     </p:spTree>
     <p:extLst>
       <p:ext uri="{BB962C8B-B14F-4D97-AF65-F5344CB8AC3E}">
-        <p14:creationId xmlns:p14="http://schemas.microsoft.com/office/powerpoint/2010/main" val="1998125518"/>
+        <p14:creationId xmlns:p14="http://schemas.microsoft.com/office/powerpoint/2010/main" val="3043525197"/>
       </p:ext>
     </p:extLst>
   </p:cSld>
@@ -3615,9 +3475,66 @@
           <a:p>
             <a:r>
               <a:rPr lang="ru-RU" dirty="0"/>
-              <a:t>Обратимся теперь к накладным расходам на связывание символов.</a:t>
+              <a:t>Решение это было реализовано и для </a:t>
+            </a:r>
+            <a:r>
+              <a:rPr lang="en-US" dirty="0"/>
+              <a:t>Windows, </a:t>
+            </a:r>
+            <a:r>
+              <a:rPr lang="ru-RU" dirty="0"/>
+              <a:t>и для </a:t>
+            </a:r>
+            <a:r>
+              <a:rPr lang="en-US" dirty="0"/>
+              <a:t>Linux, </a:t>
+            </a:r>
+            <a:r>
+              <a:rPr lang="ru-RU" dirty="0"/>
+              <a:t>но к сожалению вошло в противоречие с современными требованиями к безопасности, которые заключаются в том, что адрес загрузки </a:t>
+            </a:r>
+            <a:r>
+              <a:rPr lang="en-US" dirty="0"/>
+              <a:t>DLL </a:t>
+            </a:r>
+            <a:r>
+              <a:rPr lang="ru-RU" dirty="0"/>
+              <a:t>должен быть случайным (чтобы не упрощать подбор адресов хакерам).</a:t>
             </a:r>
             <a:endParaRPr lang="en-US" dirty="0"/>
+          </a:p>
+          <a:p>
+            <a:endParaRPr lang="en-US" dirty="0"/>
+          </a:p>
+          <a:p>
+            <a:r>
+              <a:rPr lang="ru-RU" dirty="0"/>
+              <a:t>Поэтому сейчас этот метод не применяется</a:t>
+            </a:r>
+            <a:r>
+              <a:rPr lang="en-US" dirty="0"/>
+              <a:t>, </a:t>
+            </a:r>
+            <a:r>
+              <a:rPr lang="ru-RU" dirty="0"/>
+              <a:t>а поддержка </a:t>
+            </a:r>
+            <a:r>
+              <a:rPr lang="en-US" dirty="0" err="1"/>
+              <a:t>Prelink</a:t>
+            </a:r>
+            <a:r>
+              <a:rPr lang="en-US" dirty="0"/>
+              <a:t> </a:t>
+            </a:r>
+            <a:r>
+              <a:rPr lang="ru-RU" dirty="0"/>
+              <a:t>даже была удалена в последних версиях </a:t>
+            </a:r>
+            <a:r>
+              <a:rPr lang="en-US" dirty="0"/>
+              <a:t>Glibc.</a:t>
+            </a:r>
           </a:p>
         </p:txBody>
       </p:sp>
@@ -3638,7 +3555,7 @@
           <a:p>
             <a:fld id="{3AC94D10-082F-46D7-A834-266F9222130F}" type="slidenum">
               <a:rPr lang="en-US" smtClean="0"/>
-              <a:t>36</a:t>
+              <a:t>35</a:t>
             </a:fld>
             <a:endParaRPr lang="en-US"/>
           </a:p>
@@ -3647,7 +3564,7 @@
     </p:spTree>
     <p:extLst>
       <p:ext uri="{BB962C8B-B14F-4D97-AF65-F5344CB8AC3E}">
-        <p14:creationId xmlns:p14="http://schemas.microsoft.com/office/powerpoint/2010/main" val="3397731765"/>
+        <p14:creationId xmlns:p14="http://schemas.microsoft.com/office/powerpoint/2010/main" val="1998125518"/>
       </p:ext>
     </p:extLst>
   </p:cSld>
@@ -3703,47 +3620,7 @@
           <a:p>
             <a:r>
               <a:rPr lang="ru-RU" dirty="0"/>
-              <a:t>Самый простой подход к связыванию символов</a:t>
-            </a:r>
-            <a:r>
-              <a:rPr lang="en-US" dirty="0"/>
-              <a:t>: </a:t>
-            </a:r>
-            <a:r>
-              <a:rPr lang="ru-RU" dirty="0"/>
-              <a:t>оптимизация размера соответсвующих таблиц поиска. Обычно рекомендуется использовать две опции</a:t>
-            </a:r>
-            <a:r>
-              <a:rPr lang="en-US" dirty="0"/>
-              <a:t>: hash-style </a:t>
-            </a:r>
-            <a:r>
-              <a:rPr lang="ru-RU" dirty="0"/>
-              <a:t>и </a:t>
-            </a:r>
-            <a:r>
-              <a:rPr lang="en-US" dirty="0"/>
-              <a:t>O1. </a:t>
-            </a:r>
-            <a:r>
-              <a:rPr lang="ru-RU" dirty="0"/>
-              <a:t>Первая из них уже по умолчанию включена в современных дистрибутивах (</a:t>
-            </a:r>
-            <a:r>
-              <a:rPr lang="en-US" dirty="0"/>
-              <a:t>RHEL </a:t>
-            </a:r>
-            <a:r>
-              <a:rPr lang="ru-RU" dirty="0"/>
-              <a:t>и </a:t>
-            </a:r>
-            <a:r>
-              <a:rPr lang="en-US" dirty="0"/>
-              <a:t>Ubuntu)</a:t>
-            </a:r>
-            <a:r>
-              <a:rPr lang="ru-RU" dirty="0"/>
-              <a:t>, а вторая по моим замерам не оказывает существенного влияния на производительность.</a:t>
+              <a:t>Обратимся теперь к накладным расходам на связывание символов.</a:t>
             </a:r>
             <a:endParaRPr lang="en-US" dirty="0"/>
           </a:p>
@@ -3766,7 +3643,7 @@
           <a:p>
             <a:fld id="{3AC94D10-082F-46D7-A834-266F9222130F}" type="slidenum">
               <a:rPr lang="en-US" smtClean="0"/>
-              <a:t>37</a:t>
+              <a:t>36</a:t>
             </a:fld>
             <a:endParaRPr lang="en-US"/>
           </a:p>
@@ -3775,7 +3652,7 @@
     </p:spTree>
     <p:extLst>
       <p:ext uri="{BB962C8B-B14F-4D97-AF65-F5344CB8AC3E}">
-        <p14:creationId xmlns:p14="http://schemas.microsoft.com/office/powerpoint/2010/main" val="1118954411"/>
+        <p14:creationId xmlns:p14="http://schemas.microsoft.com/office/powerpoint/2010/main" val="3397731765"/>
       </p:ext>
     </p:extLst>
   </p:cSld>
@@ -3831,32 +3708,19 @@
           <a:p>
             <a:r>
               <a:rPr lang="ru-RU" dirty="0"/>
-              <a:t>Мы уже упоминали что ленивое связывание на </a:t>
-            </a:r>
-            <a:r>
-              <a:rPr lang="en-US" dirty="0"/>
-              <a:t>Linux </a:t>
-            </a:r>
-            <a:r>
-              <a:rPr lang="ru-RU" dirty="0"/>
-              <a:t>добавляет лишний вызов заглушки при вызове библиотечной функции.</a:t>
-            </a:r>
-          </a:p>
-          <a:p>
-            <a:endParaRPr lang="ru-RU" dirty="0"/>
-          </a:p>
-          <a:p>
-            <a:r>
-              <a:rPr lang="ru-RU" dirty="0"/>
-              <a:t>Современные </a:t>
-            </a:r>
-            <a:r>
-              <a:rPr lang="en-US" dirty="0" err="1"/>
-              <a:t>gcc</a:t>
-            </a:r>
-            <a:r>
-              <a:rPr lang="en-US" dirty="0"/>
-              <a:t> </a:t>
+              <a:t>Самый простой подход к связыванию символов</a:t>
+            </a:r>
+            <a:r>
+              <a:rPr lang="en-US" dirty="0"/>
+              <a:t>: </a:t>
+            </a:r>
+            <a:r>
+              <a:rPr lang="ru-RU" dirty="0"/>
+              <a:t>оптимизация размера соответсвующих таблиц поиска. Обычно рекомендуется использовать две опции</a:t>
+            </a:r>
+            <a:r>
+              <a:rPr lang="en-US" dirty="0"/>
+              <a:t>: hash-style </a:t>
             </a:r>
             <a:r>
               <a:rPr lang="ru-RU" dirty="0"/>
@@ -3864,77 +3728,37 @@
             </a:r>
             <a:r>
               <a:rPr lang="en-US" dirty="0"/>
-              <a:t>clang </a:t>
-            </a:r>
-            <a:r>
-              <a:rPr lang="ru-RU" dirty="0"/>
-              <a:t>позволяют избежать этого с помощью специальной опции компиляции</a:t>
-            </a:r>
-            <a:r>
-              <a:rPr lang="en-US" dirty="0"/>
-              <a:t> –</a:t>
-            </a:r>
-            <a:r>
-              <a:rPr lang="en-US" dirty="0" err="1"/>
-              <a:t>fno-plt</a:t>
-            </a:r>
-            <a:r>
-              <a:rPr lang="en-US" dirty="0"/>
-              <a:t>.</a:t>
-            </a:r>
-          </a:p>
-          <a:p>
+              <a:t>O1. </a:t>
+            </a:r>
+            <a:r>
+              <a:rPr lang="ru-RU" dirty="0"/>
+              <a:t>Первая из них уже по умолчанию включена в современных дистрибутивах (</a:t>
+            </a:r>
+            <a:r>
+              <a:rPr lang="en-US" dirty="0"/>
+              <a:t>RHEL </a:t>
+            </a:r>
+            <a:r>
+              <a:rPr lang="ru-RU" dirty="0"/>
+              <a:t>и </a:t>
+            </a:r>
+            <a:r>
+              <a:rPr lang="en-US" dirty="0"/>
+              <a:t>Ubuntu)</a:t>
+            </a:r>
+            <a:r>
+              <a:rPr lang="ru-RU" dirty="0"/>
+              <a:t>, а вторая по моим замерам не оказывает существенного влияния на производительность.</a:t>
+            </a:r>
             <a:endParaRPr lang="en-US" dirty="0"/>
           </a:p>
           <a:p>
-            <a:r>
-              <a:rPr lang="ru-RU" dirty="0"/>
-              <a:t>Её использование замедлит загрузку </a:t>
-            </a:r>
-            <a:r>
-              <a:rPr lang="en-US" dirty="0"/>
-              <a:t>DLL</a:t>
-            </a:r>
-            <a:r>
-              <a:rPr lang="ru-RU" dirty="0"/>
-              <a:t>, т.к. теперь все функции потребуется разрешить и связать на старте программы, но с другой стороны ускорит работу программы в дальнейшем, т.к. избавится от </a:t>
-            </a:r>
-            <a:r>
-              <a:rPr lang="en-US" dirty="0"/>
-              <a:t>PLT-</a:t>
-            </a:r>
-            <a:r>
-              <a:rPr lang="ru-RU" dirty="0"/>
-              <a:t>заглушки</a:t>
-            </a:r>
-            <a:r>
-              <a:rPr lang="en-US" dirty="0"/>
-              <a:t>.</a:t>
-            </a:r>
-          </a:p>
-          <a:p>
             <a:endParaRPr lang="en-US" dirty="0"/>
           </a:p>
           <a:p>
             <a:r>
               <a:rPr lang="ru-RU" dirty="0"/>
-              <a:t>Также этот флаг позволит загружать адрес функции из таблицы </a:t>
-            </a:r>
-            <a:r>
-              <a:rPr lang="en-US" dirty="0"/>
-              <a:t>GOT </a:t>
-            </a:r>
-            <a:r>
-              <a:rPr lang="ru-RU" dirty="0"/>
-              <a:t>только один раз на несколько вызовов одной и той же функции</a:t>
-            </a:r>
-            <a:r>
-              <a:rPr lang="en-US" dirty="0"/>
-              <a:t>, </a:t>
-            </a:r>
-            <a:r>
-              <a:rPr lang="ru-RU" dirty="0"/>
-              <a:t>т.е. сократит количество обращений в память.</a:t>
+              <a:t>Резюмируя данный слайд можно сказать что дефолтные настройки тулчейнов в данном контексте оптимальны.</a:t>
             </a:r>
             <a:endParaRPr lang="en-US" dirty="0"/>
           </a:p>
@@ -3957,7 +3781,7 @@
           <a:p>
             <a:fld id="{3AC94D10-082F-46D7-A834-266F9222130F}" type="slidenum">
               <a:rPr lang="en-US" smtClean="0"/>
-              <a:t>38</a:t>
+              <a:t>37</a:t>
             </a:fld>
             <a:endParaRPr lang="en-US"/>
           </a:p>
@@ -3966,7 +3790,7 @@
     </p:spTree>
     <p:extLst>
       <p:ext uri="{BB962C8B-B14F-4D97-AF65-F5344CB8AC3E}">
-        <p14:creationId xmlns:p14="http://schemas.microsoft.com/office/powerpoint/2010/main" val="305821099"/>
+        <p14:creationId xmlns:p14="http://schemas.microsoft.com/office/powerpoint/2010/main" val="1118954411"/>
       </p:ext>
     </p:extLst>
   </p:cSld>
@@ -4020,6 +3844,113 @@
           <a:bodyPr/>
           <a:lstStyle/>
           <a:p>
+            <a:r>
+              <a:rPr lang="ru-RU" dirty="0"/>
+              <a:t>Мы уже упоминали что ленивое связывание на </a:t>
+            </a:r>
+            <a:r>
+              <a:rPr lang="en-US" dirty="0"/>
+              <a:t>Linux </a:t>
+            </a:r>
+            <a:r>
+              <a:rPr lang="ru-RU" dirty="0"/>
+              <a:t>добавляет лишний вызов заглушки при вызове библиотечной функции.</a:t>
+            </a:r>
+          </a:p>
+          <a:p>
+            <a:endParaRPr lang="ru-RU" dirty="0"/>
+          </a:p>
+          <a:p>
+            <a:r>
+              <a:rPr lang="ru-RU" dirty="0"/>
+              <a:t>Современные </a:t>
+            </a:r>
+            <a:r>
+              <a:rPr lang="en-US" dirty="0" err="1"/>
+              <a:t>gcc</a:t>
+            </a:r>
+            <a:r>
+              <a:rPr lang="en-US" dirty="0"/>
+              <a:t> </a:t>
+            </a:r>
+            <a:r>
+              <a:rPr lang="ru-RU" dirty="0"/>
+              <a:t>и </a:t>
+            </a:r>
+            <a:r>
+              <a:rPr lang="en-US" dirty="0"/>
+              <a:t>clang </a:t>
+            </a:r>
+            <a:r>
+              <a:rPr lang="ru-RU" dirty="0"/>
+              <a:t>позволяют избежать этого с помощью специальной опции компиляции</a:t>
+            </a:r>
+            <a:r>
+              <a:rPr lang="en-US" dirty="0"/>
+              <a:t> –</a:t>
+            </a:r>
+            <a:r>
+              <a:rPr lang="en-US" dirty="0" err="1"/>
+              <a:t>fno-plt</a:t>
+            </a:r>
+            <a:r>
+              <a:rPr lang="en-US" dirty="0"/>
+              <a:t>.</a:t>
+            </a:r>
+          </a:p>
+          <a:p>
+            <a:endParaRPr lang="en-US" dirty="0"/>
+          </a:p>
+          <a:p>
+            <a:r>
+              <a:rPr lang="ru-RU" dirty="0"/>
+              <a:t>Её использование замедлит загрузку </a:t>
+            </a:r>
+            <a:r>
+              <a:rPr lang="en-US" dirty="0"/>
+              <a:t>DLL</a:t>
+            </a:r>
+            <a:r>
+              <a:rPr lang="ru-RU" dirty="0"/>
+              <a:t>, т.к. теперь все функции потребуется разрешить и связать на старте программы, но с другой стороны ускорит работу программы в дальнейшем, т.к. избавится от </a:t>
+            </a:r>
+            <a:r>
+              <a:rPr lang="en-US" dirty="0"/>
+              <a:t>PLT-</a:t>
+            </a:r>
+            <a:r>
+              <a:rPr lang="ru-RU" dirty="0"/>
+              <a:t>заглушки</a:t>
+            </a:r>
+            <a:r>
+              <a:rPr lang="en-US" dirty="0"/>
+              <a:t>.</a:t>
+            </a:r>
+          </a:p>
+          <a:p>
+            <a:endParaRPr lang="en-US" dirty="0"/>
+          </a:p>
+          <a:p>
+            <a:r>
+              <a:rPr lang="ru-RU" dirty="0"/>
+              <a:t>Также этот флаг позволит загружать адрес функции из таблицы </a:t>
+            </a:r>
+            <a:r>
+              <a:rPr lang="en-US" dirty="0"/>
+              <a:t>GOT </a:t>
+            </a:r>
+            <a:r>
+              <a:rPr lang="ru-RU" dirty="0"/>
+              <a:t>только один раз на несколько вызовов одной и той же функции</a:t>
+            </a:r>
+            <a:r>
+              <a:rPr lang="en-US" dirty="0"/>
+              <a:t>, </a:t>
+            </a:r>
+            <a:r>
+              <a:rPr lang="ru-RU" dirty="0"/>
+              <a:t>т.е. сократит количество обращений в память.</a:t>
+            </a:r>
             <a:endParaRPr lang="en-US" dirty="0"/>
           </a:p>
         </p:txBody>
@@ -4041,7 +3972,7 @@
           <a:p>
             <a:fld id="{3AC94D10-082F-46D7-A834-266F9222130F}" type="slidenum">
               <a:rPr lang="en-US" smtClean="0"/>
-              <a:t>39</a:t>
+              <a:t>38</a:t>
             </a:fld>
             <a:endParaRPr lang="en-US"/>
           </a:p>
@@ -4050,7 +3981,7 @@
     </p:spTree>
     <p:extLst>
       <p:ext uri="{BB962C8B-B14F-4D97-AF65-F5344CB8AC3E}">
-        <p14:creationId xmlns:p14="http://schemas.microsoft.com/office/powerpoint/2010/main" val="3696372151"/>
+        <p14:creationId xmlns:p14="http://schemas.microsoft.com/office/powerpoint/2010/main" val="305821099"/>
       </p:ext>
     </p:extLst>
   </p:cSld>
@@ -4125,7 +4056,7 @@
           <a:p>
             <a:fld id="{3AC94D10-082F-46D7-A834-266F9222130F}" type="slidenum">
               <a:rPr lang="en-US" smtClean="0"/>
-              <a:t>40</a:t>
+              <a:t>39</a:t>
             </a:fld>
             <a:endParaRPr lang="en-US"/>
           </a:p>
@@ -4134,7 +4065,7 @@
     </p:spTree>
     <p:extLst>
       <p:ext uri="{BB962C8B-B14F-4D97-AF65-F5344CB8AC3E}">
-        <p14:creationId xmlns:p14="http://schemas.microsoft.com/office/powerpoint/2010/main" val="1863594613"/>
+        <p14:creationId xmlns:p14="http://schemas.microsoft.com/office/powerpoint/2010/main" val="3696372151"/>
       </p:ext>
     </p:extLst>
   </p:cSld>
@@ -4188,24 +4119,7 @@
           <a:bodyPr/>
           <a:lstStyle/>
           <a:p>
-            <a:r>
-              <a:rPr lang="ru-RU" dirty="0"/>
-              <a:t>Перейдём наконец к последнему пункту в списке накладных расходов. А именно рассмотрим как можно ускорить косвенные вызовы библиотечных функций.</a:t>
-            </a:r>
             <a:endParaRPr lang="en-US" dirty="0"/>
-          </a:p>
-          <a:p>
-            <a:endParaRPr lang="en-US" dirty="0"/>
-          </a:p>
-          <a:p>
-            <a:r>
-              <a:rPr lang="ru-RU" dirty="0"/>
-              <a:t>Эта часть в основном будет посвящена </a:t>
-            </a:r>
-            <a:r>
-              <a:rPr lang="en-US" dirty="0"/>
-              <a:t>Linux.</a:t>
-            </a:r>
           </a:p>
         </p:txBody>
       </p:sp>
@@ -4226,7 +4140,7 @@
           <a:p>
             <a:fld id="{3AC94D10-082F-46D7-A834-266F9222130F}" type="slidenum">
               <a:rPr lang="en-US" smtClean="0"/>
-              <a:t>41</a:t>
+              <a:t>40</a:t>
             </a:fld>
             <a:endParaRPr lang="en-US"/>
           </a:p>
@@ -4235,7 +4149,7 @@
     </p:spTree>
     <p:extLst>
       <p:ext uri="{BB962C8B-B14F-4D97-AF65-F5344CB8AC3E}">
-        <p14:creationId xmlns:p14="http://schemas.microsoft.com/office/powerpoint/2010/main" val="3270444806"/>
+        <p14:creationId xmlns:p14="http://schemas.microsoft.com/office/powerpoint/2010/main" val="1863594613"/>
       </p:ext>
     </p:extLst>
   </p:cSld>
@@ -4291,52 +4205,22 @@
           <a:p>
             <a:r>
               <a:rPr lang="ru-RU" dirty="0"/>
-              <a:t>Дело в том что на </a:t>
-            </a:r>
-            <a:r>
-              <a:rPr lang="en-US" dirty="0"/>
-              <a:t>Linux </a:t>
-            </a:r>
-            <a:r>
-              <a:rPr lang="ru-RU" dirty="0"/>
-              <a:t>все функции по умолчанию являются экспортируемыми (для того чтобы </a:t>
-            </a:r>
-            <a:r>
-              <a:rPr lang="en-US" dirty="0"/>
-              <a:t>DLL </a:t>
-            </a:r>
-            <a:r>
-              <a:rPr lang="ru-RU" dirty="0"/>
-              <a:t>были более похожи на статические библиотеки).</a:t>
+              <a:t>Перейдём наконец к последнему пункту в списке накладных расходов. А именно рассмотрим как можно ускорить вызовы библиотечных функций.</a:t>
             </a:r>
             <a:endParaRPr lang="en-US" dirty="0"/>
           </a:p>
           <a:p>
-            <a:endParaRPr lang="ru-RU" dirty="0"/>
-          </a:p>
-          <a:p>
-            <a:r>
-              <a:rPr lang="ru-RU" dirty="0"/>
-              <a:t>Это приводит к тому что вызовы функций даже внутри библиотеки делаются не напрямую, а через таблицу диспетчеризации, с соответствующими накладными расходами</a:t>
-            </a:r>
-            <a:r>
-              <a:rPr lang="en-US" dirty="0"/>
-              <a:t> </a:t>
-            </a:r>
-            <a:r>
-              <a:rPr lang="ru-RU" dirty="0"/>
-              <a:t>на косвенные вызовы.</a:t>
-            </a:r>
-          </a:p>
-          <a:p>
-            <a:endParaRPr lang="ru-RU" dirty="0"/>
-          </a:p>
-          <a:p>
-            <a:r>
-              <a:rPr lang="ru-RU" dirty="0"/>
-              <a:t>Кроме того из-за того что функции экспортируются возникает возможность их перехвата и компилятору приходится это учитывать и существенно ограничивать оптимизации.</a:t>
-            </a:r>
             <a:endParaRPr lang="en-US" dirty="0"/>
+          </a:p>
+          <a:p>
+            <a:r>
+              <a:rPr lang="ru-RU" dirty="0"/>
+              <a:t>Эта часть в основном будет посвящена </a:t>
+            </a:r>
+            <a:r>
+              <a:rPr lang="en-US" dirty="0"/>
+              <a:t>Linux.</a:t>
+            </a:r>
           </a:p>
         </p:txBody>
       </p:sp>
@@ -4357,7 +4241,7 @@
           <a:p>
             <a:fld id="{3AC94D10-082F-46D7-A834-266F9222130F}" type="slidenum">
               <a:rPr lang="en-US" smtClean="0"/>
-              <a:t>42</a:t>
+              <a:t>41</a:t>
             </a:fld>
             <a:endParaRPr lang="en-US"/>
           </a:p>
@@ -4366,7 +4250,7 @@
     </p:spTree>
     <p:extLst>
       <p:ext uri="{BB962C8B-B14F-4D97-AF65-F5344CB8AC3E}">
-        <p14:creationId xmlns:p14="http://schemas.microsoft.com/office/powerpoint/2010/main" val="1185757282"/>
+        <p14:creationId xmlns:p14="http://schemas.microsoft.com/office/powerpoint/2010/main" val="3270444806"/>
       </p:ext>
     </p:extLst>
   </p:cSld>
@@ -4559,15 +4443,33 @@
           <a:p>
             <a:r>
               <a:rPr lang="ru-RU" dirty="0"/>
-              <a:t>На данном слайде можно видеть пример отмены оптимизации</a:t>
-            </a:r>
-            <a:r>
-              <a:rPr lang="en-US" dirty="0"/>
-              <a:t>: </a:t>
-            </a:r>
-            <a:r>
-              <a:rPr lang="ru-RU" dirty="0"/>
-              <a:t>компилятор не может</a:t>
+              <a:t>Дело в том что на </a:t>
+            </a:r>
+            <a:r>
+              <a:rPr lang="en-US" dirty="0"/>
+              <a:t>Linux </a:t>
+            </a:r>
+            <a:r>
+              <a:rPr lang="ru-RU" dirty="0"/>
+              <a:t>все библиотечные функции по умолчанию являются экспортируемыми (для того чтобы </a:t>
+            </a:r>
+            <a:r>
+              <a:rPr lang="en-US" dirty="0"/>
+              <a:t>DLL </a:t>
+            </a:r>
+            <a:r>
+              <a:rPr lang="ru-RU" dirty="0"/>
+              <a:t>были более похожи на статические библиотеки).</a:t>
+            </a:r>
+            <a:endParaRPr lang="en-US" dirty="0"/>
+          </a:p>
+          <a:p>
+            <a:endParaRPr lang="ru-RU" dirty="0"/>
+          </a:p>
+          <a:p>
+            <a:r>
+              <a:rPr lang="ru-RU" dirty="0"/>
+              <a:t>Это приводит к тому что вызовы функций даже внутри библиотеки делаются не напрямую, а через таблицу диспетчеризации, с соответствующими накладными расходами</a:t>
             </a:r>
             <a:r>
               <a:rPr lang="en-US" dirty="0"/>
@@ -4575,39 +4477,16 @@
             </a:r>
             <a:r>
               <a:rPr lang="ru-RU" dirty="0"/>
-              <a:t>встроить вызов </a:t>
-            </a:r>
-            <a:r>
-              <a:rPr lang="en-US" dirty="0"/>
-              <a:t>foo </a:t>
-            </a:r>
-            <a:r>
-              <a:rPr lang="ru-RU" dirty="0"/>
-              <a:t>в </a:t>
-            </a:r>
-            <a:r>
-              <a:rPr lang="en-US" dirty="0"/>
-              <a:t>bar </a:t>
-            </a:r>
-            <a:r>
-              <a:rPr lang="ru-RU" dirty="0"/>
-              <a:t>из-за того что </a:t>
-            </a:r>
-            <a:r>
-              <a:rPr lang="en-US" dirty="0"/>
-              <a:t>foo </a:t>
-            </a:r>
-            <a:r>
-              <a:rPr lang="ru-RU" dirty="0"/>
-              <a:t>может быть перехвачена в рантайме</a:t>
-            </a:r>
-            <a:r>
-              <a:rPr lang="en-US" dirty="0"/>
-              <a:t> (</a:t>
-            </a:r>
-            <a:r>
-              <a:rPr lang="ru-RU" dirty="0"/>
-              <a:t>и соответственно её семантика может быть изменена).</a:t>
+              <a:t>на косвенные вызовы.</a:t>
+            </a:r>
+          </a:p>
+          <a:p>
+            <a:endParaRPr lang="ru-RU" dirty="0"/>
+          </a:p>
+          <a:p>
+            <a:r>
+              <a:rPr lang="ru-RU" dirty="0"/>
+              <a:t>Кроме того из-за того что функции экспортируются возникает возможность их перехвата и компилятору приходится это учитывать и существенно ограничивать оптимизации.</a:t>
             </a:r>
             <a:endParaRPr lang="en-US" dirty="0"/>
           </a:p>
@@ -4630,7 +4509,7 @@
           <a:p>
             <a:fld id="{3AC94D10-082F-46D7-A834-266F9222130F}" type="slidenum">
               <a:rPr lang="en-US" smtClean="0"/>
-              <a:t>43</a:t>
+              <a:t>42</a:t>
             </a:fld>
             <a:endParaRPr lang="en-US"/>
           </a:p>
@@ -4639,7 +4518,7 @@
     </p:spTree>
     <p:extLst>
       <p:ext uri="{BB962C8B-B14F-4D97-AF65-F5344CB8AC3E}">
-        <p14:creationId xmlns:p14="http://schemas.microsoft.com/office/powerpoint/2010/main" val="2752840744"/>
+        <p14:creationId xmlns:p14="http://schemas.microsoft.com/office/powerpoint/2010/main" val="1185757282"/>
       </p:ext>
     </p:extLst>
   </p:cSld>
@@ -4695,16 +4574,7 @@
           <a:p>
             <a:r>
               <a:rPr lang="ru-RU" dirty="0"/>
-              <a:t>Бороться с таким неэффективным поведением можно несколькими способами.</a:t>
-            </a:r>
-          </a:p>
-          <a:p>
-            <a:endParaRPr lang="ru-RU" dirty="0"/>
-          </a:p>
-          <a:p>
-            <a:r>
-              <a:rPr lang="ru-RU" dirty="0"/>
-              <a:t>Во-первых есть специальные флаги компиляции</a:t>
+              <a:t>На данном слайде можно видеть пример отмены оптимизации</a:t>
             </a:r>
             <a:r>
               <a:rPr lang="en-US" dirty="0"/>
@@ -4712,53 +4582,47 @@
             </a:r>
             <a:r>
               <a:rPr lang="ru-RU" dirty="0"/>
-              <a:t>один, </a:t>
-            </a:r>
-            <a:r>
-              <a:rPr lang="en-US" dirty="0"/>
-              <a:t>-</a:t>
-            </a:r>
-            <a:r>
-              <a:rPr lang="en-US" dirty="0" err="1"/>
-              <a:t>Bsymbolic</a:t>
-            </a:r>
-            <a:r>
-              <a:rPr lang="ru-RU" dirty="0"/>
-              <a:t>, для линковки, чтобы вместо косвенных вызовы внутренних функций </a:t>
-            </a:r>
-            <a:r>
-              <a:rPr lang="en-US" dirty="0"/>
-              <a:t>DLL </a:t>
-            </a:r>
-            <a:r>
-              <a:rPr lang="ru-RU" dirty="0"/>
-              <a:t>использовать прямые. А второй</a:t>
-            </a:r>
-            <a:r>
-              <a:rPr lang="en-US" dirty="0"/>
-              <a:t>, -</a:t>
-            </a:r>
-            <a:r>
-              <a:rPr lang="en-US" dirty="0" err="1"/>
-              <a:t>fno</a:t>
-            </a:r>
-            <a:r>
-              <a:rPr lang="en-US" dirty="0"/>
-              <a:t>-semantic-interposition, </a:t>
-            </a:r>
-            <a:r>
-              <a:rPr lang="ru-RU" dirty="0"/>
-              <a:t>чтобы позволить компилятору при оптимизации игнорировать возможность перехвата функций.</a:t>
-            </a:r>
-            <a:endParaRPr lang="en-US" dirty="0"/>
-          </a:p>
-          <a:p>
-            <a:endParaRPr lang="en-US" dirty="0"/>
-          </a:p>
-          <a:p>
-            <a:r>
-              <a:rPr lang="ru-RU" dirty="0"/>
-              <a:t>Для оптимальной производительности требуется включить оба флага.</a:t>
+              <a:t>компилятор не может</a:t>
+            </a:r>
+            <a:r>
+              <a:rPr lang="en-US" dirty="0"/>
+              <a:t> </a:t>
+            </a:r>
+            <a:r>
+              <a:rPr lang="ru-RU" dirty="0"/>
+              <a:t>встроить вызов </a:t>
+            </a:r>
+            <a:r>
+              <a:rPr lang="en-US" dirty="0"/>
+              <a:t>foo </a:t>
+            </a:r>
+            <a:r>
+              <a:rPr lang="ru-RU" dirty="0"/>
+              <a:t>в </a:t>
+            </a:r>
+            <a:r>
+              <a:rPr lang="en-US" dirty="0"/>
+              <a:t>bar </a:t>
+            </a:r>
+            <a:r>
+              <a:rPr lang="ru-RU" dirty="0"/>
+              <a:t>из-за того что </a:t>
+            </a:r>
+            <a:r>
+              <a:rPr lang="en-US" dirty="0"/>
+              <a:t>foo </a:t>
+            </a:r>
+            <a:r>
+              <a:rPr lang="ru-RU" dirty="0"/>
+              <a:t>может быть перехвачена в рантайме</a:t>
+            </a:r>
+            <a:r>
+              <a:rPr lang="en-US" dirty="0"/>
+              <a:t> (</a:t>
+            </a:r>
+            <a:r>
+              <a:rPr lang="ru-RU" dirty="0"/>
+              <a:t>и соответственно её семантика может быть изменена).</a:t>
             </a:r>
             <a:endParaRPr lang="en-US" dirty="0"/>
           </a:p>
@@ -4781,7 +4645,7 @@
           <a:p>
             <a:fld id="{3AC94D10-082F-46D7-A834-266F9222130F}" type="slidenum">
               <a:rPr lang="en-US" smtClean="0"/>
-              <a:t>44</a:t>
+              <a:t>43</a:t>
             </a:fld>
             <a:endParaRPr lang="en-US"/>
           </a:p>
@@ -4790,7 +4654,7 @@
     </p:spTree>
     <p:extLst>
       <p:ext uri="{BB962C8B-B14F-4D97-AF65-F5344CB8AC3E}">
-        <p14:creationId xmlns:p14="http://schemas.microsoft.com/office/powerpoint/2010/main" val="3733641060"/>
+        <p14:creationId xmlns:p14="http://schemas.microsoft.com/office/powerpoint/2010/main" val="2752840744"/>
       </p:ext>
     </p:extLst>
   </p:cSld>
@@ -4846,7 +4710,7 @@
           <a:p>
             <a:r>
               <a:rPr lang="ru-RU" dirty="0"/>
-              <a:t>Помимо использования флагов есть второй, более традиционный способ, который заключается в сокращении интерфейса библиотеки, т.е. уменьшении количества функций, которые она экспортирует.</a:t>
+              <a:t>Бороться с таким неэффективным поведением можно несколькими способами.</a:t>
             </a:r>
           </a:p>
           <a:p>
@@ -4855,39 +4719,51 @@
           <a:p>
             <a:r>
               <a:rPr lang="ru-RU" dirty="0"/>
-              <a:t>Суть его заключается в том, что мы явно помечаем экспортируемые функции специальным атрибутом </a:t>
-            </a:r>
-            <a:r>
-              <a:rPr lang="en-US" dirty="0"/>
-              <a:t>visibility</a:t>
-            </a:r>
-            <a:r>
-              <a:rPr lang="ru-RU" dirty="0"/>
-              <a:t>, а все остальные символы делаем внутренними</a:t>
-            </a:r>
-            <a:r>
-              <a:rPr lang="en-US" dirty="0"/>
-              <a:t> </a:t>
-            </a:r>
-            <a:r>
-              <a:rPr lang="ru-RU" dirty="0"/>
-              <a:t>с помощью флага. Соответственно для всех скрытых, неэкспортируемых символов </a:t>
-            </a:r>
-            <a:r>
-              <a:rPr lang="en-US" dirty="0"/>
-              <a:t>(</a:t>
-            </a:r>
-            <a:r>
-              <a:rPr lang="ru-RU" dirty="0"/>
-              <a:t>которых гораздо больше</a:t>
-            </a:r>
-            <a:r>
-              <a:rPr lang="en-US" dirty="0"/>
-              <a:t>) </a:t>
-            </a:r>
-            <a:r>
-              <a:rPr lang="ru-RU" dirty="0"/>
-              <a:t>компилятор сможет применять более агрессивные оптимизации и при генерации кода использовать прямые вызовы.</a:t>
+              <a:t>Во-первых есть специальные флаги компиляции</a:t>
+            </a:r>
+            <a:r>
+              <a:rPr lang="en-US" dirty="0"/>
+              <a:t>: </a:t>
+            </a:r>
+            <a:r>
+              <a:rPr lang="ru-RU" dirty="0"/>
+              <a:t>один, </a:t>
+            </a:r>
+            <a:r>
+              <a:rPr lang="en-US" dirty="0"/>
+              <a:t>-</a:t>
+            </a:r>
+            <a:r>
+              <a:rPr lang="en-US" dirty="0" err="1"/>
+              <a:t>Bsymbolic</a:t>
+            </a:r>
+            <a:r>
+              <a:rPr lang="ru-RU" dirty="0"/>
+              <a:t>, для линковки, чтобы вместо косвенных вызовы внутренних функций </a:t>
+            </a:r>
+            <a:r>
+              <a:rPr lang="en-US" dirty="0"/>
+              <a:t>DLL </a:t>
+            </a:r>
+            <a:r>
+              <a:rPr lang="ru-RU" dirty="0"/>
+              <a:t>использовать прямые. А второй</a:t>
+            </a:r>
+            <a:r>
+              <a:rPr lang="en-US" dirty="0"/>
+              <a:t>, -</a:t>
+            </a:r>
+            <a:r>
+              <a:rPr lang="en-US" dirty="0" err="1"/>
+              <a:t>fno</a:t>
+            </a:r>
+            <a:r>
+              <a:rPr lang="en-US" dirty="0"/>
+              <a:t>-semantic-interposition, </a:t>
+            </a:r>
+            <a:r>
+              <a:rPr lang="ru-RU" dirty="0"/>
+              <a:t>чтобы позволить компилятору при оптимизации игнорировать возможность перехвата функций.</a:t>
             </a:r>
             <a:endParaRPr lang="en-US" dirty="0"/>
           </a:p>
@@ -4897,15 +4773,7 @@
           <a:p>
             <a:r>
               <a:rPr lang="ru-RU" dirty="0"/>
-              <a:t>Помимо оптимизации у этого подхода есть ещё одно преимущество</a:t>
-            </a:r>
-            <a:r>
-              <a:rPr lang="en-US" dirty="0"/>
-              <a:t>: </a:t>
-            </a:r>
-            <a:r>
-              <a:rPr lang="ru-RU" dirty="0"/>
-              <a:t>мы скрываем от пользователя внутренние детали реализации библиотеки и не даём возможности использовать её недокументированным образом.</a:t>
+              <a:t>Для оптимальной производительности требуется включить оба флага.</a:t>
             </a:r>
             <a:endParaRPr lang="en-US" dirty="0"/>
           </a:p>
@@ -4928,7 +4796,7 @@
           <a:p>
             <a:fld id="{3AC94D10-082F-46D7-A834-266F9222130F}" type="slidenum">
               <a:rPr lang="en-US" smtClean="0"/>
-              <a:t>46</a:t>
+              <a:t>44</a:t>
             </a:fld>
             <a:endParaRPr lang="en-US"/>
           </a:p>
@@ -4937,7 +4805,7 @@
     </p:spTree>
     <p:extLst>
       <p:ext uri="{BB962C8B-B14F-4D97-AF65-F5344CB8AC3E}">
-        <p14:creationId xmlns:p14="http://schemas.microsoft.com/office/powerpoint/2010/main" val="1530341260"/>
+        <p14:creationId xmlns:p14="http://schemas.microsoft.com/office/powerpoint/2010/main" val="3733641060"/>
       </p:ext>
     </p:extLst>
   </p:cSld>
@@ -4993,15 +4861,7 @@
           <a:p>
             <a:r>
               <a:rPr lang="ru-RU" dirty="0"/>
-              <a:t>Если вы захотите применить оптимизацию сокрытия символов к большой кодовой базе, например к дистрибутиву </a:t>
-            </a:r>
-            <a:r>
-              <a:rPr lang="en-US" dirty="0"/>
-              <a:t>Linux, </a:t>
-            </a:r>
-            <a:r>
-              <a:rPr lang="ru-RU" dirty="0"/>
-              <a:t>то придётся анализировать по очереди каждую библиотеку вручную на предмет того экспортируются ли из неё ненужные символы и если да, то какие.</a:t>
+              <a:t>Помимо использования флагов есть второй, более традиционный способ, который заключается в сокращении интерфейса библиотеки, т.е. уменьшении количества функций, которые она экспортирует.</a:t>
             </a:r>
           </a:p>
           <a:p>
@@ -5010,11 +4870,15 @@
           <a:p>
             <a:r>
               <a:rPr lang="ru-RU" dirty="0"/>
-              <a:t>Эту задачу можно упростить с помощью автоматизации. Утилита </a:t>
-            </a:r>
-            <a:r>
-              <a:rPr lang="en-US" dirty="0" err="1"/>
-              <a:t>ShlibVisibilityChecker</a:t>
+              <a:t>Суть его заключается в том, что мы явно помечаем экспортируемые функции специальным атрибутом </a:t>
+            </a:r>
+            <a:r>
+              <a:rPr lang="en-US" dirty="0"/>
+              <a:t>visibility</a:t>
+            </a:r>
+            <a:r>
+              <a:rPr lang="ru-RU" dirty="0"/>
+              <a:t>, а все остальные символы делаем внутренними</a:t>
             </a:r>
             <a:r>
               <a:rPr lang="en-US" dirty="0"/>
@@ -5022,53 +4886,49 @@
             </a:r>
             <a:r>
               <a:rPr lang="ru-RU" dirty="0"/>
-              <a:t>по бинарному файлу библиотеки</a:t>
-            </a:r>
-            <a:r>
-              <a:rPr lang="en-US" dirty="0"/>
-              <a:t> </a:t>
-            </a:r>
-            <a:r>
-              <a:rPr lang="ru-RU" dirty="0"/>
-              <a:t>и заголовочному файлу скажет какие символы нужно скрыть. Я успешно применял эту утилиту для поиска проблемных библиотек в </a:t>
-            </a:r>
-            <a:r>
-              <a:rPr lang="en-US" dirty="0"/>
-              <a:t>Ubuntu.</a:t>
-            </a:r>
-            <a:endParaRPr lang="ru-RU" dirty="0"/>
-          </a:p>
-          <a:p>
-            <a:endParaRPr lang="ru-RU" dirty="0"/>
-          </a:p>
-          <a:p>
-            <a:r>
-              <a:rPr lang="ru-RU" dirty="0"/>
-              <a:t>На слайде приведён пример анализа популярной библиотеки</a:t>
-            </a:r>
-            <a:r>
-              <a:rPr lang="en-US" dirty="0"/>
-              <a:t> </a:t>
-            </a:r>
-            <a:r>
-              <a:rPr lang="en-US" dirty="0" err="1"/>
-              <a:t>libgmp</a:t>
-            </a:r>
-            <a:r>
-              <a:rPr lang="en-US" dirty="0"/>
-              <a:t> </a:t>
-            </a:r>
-            <a:r>
-              <a:rPr lang="ru-RU" dirty="0"/>
-              <a:t>для вычислений произвольной точности.</a:t>
-            </a:r>
-            <a:r>
-              <a:rPr lang="en-US" dirty="0"/>
-              <a:t> </a:t>
-            </a:r>
-            <a:r>
-              <a:rPr lang="ru-RU" dirty="0"/>
-              <a:t>Можно видеть что библиотека экспортирует большое количество ненужных символов.</a:t>
+              <a:t>с помощью флага. Соответственно для всех скрытых, неэкспортируемых функций </a:t>
+            </a:r>
+            <a:r>
+              <a:rPr lang="en-US" dirty="0"/>
+              <a:t>(</a:t>
+            </a:r>
+            <a:r>
+              <a:rPr lang="ru-RU" dirty="0"/>
+              <a:t>которых гораздо больше</a:t>
+            </a:r>
+            <a:r>
+              <a:rPr lang="en-US" dirty="0"/>
+              <a:t>) </a:t>
+            </a:r>
+            <a:r>
+              <a:rPr lang="ru-RU" dirty="0"/>
+              <a:t>компилятор сможет применять более агрессивные оптимизации и при генерации кода использовать прямые вызовы</a:t>
+            </a:r>
+            <a:r>
+              <a:rPr lang="en-US" dirty="0"/>
+              <a:t> (</a:t>
+            </a:r>
+            <a:r>
+              <a:rPr lang="ru-RU" dirty="0"/>
+              <a:t>вместо косвенных).</a:t>
+            </a:r>
+            <a:endParaRPr lang="en-US" dirty="0"/>
+          </a:p>
+          <a:p>
+            <a:endParaRPr lang="en-US" dirty="0"/>
+          </a:p>
+          <a:p>
+            <a:r>
+              <a:rPr lang="ru-RU" dirty="0"/>
+              <a:t>Помимо оптимизации у этого подхода есть ещё одно преимущество</a:t>
+            </a:r>
+            <a:r>
+              <a:rPr lang="en-US" dirty="0"/>
+              <a:t>: </a:t>
+            </a:r>
+            <a:r>
+              <a:rPr lang="ru-RU" dirty="0"/>
+              <a:t>мы скрываем от пользователя внутренние детали реализации библиотеки и не даём возможности использовать её недокументированным образом.</a:t>
             </a:r>
             <a:endParaRPr lang="en-US" dirty="0"/>
           </a:p>
@@ -5091,7 +4951,7 @@
           <a:p>
             <a:fld id="{3AC94D10-082F-46D7-A834-266F9222130F}" type="slidenum">
               <a:rPr lang="en-US" smtClean="0"/>
-              <a:t>47</a:t>
+              <a:t>46</a:t>
             </a:fld>
             <a:endParaRPr lang="en-US"/>
           </a:p>
@@ -5100,7 +4960,7 @@
     </p:spTree>
     <p:extLst>
       <p:ext uri="{BB962C8B-B14F-4D97-AF65-F5344CB8AC3E}">
-        <p14:creationId xmlns:p14="http://schemas.microsoft.com/office/powerpoint/2010/main" val="3687863370"/>
+        <p14:creationId xmlns:p14="http://schemas.microsoft.com/office/powerpoint/2010/main" val="1530341260"/>
       </p:ext>
     </p:extLst>
   </p:cSld>
@@ -5164,7 +5024,15 @@
             </a:r>
             <a:r>
               <a:rPr lang="ru-RU" dirty="0"/>
-              <a:t>то придётся анализировать по очереди каждую библиотеку вручную на предмет того экспортируются ли из неё ненужные символы и если да, то какие.</a:t>
+              <a:t>то придётся вручную</a:t>
+            </a:r>
+            <a:r>
+              <a:rPr lang="en-US" dirty="0"/>
+              <a:t> </a:t>
+            </a:r>
+            <a:r>
+              <a:rPr lang="ru-RU" dirty="0"/>
+              <a:t>по очереди анализировать каждую библиотеку на предмет того экспортируются ли из неё ненужные символы и если да, то какие.</a:t>
             </a:r>
           </a:p>
           <a:p>
@@ -5173,7 +5041,95 @@
           <a:p>
             <a:r>
               <a:rPr lang="ru-RU" dirty="0"/>
-              <a:t>Эту задачу можно упростить с помощью автоматизации. Утилита </a:t>
+              <a:t>Эту задачу можно упростить с помощью автоматизации.</a:t>
+            </a:r>
+            <a:endParaRPr lang="en-US" dirty="0"/>
+          </a:p>
+        </p:txBody>
+      </p:sp>
+      <p:sp>
+        <p:nvSpPr>
+          <p:cNvPr id="4" name="Slide Number Placeholder 3"/>
+          <p:cNvSpPr>
+            <a:spLocks noGrp="1"/>
+          </p:cNvSpPr>
+          <p:nvPr>
+            <p:ph type="sldNum" sz="quarter" idx="5"/>
+          </p:nvPr>
+        </p:nvSpPr>
+        <p:spPr/>
+        <p:txBody>
+          <a:bodyPr/>
+          <a:lstStyle/>
+          <a:p>
+            <a:fld id="{3AC94D10-082F-46D7-A834-266F9222130F}" type="slidenum">
+              <a:rPr lang="en-US" smtClean="0"/>
+              <a:t>47</a:t>
+            </a:fld>
+            <a:endParaRPr lang="en-US"/>
+          </a:p>
+        </p:txBody>
+      </p:sp>
+    </p:spTree>
+    <p:extLst>
+      <p:ext uri="{BB962C8B-B14F-4D97-AF65-F5344CB8AC3E}">
+        <p14:creationId xmlns:p14="http://schemas.microsoft.com/office/powerpoint/2010/main" val="3687863370"/>
+      </p:ext>
+    </p:extLst>
+  </p:cSld>
+  <p:clrMapOvr>
+    <a:masterClrMapping/>
+  </p:clrMapOvr>
+</p:notes>
+</file>
+
+<file path=ppt/notesSlides/notesSlide45.xml><?xml version="1.0" encoding="utf-8"?>
+<p:notes xmlns:a="http://schemas.openxmlformats.org/drawingml/2006/main" xmlns:r="http://schemas.openxmlformats.org/officeDocument/2006/relationships" xmlns:p="http://schemas.openxmlformats.org/presentationml/2006/main">
+  <p:cSld>
+    <p:spTree>
+      <p:nvGrpSpPr>
+        <p:cNvPr id="1" name=""/>
+        <p:cNvGrpSpPr/>
+        <p:nvPr/>
+      </p:nvGrpSpPr>
+      <p:grpSpPr>
+        <a:xfrm>
+          <a:off x="0" y="0"/>
+          <a:ext cx="0" cy="0"/>
+          <a:chOff x="0" y="0"/>
+          <a:chExt cx="0" cy="0"/>
+        </a:xfrm>
+      </p:grpSpPr>
+      <p:sp>
+        <p:nvSpPr>
+          <p:cNvPr id="2" name="Slide Image Placeholder 1"/>
+          <p:cNvSpPr>
+            <a:spLocks noGrp="1" noRot="1" noChangeAspect="1"/>
+          </p:cNvSpPr>
+          <p:nvPr>
+            <p:ph type="sldImg"/>
+          </p:nvPr>
+        </p:nvSpPr>
+        <p:spPr/>
+      </p:sp>
+      <p:sp>
+        <p:nvSpPr>
+          <p:cNvPr id="3" name="Notes Placeholder 2"/>
+          <p:cNvSpPr>
+            <a:spLocks noGrp="1"/>
+          </p:cNvSpPr>
+          <p:nvPr>
+            <p:ph type="body" idx="1"/>
+          </p:nvPr>
+        </p:nvSpPr>
+        <p:spPr/>
+        <p:txBody>
+          <a:bodyPr/>
+          <a:lstStyle/>
+          <a:p>
+            <a:r>
+              <a:rPr lang="ru-RU" dirty="0"/>
+              <a:t>Утилита </a:t>
             </a:r>
             <a:r>
               <a:rPr lang="en-US" dirty="0" err="1"/>
@@ -5193,7 +5149,7 @@
             </a:r>
             <a:r>
               <a:rPr lang="ru-RU" dirty="0"/>
-              <a:t>и заголовочному файлу скажет какие символы нужно скрыть. Я успешно применял эту утилиту для поиска проблемных библиотек в </a:t>
+              <a:t>и её заголовочным файлам скажет какие символы нужно скрыть. Я успешно применял эту утилиту для поиска проблемных библиотек в </a:t>
             </a:r>
             <a:r>
               <a:rPr lang="en-US" dirty="0"/>
@@ -5202,8 +5158,89 @@
             <a:endParaRPr lang="ru-RU" dirty="0"/>
           </a:p>
           <a:p>
-            <a:endParaRPr lang="ru-RU" dirty="0"/>
-          </a:p>
+            <a:endParaRPr lang="en-US" dirty="0"/>
+          </a:p>
+        </p:txBody>
+      </p:sp>
+      <p:sp>
+        <p:nvSpPr>
+          <p:cNvPr id="4" name="Slide Number Placeholder 3"/>
+          <p:cNvSpPr>
+            <a:spLocks noGrp="1"/>
+          </p:cNvSpPr>
+          <p:nvPr>
+            <p:ph type="sldNum" sz="quarter" idx="5"/>
+          </p:nvPr>
+        </p:nvSpPr>
+        <p:spPr/>
+        <p:txBody>
+          <a:bodyPr/>
+          <a:lstStyle/>
+          <a:p>
+            <a:fld id="{3AC94D10-082F-46D7-A834-266F9222130F}" type="slidenum">
+              <a:rPr lang="en-US" smtClean="0"/>
+              <a:t>48</a:t>
+            </a:fld>
+            <a:endParaRPr lang="en-US"/>
+          </a:p>
+        </p:txBody>
+      </p:sp>
+    </p:spTree>
+    <p:extLst>
+      <p:ext uri="{BB962C8B-B14F-4D97-AF65-F5344CB8AC3E}">
+        <p14:creationId xmlns:p14="http://schemas.microsoft.com/office/powerpoint/2010/main" val="286087877"/>
+      </p:ext>
+    </p:extLst>
+  </p:cSld>
+  <p:clrMapOvr>
+    <a:masterClrMapping/>
+  </p:clrMapOvr>
+</p:notes>
+</file>
+
+<file path=ppt/notesSlides/notesSlide46.xml><?xml version="1.0" encoding="utf-8"?>
+<p:notes xmlns:a="http://schemas.openxmlformats.org/drawingml/2006/main" xmlns:r="http://schemas.openxmlformats.org/officeDocument/2006/relationships" xmlns:p="http://schemas.openxmlformats.org/presentationml/2006/main">
+  <p:cSld>
+    <p:spTree>
+      <p:nvGrpSpPr>
+        <p:cNvPr id="1" name=""/>
+        <p:cNvGrpSpPr/>
+        <p:nvPr/>
+      </p:nvGrpSpPr>
+      <p:grpSpPr>
+        <a:xfrm>
+          <a:off x="0" y="0"/>
+          <a:ext cx="0" cy="0"/>
+          <a:chOff x="0" y="0"/>
+          <a:chExt cx="0" cy="0"/>
+        </a:xfrm>
+      </p:grpSpPr>
+      <p:sp>
+        <p:nvSpPr>
+          <p:cNvPr id="2" name="Slide Image Placeholder 1"/>
+          <p:cNvSpPr>
+            <a:spLocks noGrp="1" noRot="1" noChangeAspect="1"/>
+          </p:cNvSpPr>
+          <p:nvPr>
+            <p:ph type="sldImg"/>
+          </p:nvPr>
+        </p:nvSpPr>
+        <p:spPr/>
+      </p:sp>
+      <p:sp>
+        <p:nvSpPr>
+          <p:cNvPr id="3" name="Notes Placeholder 2"/>
+          <p:cNvSpPr>
+            <a:spLocks noGrp="1"/>
+          </p:cNvSpPr>
+          <p:nvPr>
+            <p:ph type="body" idx="1"/>
+          </p:nvPr>
+        </p:nvSpPr>
+        <p:spPr/>
+        <p:txBody>
+          <a:bodyPr/>
+          <a:lstStyle/>
           <a:p>
             <a:r>
               <a:rPr lang="ru-RU" dirty="0"/>
@@ -5273,7 +5310,7 @@
 </p:notes>
 </file>
 
-<file path=ppt/notesSlides/notesSlide45.xml><?xml version="1.0" encoding="utf-8"?>
+<file path=ppt/notesSlides/notesSlide47.xml><?xml version="1.0" encoding="utf-8"?>
 <p:notes xmlns:a="http://schemas.openxmlformats.org/drawingml/2006/main" xmlns:r="http://schemas.openxmlformats.org/officeDocument/2006/relationships" xmlns:p="http://schemas.openxmlformats.org/presentationml/2006/main">
   <p:cSld>
     <p:spTree>
@@ -5487,11 +5524,11 @@
           <a:p>
             <a:r>
               <a:rPr lang="ru-RU" dirty="0"/>
-              <a:t>Какие же есть преимущества у </a:t>
-            </a:r>
-            <a:r>
-              <a:rPr lang="en-US" dirty="0"/>
-              <a:t>DLL?</a:t>
+              <a:t>Перед тем как двигаться дальше рассмотрим как происходит линковка исполняемого файла и </a:t>
+            </a:r>
+            <a:r>
+              <a:rPr lang="en-US" dirty="0"/>
+              <a:t>DLL.</a:t>
             </a:r>
           </a:p>
           <a:p>
@@ -5500,35 +5537,48 @@
           <a:p>
             <a:r>
               <a:rPr lang="ru-RU" dirty="0"/>
-              <a:t>Во-первых это упрощение системных обновлений. Благодаря тому что динамические библиотеки отвязаны от исполняемых файлов, при исправлении бага в библиотеке достаточно обновить только её файл и не модифицировать зависимые от неё исполняемые файлы. Благодаря этому регулярные апдейты Убунты занимают несколько МБ вместо десятков МБ.</a:t>
-            </a:r>
-            <a:endParaRPr lang="en-US" dirty="0"/>
-          </a:p>
-          <a:p>
-            <a:endParaRPr lang="en-US" dirty="0"/>
-          </a:p>
-          <a:p>
-            <a:r>
-              <a:rPr lang="ru-RU" dirty="0"/>
-              <a:t>Кроме того библиотеки экономят пространство оперативной памяти, т.к. один и тот же файл библиотеки шарится несколькими процессами.</a:t>
-            </a:r>
-            <a:endParaRPr lang="en-US" dirty="0"/>
-          </a:p>
-          <a:p>
-            <a:endParaRPr lang="en-US" dirty="0"/>
-          </a:p>
-          <a:p>
-            <a:r>
-              <a:rPr lang="ru-RU" dirty="0"/>
-              <a:t>В частности третий сценарий используется библиотекой </a:t>
-            </a:r>
-            <a:r>
-              <a:rPr lang="en-US" dirty="0"/>
-              <a:t>Intel MKL </a:t>
-            </a:r>
-            <a:r>
-              <a:rPr lang="ru-RU" dirty="0"/>
-              <a:t>для загрузки реализации, которая наиболее полно использует возможности доступного процессора.</a:t>
+              <a:t>Есть два основных способа</a:t>
+            </a:r>
+            <a:r>
+              <a:rPr lang="en-US" dirty="0"/>
+              <a:t>: </a:t>
+            </a:r>
+            <a:r>
+              <a:rPr lang="ru-RU" dirty="0"/>
+              <a:t>традиционный, при котором связывание происходит на этапе линковки</a:t>
+            </a:r>
+            <a:r>
+              <a:rPr lang="en-US" dirty="0"/>
+              <a:t> (</a:t>
+            </a:r>
+            <a:r>
+              <a:rPr lang="ru-RU" dirty="0"/>
+              <a:t>т.е. мы явно указываем при сборке что потребуется загрузить ту или иную </a:t>
+            </a:r>
+            <a:r>
+              <a:rPr lang="en-US" dirty="0"/>
+              <a:t>DLL)</a:t>
+            </a:r>
+            <a:r>
+              <a:rPr lang="ru-RU" dirty="0"/>
+              <a:t>, и связывание на этапе исполнения (когда мы явно подгружаем библиотеку в уже запущенный процесс</a:t>
+            </a:r>
+            <a:r>
+              <a:rPr lang="en-US" dirty="0"/>
+              <a:t> </a:t>
+            </a:r>
+            <a:r>
+              <a:rPr lang="ru-RU" dirty="0"/>
+              <a:t>в произвольный момент исполнения программы).</a:t>
+            </a:r>
+          </a:p>
+          <a:p>
+            <a:endParaRPr lang="ru-RU" dirty="0"/>
+          </a:p>
+          <a:p>
+            <a:r>
+              <a:rPr lang="ru-RU" dirty="0"/>
+              <a:t>Зачем нужен второй способ и какие дополнительные возможности он предоставляет скоро обсудим.</a:t>
             </a:r>
             <a:endParaRPr lang="en-US" dirty="0"/>
           </a:p>
@@ -5560,7 +5610,7 @@
     </p:spTree>
     <p:extLst>
       <p:ext uri="{BB962C8B-B14F-4D97-AF65-F5344CB8AC3E}">
-        <p14:creationId xmlns:p14="http://schemas.microsoft.com/office/powerpoint/2010/main" val="2795593978"/>
+        <p14:creationId xmlns:p14="http://schemas.microsoft.com/office/powerpoint/2010/main" val="1120511098"/>
       </p:ext>
     </p:extLst>
   </p:cSld>
@@ -5615,46 +5665,49 @@
           <a:lstStyle/>
           <a:p>
             <a:r>
-              <a:rPr lang="en-US" dirty="0"/>
-              <a:t>DLL </a:t>
-            </a:r>
-            <a:r>
-              <a:rPr lang="ru-RU" dirty="0"/>
-              <a:t>не</a:t>
-            </a:r>
-            <a:r>
-              <a:rPr lang="en-US" dirty="0"/>
-              <a:t> </a:t>
-            </a:r>
-            <a:r>
-              <a:rPr lang="ru-RU" dirty="0"/>
-              <a:t>свободны от недостатков. К ним относятся прежде всего накладные расходы при загрузке библиотек и их использовании.</a:t>
-            </a:r>
+              <a:rPr lang="ru-RU" dirty="0"/>
+              <a:t>Какие же есть преимущества у </a:t>
+            </a:r>
+            <a:r>
+              <a:rPr lang="en-US" dirty="0"/>
+              <a:t>DLL?</a:t>
+            </a:r>
+          </a:p>
+          <a:p>
             <a:endParaRPr lang="en-US" dirty="0"/>
           </a:p>
           <a:p>
+            <a:r>
+              <a:rPr lang="ru-RU" dirty="0"/>
+              <a:t>Во-первых это упрощение системных обновлений. Благодаря тому что динамические библиотеки отвязаны от исполняемых файлов, при исправлении бага в библиотеке достаточно обновить только её файл и не модифицировать зависимые от неё исполняемые файлы. Благодаря этому регулярные апдейты Убунты занимают несколько МБ вместо десятков МБ.</a:t>
+            </a:r>
             <a:endParaRPr lang="en-US" dirty="0"/>
           </a:p>
           <a:p>
-            <a:r>
-              <a:rPr lang="ru-RU" dirty="0"/>
-              <a:t>Также важным является то, что инфраструктура </a:t>
-            </a:r>
-            <a:r>
-              <a:rPr lang="en-US" dirty="0"/>
-              <a:t>DLL </a:t>
-            </a:r>
-            <a:r>
-              <a:rPr lang="ru-RU" dirty="0"/>
-              <a:t>гораздо более уязвима к неправильному использованию. Например если при очередном обновлении автор случайно изменит интерфейс библиотеки несовместимым образом, то он сломает все зависимые от неё исполняемые файлы (в пределе всю систему). Это было большой проблемой в старых версиях </a:t>
-            </a:r>
-            <a:r>
-              <a:rPr lang="en-US" dirty="0"/>
-              <a:t>Windows, </a:t>
-            </a:r>
-            <a:r>
-              <a:rPr lang="ru-RU" dirty="0"/>
-              <a:t>в которых отсутствовал контроль над установкой несовместимых версий библиотек в системные папки.</a:t>
+            <a:endParaRPr lang="en-US" dirty="0"/>
+          </a:p>
+          <a:p>
+            <a:r>
+              <a:rPr lang="ru-RU" dirty="0"/>
+              <a:t>Кроме того библиотеки экономят пространство оперативной памяти, т.к. один и тот же файл библиотеки шарится несколькими процессами.</a:t>
+            </a:r>
+            <a:endParaRPr lang="en-US" dirty="0"/>
+          </a:p>
+          <a:p>
+            <a:endParaRPr lang="en-US" dirty="0"/>
+          </a:p>
+          <a:p>
+            <a:r>
+              <a:rPr lang="ru-RU" dirty="0"/>
+              <a:t>В частности третий сценарий используется библиотекой </a:t>
+            </a:r>
+            <a:r>
+              <a:rPr lang="en-US" dirty="0"/>
+              <a:t>Intel MKL </a:t>
+            </a:r>
+            <a:r>
+              <a:rPr lang="ru-RU" dirty="0"/>
+              <a:t>для загрузки реализации, которая наиболее полно использует возможности доступного процессора.</a:t>
             </a:r>
             <a:endParaRPr lang="en-US" dirty="0"/>
           </a:p>
@@ -5686,7 +5739,7 @@
     </p:spTree>
     <p:extLst>
       <p:ext uri="{BB962C8B-B14F-4D97-AF65-F5344CB8AC3E}">
-        <p14:creationId xmlns:p14="http://schemas.microsoft.com/office/powerpoint/2010/main" val="2984619290"/>
+        <p14:creationId xmlns:p14="http://schemas.microsoft.com/office/powerpoint/2010/main" val="2795593978"/>
       </p:ext>
     </p:extLst>
   </p:cSld>
@@ -5741,62 +5794,46 @@
           <a:lstStyle/>
           <a:p>
             <a:r>
-              <a:rPr lang="ru-RU" dirty="0"/>
-              <a:t>Перед тем как двигаться дальше рассмотрим как происходит линковка исполняемого файла и </a:t>
-            </a:r>
-            <a:r>
-              <a:rPr lang="en-US" dirty="0"/>
-              <a:t>DLL.</a:t>
-            </a:r>
-          </a:p>
-          <a:p>
+              <a:rPr lang="en-US" dirty="0"/>
+              <a:t>DLL </a:t>
+            </a:r>
+            <a:r>
+              <a:rPr lang="ru-RU" dirty="0"/>
+              <a:t>не</a:t>
+            </a:r>
+            <a:r>
+              <a:rPr lang="en-US" dirty="0"/>
+              <a:t> </a:t>
+            </a:r>
+            <a:r>
+              <a:rPr lang="ru-RU" dirty="0"/>
+              <a:t>свободны от недостатков. К ним относятся прежде всего накладные расходы при загрузке библиотек и их использовании.</a:t>
+            </a:r>
             <a:endParaRPr lang="en-US" dirty="0"/>
           </a:p>
           <a:p>
-            <a:r>
-              <a:rPr lang="ru-RU" dirty="0"/>
-              <a:t>Есть два основных способа</a:t>
-            </a:r>
-            <a:r>
-              <a:rPr lang="en-US" dirty="0"/>
-              <a:t>: </a:t>
-            </a:r>
-            <a:r>
-              <a:rPr lang="ru-RU" dirty="0"/>
-              <a:t>традиционный, при котором связывание происходит на этапе линковки</a:t>
-            </a:r>
-            <a:r>
-              <a:rPr lang="en-US" dirty="0"/>
-              <a:t> (</a:t>
-            </a:r>
-            <a:r>
-              <a:rPr lang="ru-RU" dirty="0"/>
-              <a:t>т.е. мы явно указываем при сборке что потребуется загрузить ту или иную </a:t>
-            </a:r>
-            <a:r>
-              <a:rPr lang="en-US" dirty="0"/>
-              <a:t>DLL)</a:t>
-            </a:r>
-            <a:r>
-              <a:rPr lang="ru-RU" dirty="0"/>
-              <a:t>, и связывание на этапе исполнения (когда мы явно подгружаем библиотеку в уже запущенный процесс</a:t>
-            </a:r>
-            <a:r>
-              <a:rPr lang="en-US" dirty="0"/>
-              <a:t> </a:t>
-            </a:r>
-            <a:r>
-              <a:rPr lang="ru-RU" dirty="0"/>
-              <a:t>в произвольный момент исполнения программы).</a:t>
-            </a:r>
-          </a:p>
-          <a:p>
-            <a:endParaRPr lang="ru-RU" dirty="0"/>
-          </a:p>
-          <a:p>
-            <a:r>
-              <a:rPr lang="ru-RU" dirty="0"/>
-              <a:t>Зачем нужен второй способ и какие дополнительные возможности он предоставляет скоро обсудим.</a:t>
+            <a:endParaRPr lang="en-US" dirty="0"/>
+          </a:p>
+          <a:p>
+            <a:r>
+              <a:rPr lang="ru-RU" dirty="0"/>
+              <a:t>Также важным является то, что инфраструктура </a:t>
+            </a:r>
+            <a:r>
+              <a:rPr lang="en-US" dirty="0"/>
+              <a:t>DLL </a:t>
+            </a:r>
+            <a:r>
+              <a:rPr lang="ru-RU" dirty="0"/>
+              <a:t>гораздо более уязвима к неправильному использованию. Например если при очередном обновлении автор случайно изменит интерфейс библиотеки несовместимым образом, то он сломает все зависимые от неё исполняемые файлы (в пределе всю систему). Это было большой проблемой в старых версиях </a:t>
+            </a:r>
+            <a:r>
+              <a:rPr lang="en-US" dirty="0"/>
+              <a:t>Windows, </a:t>
+            </a:r>
+            <a:r>
+              <a:rPr lang="ru-RU" dirty="0"/>
+              <a:t>в которых отсутствовал контроль над установкой несовместимых версий библиотек в системные папки.</a:t>
             </a:r>
             <a:endParaRPr lang="en-US" dirty="0"/>
           </a:p>
@@ -5828,7 +5865,7 @@
     </p:spTree>
     <p:extLst>
       <p:ext uri="{BB962C8B-B14F-4D97-AF65-F5344CB8AC3E}">
-        <p14:creationId xmlns:p14="http://schemas.microsoft.com/office/powerpoint/2010/main" val="1120511098"/>
+        <p14:creationId xmlns:p14="http://schemas.microsoft.com/office/powerpoint/2010/main" val="2984619290"/>
       </p:ext>
     </p:extLst>
   </p:cSld>
@@ -6110,7 +6147,7 @@
           <a:p>
             <a:fld id="{83D30A23-1FB6-43A1-891F-95145083C4E9}" type="datetime1">
               <a:rPr lang="en-US" smtClean="0"/>
-              <a:t>4/7/2024</a:t>
+              <a:t>4/14/2024</a:t>
             </a:fld>
             <a:endParaRPr lang="en-US"/>
           </a:p>
@@ -6308,7 +6345,7 @@
           <a:p>
             <a:fld id="{A4B03399-60D8-4226-8AC7-3F159D57E860}" type="datetime1">
               <a:rPr lang="en-US" smtClean="0"/>
-              <a:t>4/7/2024</a:t>
+              <a:t>4/14/2024</a:t>
             </a:fld>
             <a:endParaRPr lang="en-US"/>
           </a:p>
@@ -6516,7 +6553,7 @@
           <a:p>
             <a:fld id="{1A646459-A066-416D-8E21-9D451FB1CBED}" type="datetime1">
               <a:rPr lang="en-US" smtClean="0"/>
-              <a:t>4/7/2024</a:t>
+              <a:t>4/14/2024</a:t>
             </a:fld>
             <a:endParaRPr lang="en-US"/>
           </a:p>
@@ -6714,7 +6751,7 @@
           <a:p>
             <a:fld id="{0636B939-1A2A-498F-9013-EEF28820D750}" type="datetime1">
               <a:rPr lang="en-US" smtClean="0"/>
-              <a:t>4/7/2024</a:t>
+              <a:t>4/14/2024</a:t>
             </a:fld>
             <a:endParaRPr lang="en-US"/>
           </a:p>
@@ -7028,7 +7065,7 @@
           <a:p>
             <a:fld id="{97D3760A-E884-42F2-A44C-F32FAA030BF6}" type="datetime1">
               <a:rPr lang="en-US" smtClean="0"/>
-              <a:t>4/7/2024</a:t>
+              <a:t>4/14/2024</a:t>
             </a:fld>
             <a:endParaRPr lang="en-US"/>
           </a:p>
@@ -7293,7 +7330,7 @@
           <a:p>
             <a:fld id="{4FC7535E-ABF1-4A69-B09E-251EF8B13143}" type="datetime1">
               <a:rPr lang="en-US" smtClean="0"/>
-              <a:t>4/7/2024</a:t>
+              <a:t>4/14/2024</a:t>
             </a:fld>
             <a:endParaRPr lang="en-US"/>
           </a:p>
@@ -7705,7 +7742,7 @@
           <a:p>
             <a:fld id="{CE54BCFC-68A7-4C68-9600-D4AAA16CF9A6}" type="datetime1">
               <a:rPr lang="en-US" smtClean="0"/>
-              <a:t>4/7/2024</a:t>
+              <a:t>4/14/2024</a:t>
             </a:fld>
             <a:endParaRPr lang="en-US"/>
           </a:p>
@@ -7846,7 +7883,7 @@
           <a:p>
             <a:fld id="{0F981744-C4F3-4F58-9E0E-AF6C4E78D03B}" type="datetime1">
               <a:rPr lang="en-US" smtClean="0"/>
-              <a:t>4/7/2024</a:t>
+              <a:t>4/14/2024</a:t>
             </a:fld>
             <a:endParaRPr lang="en-US"/>
           </a:p>
@@ -7959,7 +7996,7 @@
           <a:p>
             <a:fld id="{98ED47E1-EA96-4683-9629-E838295B20BC}" type="datetime1">
               <a:rPr lang="en-US" smtClean="0"/>
-              <a:t>4/7/2024</a:t>
+              <a:t>4/14/2024</a:t>
             </a:fld>
             <a:endParaRPr lang="en-US"/>
           </a:p>
@@ -8270,7 +8307,7 @@
           <a:p>
             <a:fld id="{2F2A1627-B435-455B-A0CA-0808E5748D61}" type="datetime1">
               <a:rPr lang="en-US" smtClean="0"/>
-              <a:t>4/7/2024</a:t>
+              <a:t>4/14/2024</a:t>
             </a:fld>
             <a:endParaRPr lang="en-US"/>
           </a:p>
@@ -8558,7 +8595,7 @@
           <a:p>
             <a:fld id="{FE11CB43-EB9E-4C41-ACD2-0EC61FB429F2}" type="datetime1">
               <a:rPr lang="en-US" smtClean="0"/>
-              <a:t>4/7/2024</a:t>
+              <a:t>4/14/2024</a:t>
             </a:fld>
             <a:endParaRPr lang="en-US"/>
           </a:p>
@@ -8799,7 +8836,7 @@
           <a:p>
             <a:fld id="{CC0B8F92-0932-40E4-878B-3E2E4AAA6810}" type="datetime1">
               <a:rPr lang="en-US" smtClean="0"/>
-              <a:t>4/7/2024</a:t>
+              <a:t>4/14/2024</a:t>
             </a:fld>
             <a:endParaRPr lang="en-US"/>
           </a:p>
@@ -10861,13 +10898,15 @@
               </a:ext>
             </a:extLst>
           </p:cNvPr>
-          <p:cNvCxnSpPr/>
+          <p:cNvCxnSpPr>
+            <a:cxnSpLocks/>
+          </p:cNvCxnSpPr>
           <p:nvPr/>
         </p:nvCxnSpPr>
         <p:spPr>
           <a:xfrm>
-            <a:off x="3015343" y="3265714"/>
-            <a:ext cx="2710543" cy="250372"/>
+            <a:off x="2917376" y="3251944"/>
+            <a:ext cx="2808510" cy="264142"/>
           </a:xfrm>
           <a:prstGeom prst="straightConnector1">
             <a:avLst/>
@@ -11459,13 +11498,15 @@
               </a:ext>
             </a:extLst>
           </p:cNvPr>
-          <p:cNvCxnSpPr/>
+          <p:cNvCxnSpPr>
+            <a:cxnSpLocks/>
+          </p:cNvCxnSpPr>
           <p:nvPr/>
         </p:nvCxnSpPr>
         <p:spPr>
           <a:xfrm>
-            <a:off x="3015343" y="3265714"/>
-            <a:ext cx="2710543" cy="250372"/>
+            <a:off x="2917376" y="3290599"/>
+            <a:ext cx="2808510" cy="225487"/>
           </a:xfrm>
           <a:prstGeom prst="straightConnector1">
             <a:avLst/>
@@ -12440,7 +12481,7 @@
     </p:spTree>
     <p:extLst>
       <p:ext uri="{BB962C8B-B14F-4D97-AF65-F5344CB8AC3E}">
-        <p14:creationId xmlns:p14="http://schemas.microsoft.com/office/powerpoint/2010/main" val="4242767350"/>
+        <p14:creationId xmlns:p14="http://schemas.microsoft.com/office/powerpoint/2010/main" val="3190744035"/>
       </p:ext>
     </p:extLst>
   </p:cSld>
@@ -12583,7 +12624,7 @@
             <a:pPr lvl="1"/>
             <a:r>
               <a:rPr lang="ru-RU" dirty="0"/>
-              <a:t>Грузит в память файлы программы и импортируемых библиотек</a:t>
+              <a:t>Размещает в память файлы программы и импортируемых библиотек</a:t>
             </a:r>
           </a:p>
           <a:p>
@@ -14179,7 +14220,7 @@
             </a:r>
             <a:r>
               <a:rPr lang="ru-RU" dirty="0"/>
-              <a:t>различается</a:t>
+              <a:t>различаются</a:t>
             </a:r>
             <a:endParaRPr lang="en-US" dirty="0"/>
           </a:p>
@@ -14266,7 +14307,7 @@
         <p:spPr/>
         <p:txBody>
           <a:bodyPr>
-            <a:normAutofit fontScale="92500" lnSpcReduction="20000"/>
+            <a:normAutofit fontScale="92500" lnSpcReduction="10000"/>
           </a:bodyPr>
           <a:lstStyle/>
           <a:p>
@@ -14310,7 +14351,7 @@
             </a:r>
             <a:r>
               <a:rPr lang="en-US" dirty="0"/>
-              <a:t>Program Counter</a:t>
+              <a:t>Program Counter:</a:t>
             </a:r>
           </a:p>
           <a:p>
@@ -14331,15 +14372,18 @@
               <a:rPr lang="ru-RU" dirty="0"/>
               <a:t>Данные по-прежнему нужно релоцировать</a:t>
             </a:r>
-            <a:endParaRPr lang="en-US" dirty="0"/>
-          </a:p>
-          <a:p>
-            <a:pPr lvl="1"/>
-            <a:r>
-              <a:rPr lang="ru-RU" dirty="0"/>
-              <a:t>Например в случае</a:t>
-            </a:r>
-            <a:endParaRPr lang="en-US" dirty="0"/>
+            <a:r>
+              <a:rPr lang="en-US" dirty="0"/>
+              <a:t> (</a:t>
+            </a:r>
+            <a:r>
+              <a:rPr lang="ru-RU" dirty="0"/>
+              <a:t>но таких релокаций гораздо меньше</a:t>
+            </a:r>
+            <a:r>
+              <a:rPr lang="en-US" dirty="0"/>
+              <a:t>)</a:t>
+            </a:r>
           </a:p>
           <a:p>
             <a:pPr marL="457200" lvl="1" indent="0">
@@ -14382,13 +14426,6 @@
           </a:p>
           <a:p>
             <a:pPr lvl="1"/>
-            <a:r>
-              <a:rPr lang="ru-RU" dirty="0"/>
-              <a:t>Но таких релокаций гораздо меньше</a:t>
-            </a:r>
-          </a:p>
-          <a:p>
-            <a:pPr lvl="1"/>
             <a:endParaRPr lang="en-US" dirty="0"/>
           </a:p>
         </p:txBody>
@@ -14407,7 +14444,7 @@
         </p:nvSpPr>
         <p:spPr>
           <a:xfrm>
-            <a:off x="1600200" y="3244334"/>
+            <a:off x="1600200" y="3407620"/>
             <a:ext cx="3211286" cy="369332"/>
           </a:xfrm>
           <a:prstGeom prst="rect">
@@ -14473,7 +14510,7 @@
         </p:nvSpPr>
         <p:spPr>
           <a:xfrm>
-            <a:off x="6215742" y="3244334"/>
+            <a:off x="6215742" y="3407620"/>
             <a:ext cx="4005943" cy="369332"/>
           </a:xfrm>
           <a:prstGeom prst="rect">
@@ -14542,7 +14579,7 @@
         </p:nvCxnSpPr>
         <p:spPr>
           <a:xfrm>
-            <a:off x="4811486" y="3429000"/>
+            <a:off x="4811486" y="3592286"/>
             <a:ext cx="1153885" cy="0"/>
           </a:xfrm>
           <a:prstGeom prst="straightConnector1">
@@ -14823,14 +14860,14 @@
           <a:p>
             <a:r>
               <a:rPr lang="ru-RU" dirty="0"/>
-              <a:t>В коде могут быть использованы абсолютные адреса</a:t>
+              <a:t>В коде могут использоваться абсолютные адреса</a:t>
             </a:r>
             <a:endParaRPr lang="en-US" dirty="0"/>
           </a:p>
           <a:p>
             <a:r>
               <a:rPr lang="ru-RU" dirty="0"/>
-              <a:t>При загрузке требуется релокация кода</a:t>
+              <a:t>При загрузке требуется релокация</a:t>
             </a:r>
             <a:endParaRPr lang="en-US" dirty="0"/>
           </a:p>
@@ -15622,7 +15659,7 @@
           <a:p>
             <a:r>
               <a:rPr lang="ru-RU" dirty="0"/>
-              <a:t>Поиск соответствия между экспортируемыми символами библиотек и импортируемыми символами исполняемых файлов</a:t>
+              <a:t>Поиск соответствия между экспортируемыми и импортируемыми символами</a:t>
             </a:r>
           </a:p>
           <a:p>
@@ -15867,7 +15904,67 @@
                 <a:latin typeface="Courier New" panose="02070309020205020404" pitchFamily="49" charset="0"/>
                 <a:cs typeface="Courier New" panose="02070309020205020404" pitchFamily="49" charset="0"/>
               </a:rPr>
-              <a:t> main() { printf("%d\n", 1); }</a:t>
+              <a:t> main(</a:t>
+            </a:r>
+            <a:r>
+              <a:rPr lang="fr-FR" sz="1800" dirty="0" err="1">
+                <a:solidFill>
+                  <a:prstClr val="black"/>
+                </a:solidFill>
+                <a:latin typeface="Courier New" panose="02070309020205020404" pitchFamily="49" charset="0"/>
+                <a:cs typeface="Courier New" panose="02070309020205020404" pitchFamily="49" charset="0"/>
+              </a:rPr>
+              <a:t>int</a:t>
+            </a:r>
+            <a:r>
+              <a:rPr lang="fr-FR" sz="1800" dirty="0">
+                <a:solidFill>
+                  <a:prstClr val="black"/>
+                </a:solidFill>
+                <a:latin typeface="Courier New" panose="02070309020205020404" pitchFamily="49" charset="0"/>
+                <a:cs typeface="Courier New" panose="02070309020205020404" pitchFamily="49" charset="0"/>
+              </a:rPr>
+              <a:t> </a:t>
+            </a:r>
+            <a:r>
+              <a:rPr lang="fr-FR" sz="1800" dirty="0" err="1">
+                <a:solidFill>
+                  <a:prstClr val="black"/>
+                </a:solidFill>
+                <a:latin typeface="Courier New" panose="02070309020205020404" pitchFamily="49" charset="0"/>
+                <a:cs typeface="Courier New" panose="02070309020205020404" pitchFamily="49" charset="0"/>
+              </a:rPr>
+              <a:t>argc</a:t>
+            </a:r>
+            <a:r>
+              <a:rPr lang="fr-FR" sz="1800" dirty="0">
+                <a:solidFill>
+                  <a:prstClr val="black"/>
+                </a:solidFill>
+                <a:latin typeface="Courier New" panose="02070309020205020404" pitchFamily="49" charset="0"/>
+                <a:cs typeface="Courier New" panose="02070309020205020404" pitchFamily="49" charset="0"/>
+              </a:rPr>
+              <a:t>) { printf("%d\n", </a:t>
+            </a:r>
+            <a:r>
+              <a:rPr lang="fr-FR" sz="1800" dirty="0" err="1">
+                <a:solidFill>
+                  <a:prstClr val="black"/>
+                </a:solidFill>
+                <a:latin typeface="Courier New" panose="02070309020205020404" pitchFamily="49" charset="0"/>
+                <a:cs typeface="Courier New" panose="02070309020205020404" pitchFamily="49" charset="0"/>
+              </a:rPr>
+              <a:t>argc</a:t>
+            </a:r>
+            <a:r>
+              <a:rPr lang="fr-FR" sz="1800" dirty="0">
+                <a:solidFill>
+                  <a:prstClr val="black"/>
+                </a:solidFill>
+                <a:latin typeface="Courier New" panose="02070309020205020404" pitchFamily="49" charset="0"/>
+                <a:cs typeface="Courier New" panose="02070309020205020404" pitchFamily="49" charset="0"/>
+              </a:rPr>
+              <a:t>); }</a:t>
             </a:r>
           </a:p>
           <a:p>
@@ -17617,7 +17714,7 @@
           <a:p>
             <a:r>
               <a:rPr lang="ru-RU" dirty="0"/>
-              <a:t>Их загрузка замедлит работу приложения даже если не будут использоваться</a:t>
+              <a:t>Их загрузка замедлит работу приложения даже если они не будут использоваться</a:t>
             </a:r>
           </a:p>
           <a:p>
@@ -18120,16 +18217,6 @@
           <a:p>
             <a:r>
               <a:rPr lang="ru-RU" dirty="0"/>
-              <a:t>Поддерживает большое количество платформ (</a:t>
-            </a:r>
-            <a:r>
-              <a:rPr lang="en-US" dirty="0"/>
-              <a:t>x86, ARM, AArch64, RISC-V, e2k, etc.)</a:t>
-            </a:r>
-          </a:p>
-          <a:p>
-            <a:r>
-              <a:rPr lang="ru-RU" dirty="0"/>
               <a:t>Реализована с помощью </a:t>
             </a:r>
             <a:r>
@@ -18155,6 +18242,35 @@
             <a:r>
               <a:rPr lang="en-US" dirty="0"/>
               <a:t>)</a:t>
+            </a:r>
+          </a:p>
+          <a:p>
+            <a:r>
+              <a:rPr lang="ru-RU" dirty="0"/>
+              <a:t>Поддерживает большое количество платформ</a:t>
+            </a:r>
+            <a:endParaRPr lang="en-US" dirty="0"/>
+          </a:p>
+          <a:p>
+            <a:pPr lvl="1"/>
+            <a:r>
+              <a:rPr lang="en-US" dirty="0"/>
+              <a:t>x86, ARM, AArch64, RISC-V, e2k, etc.</a:t>
+            </a:r>
+          </a:p>
+          <a:p>
+            <a:pPr lvl="1"/>
+            <a:r>
+              <a:rPr lang="en-US" dirty="0"/>
+              <a:t>Linux (+ </a:t>
+            </a:r>
+            <a:r>
+              <a:rPr lang="ru-RU" dirty="0"/>
+              <a:t>частично </a:t>
+            </a:r>
+            <a:r>
+              <a:rPr lang="en-US" dirty="0"/>
+              <a:t>BSD)</a:t>
             </a:r>
           </a:p>
         </p:txBody>
@@ -18311,7 +18427,33 @@
                 <a:latin typeface="Courier New" panose="02070309020205020404" pitchFamily="49" charset="0"/>
                 <a:cs typeface="Courier New" panose="02070309020205020404" pitchFamily="49" charset="0"/>
               </a:rPr>
-              <a:t>int foo(type1 arg1, type2 arg2, …) {</a:t>
+              <a:t>int foo(type1 arg1, type2 arg2, …) {  # Stub</a:t>
+            </a:r>
+          </a:p>
+          <a:p>
+            <a:pPr marL="457200" lvl="1" indent="0">
+              <a:buNone/>
+            </a:pPr>
+            <a:r>
+              <a:rPr lang="en-US" dirty="0">
+                <a:latin typeface="Courier New" panose="02070309020205020404" pitchFamily="49" charset="0"/>
+                <a:cs typeface="Courier New" panose="02070309020205020404" pitchFamily="49" charset="0"/>
+              </a:rPr>
+              <a:t>  static void *</a:t>
+            </a:r>
+            <a:r>
+              <a:rPr lang="en-US" dirty="0" err="1">
+                <a:latin typeface="Courier New" panose="02070309020205020404" pitchFamily="49" charset="0"/>
+                <a:cs typeface="Courier New" panose="02070309020205020404" pitchFamily="49" charset="0"/>
+              </a:rPr>
+              <a:t>foo_real</a:t>
+            </a:r>
+            <a:r>
+              <a:rPr lang="en-US" dirty="0">
+                <a:latin typeface="Courier New" panose="02070309020205020404" pitchFamily="49" charset="0"/>
+                <a:cs typeface="Courier New" panose="02070309020205020404" pitchFamily="49" charset="0"/>
+              </a:rPr>
+              <a:t> = NULL;</a:t>
             </a:r>
           </a:p>
           <a:p>
@@ -18330,14 +18472,40 @@
                 <a:latin typeface="Courier New" panose="02070309020205020404" pitchFamily="49" charset="0"/>
                 <a:cs typeface="Courier New" panose="02070309020205020404" pitchFamily="49" charset="0"/>
               </a:rPr>
-              <a:t>isLibraryLoaded</a:t>
+              <a:t>foo_real</a:t>
             </a:r>
             <a:r>
               <a:rPr lang="en-US" dirty="0">
                 <a:latin typeface="Courier New" panose="02070309020205020404" pitchFamily="49" charset="0"/>
                 <a:cs typeface="Courier New" panose="02070309020205020404" pitchFamily="49" charset="0"/>
               </a:rPr>
-              <a:t>()) {</a:t>
+              <a:t>) {</a:t>
+            </a:r>
+          </a:p>
+          <a:p>
+            <a:pPr marL="457200" lvl="1" indent="0">
+              <a:buNone/>
+            </a:pPr>
+            <a:r>
+              <a:rPr lang="en-US" dirty="0">
+                <a:latin typeface="Courier New" panose="02070309020205020404" pitchFamily="49" charset="0"/>
+                <a:cs typeface="Courier New" panose="02070309020205020404" pitchFamily="49" charset="0"/>
+              </a:rPr>
+              <a:t>    void *handle = </a:t>
+            </a:r>
+            <a:r>
+              <a:rPr lang="en-US" dirty="0" err="1">
+                <a:latin typeface="Courier New" panose="02070309020205020404" pitchFamily="49" charset="0"/>
+                <a:cs typeface="Courier New" panose="02070309020205020404" pitchFamily="49" charset="0"/>
+              </a:rPr>
+              <a:t>dlopen</a:t>
+            </a:r>
+            <a:r>
+              <a:rPr lang="en-US" dirty="0">
+                <a:latin typeface="Courier New" panose="02070309020205020404" pitchFamily="49" charset="0"/>
+                <a:cs typeface="Courier New" panose="02070309020205020404" pitchFamily="49" charset="0"/>
+              </a:rPr>
+              <a:t>(...);</a:t>
             </a:r>
           </a:p>
           <a:p>
@@ -18356,32 +18524,6 @@
                 <a:latin typeface="Courier New" panose="02070309020205020404" pitchFamily="49" charset="0"/>
                 <a:cs typeface="Courier New" panose="02070309020205020404" pitchFamily="49" charset="0"/>
               </a:rPr>
-              <a:t>LoadLibrary</a:t>
-            </a:r>
-            <a:r>
-              <a:rPr lang="en-US" dirty="0">
-                <a:latin typeface="Courier New" panose="02070309020205020404" pitchFamily="49" charset="0"/>
-                <a:cs typeface="Courier New" panose="02070309020205020404" pitchFamily="49" charset="0"/>
-              </a:rPr>
-              <a:t>();</a:t>
-            </a:r>
-          </a:p>
-          <a:p>
-            <a:pPr marL="457200" lvl="1" indent="0">
-              <a:buNone/>
-            </a:pPr>
-            <a:r>
-              <a:rPr lang="en-US" dirty="0">
-                <a:latin typeface="Courier New" panose="02070309020205020404" pitchFamily="49" charset="0"/>
-                <a:cs typeface="Courier New" panose="02070309020205020404" pitchFamily="49" charset="0"/>
-              </a:rPr>
-              <a:t>    </a:t>
-            </a:r>
-            <a:r>
-              <a:rPr lang="en-US" dirty="0" err="1">
-                <a:latin typeface="Courier New" panose="02070309020205020404" pitchFamily="49" charset="0"/>
-                <a:cs typeface="Courier New" panose="02070309020205020404" pitchFamily="49" charset="0"/>
-              </a:rPr>
               <a:t>foo_real</a:t>
             </a:r>
             <a:r>
@@ -18396,14 +18538,14 @@
                 <a:latin typeface="Courier New" panose="02070309020205020404" pitchFamily="49" charset="0"/>
                 <a:cs typeface="Courier New" panose="02070309020205020404" pitchFamily="49" charset="0"/>
               </a:rPr>
-              <a:t>LoadSymbol</a:t>
+              <a:t>dlsym</a:t>
             </a:r>
             <a:r>
               <a:rPr lang="en-US" dirty="0">
                 <a:latin typeface="Courier New" panose="02070309020205020404" pitchFamily="49" charset="0"/>
                 <a:cs typeface="Courier New" panose="02070309020205020404" pitchFamily="49" charset="0"/>
               </a:rPr>
-              <a:t>();</a:t>
+              <a:t>(handle, “foo”);</a:t>
             </a:r>
           </a:p>
           <a:p>
@@ -19280,7 +19422,7 @@
             </a:r>
             <a:r>
               <a:rPr lang="en-US" dirty="0"/>
-              <a:t>,--hash-style </a:t>
+              <a:t>,--hash-style=both </a:t>
             </a:r>
             <a:r>
               <a:rPr lang="ru-RU" dirty="0"/>
@@ -20190,7 +20332,7 @@
           <a:p>
             <a:r>
               <a:rPr lang="ru-RU" dirty="0"/>
-              <a:t>Проблемы с экспортируемыми символами</a:t>
+              <a:t>Проблема с экспортируемыми символами</a:t>
             </a:r>
             <a:endParaRPr lang="en-US" dirty="0"/>
           </a:p>
@@ -20227,7 +20369,7 @@
             </a:r>
             <a:r>
               <a:rPr lang="ru-RU" dirty="0"/>
-              <a:t>все функции библиотеки экспортируются</a:t>
+              <a:t>все функции в библиотеках экспортируются</a:t>
             </a:r>
           </a:p>
           <a:p>
@@ -20240,11 +20382,11 @@
           <a:p>
             <a:r>
               <a:rPr lang="ru-RU" dirty="0"/>
-              <a:t>Из-за возможного перехвата функций вызов внутренних функций библиотеки происходит через таблицу адресов</a:t>
-            </a:r>
-            <a:r>
-              <a:rPr lang="en-US" dirty="0"/>
-              <a:t> GOT</a:t>
+              <a:t>Из-за возможного перехвата функций вызов функций внутри библиотеки происходит через таблицу </a:t>
+            </a:r>
+            <a:r>
+              <a:rPr lang="en-US" dirty="0"/>
+              <a:t>GOT</a:t>
             </a:r>
           </a:p>
           <a:p>
@@ -20366,7 +20508,7 @@
         <p:spPr/>
         <p:txBody>
           <a:bodyPr>
-            <a:normAutofit/>
+            <a:normAutofit lnSpcReduction="10000"/>
           </a:bodyPr>
           <a:lstStyle/>
           <a:p>
@@ -20375,6 +20517,15 @@
               <a:t>Компилятор не встраивает вызов функции из-за возможности перехвата</a:t>
             </a:r>
             <a:endParaRPr lang="en-US" dirty="0"/>
+          </a:p>
+          <a:p>
+            <a:pPr marL="457200" lvl="1" indent="0">
+              <a:buNone/>
+            </a:pPr>
+            <a:endParaRPr lang="ru-RU" dirty="0">
+              <a:latin typeface="Courier New" panose="02070309020205020404" pitchFamily="49" charset="0"/>
+              <a:cs typeface="Courier New" panose="02070309020205020404" pitchFamily="49" charset="0"/>
+            </a:endParaRPr>
           </a:p>
           <a:p>
             <a:pPr marL="457200" lvl="1" indent="0">
@@ -20392,7 +20543,7 @@
                 <a:latin typeface="Courier New" panose="02070309020205020404" pitchFamily="49" charset="0"/>
                 <a:cs typeface="Courier New" panose="02070309020205020404" pitchFamily="49" charset="0"/>
               </a:rPr>
-              <a:t>tmp.c</a:t>
+              <a:t>mylib.c</a:t>
             </a:r>
             <a:endParaRPr lang="en-US" dirty="0">
               <a:latin typeface="Courier New" panose="02070309020205020404" pitchFamily="49" charset="0"/>
@@ -20433,6 +20584,18 @@
             <a:pPr marL="457200" lvl="1" indent="0">
               <a:buNone/>
             </a:pPr>
+            <a:endParaRPr lang="ru-RU" dirty="0">
+              <a:solidFill>
+                <a:prstClr val="black"/>
+              </a:solidFill>
+              <a:latin typeface="Courier New" panose="02070309020205020404" pitchFamily="49" charset="0"/>
+              <a:cs typeface="Courier New" panose="02070309020205020404" pitchFamily="49" charset="0"/>
+            </a:endParaRPr>
+          </a:p>
+          <a:p>
+            <a:pPr marL="457200" lvl="1" indent="0">
+              <a:buNone/>
+            </a:pPr>
             <a:r>
               <a:rPr lang="en-US" dirty="0">
                 <a:solidFill>
@@ -20461,7 +20624,27 @@
                 <a:latin typeface="Courier New" panose="02070309020205020404" pitchFamily="49" charset="0"/>
                 <a:cs typeface="Courier New" panose="02070309020205020404" pitchFamily="49" charset="0"/>
               </a:rPr>
-              <a:t> –O3 -</a:t>
+              <a:t> </a:t>
+            </a:r>
+            <a:r>
+              <a:rPr lang="en-US" dirty="0" err="1">
+                <a:solidFill>
+                  <a:prstClr val="black"/>
+                </a:solidFill>
+                <a:latin typeface="Courier New" panose="02070309020205020404" pitchFamily="49" charset="0"/>
+                <a:cs typeface="Courier New" panose="02070309020205020404" pitchFamily="49" charset="0"/>
+              </a:rPr>
+              <a:t>mylib.c</a:t>
+            </a:r>
+            <a:r>
+              <a:rPr lang="en-US" dirty="0">
+                <a:solidFill>
+                  <a:prstClr val="black"/>
+                </a:solidFill>
+                <a:latin typeface="Courier New" panose="02070309020205020404" pitchFamily="49" charset="0"/>
+                <a:cs typeface="Courier New" panose="02070309020205020404" pitchFamily="49" charset="0"/>
+              </a:rPr>
+              <a:t> -O3 -</a:t>
             </a:r>
             <a:r>
               <a:rPr lang="en-US" dirty="0" err="1">
@@ -20481,27 +20664,7 @@
                 <a:latin typeface="Courier New" panose="02070309020205020404" pitchFamily="49" charset="0"/>
                 <a:cs typeface="Courier New" panose="02070309020205020404" pitchFamily="49" charset="0"/>
               </a:rPr>
-              <a:t> -S </a:t>
-            </a:r>
-            <a:r>
-              <a:rPr lang="en-US" dirty="0" err="1">
-                <a:solidFill>
-                  <a:prstClr val="black"/>
-                </a:solidFill>
-                <a:latin typeface="Courier New" panose="02070309020205020404" pitchFamily="49" charset="0"/>
-                <a:cs typeface="Courier New" panose="02070309020205020404" pitchFamily="49" charset="0"/>
-              </a:rPr>
-              <a:t>tmp.c</a:t>
-            </a:r>
-            <a:r>
-              <a:rPr lang="en-US" dirty="0">
-                <a:solidFill>
-                  <a:prstClr val="black"/>
-                </a:solidFill>
-                <a:latin typeface="Courier New" panose="02070309020205020404" pitchFamily="49" charset="0"/>
-                <a:cs typeface="Courier New" panose="02070309020205020404" pitchFamily="49" charset="0"/>
-              </a:rPr>
-              <a:t> -o-</a:t>
+              <a:t> -S -o-</a:t>
             </a:r>
           </a:p>
           <a:p>
@@ -20750,11 +20913,11 @@
             <a:pPr lvl="1"/>
             <a:r>
               <a:rPr lang="ru-RU" dirty="0"/>
-              <a:t>Включена по умолчанию в </a:t>
-            </a:r>
-            <a:r>
-              <a:rPr lang="en-US" dirty="0"/>
-              <a:t>clang, </a:t>
+              <a:t>Включена по умолчанию в С</a:t>
+            </a:r>
+            <a:r>
+              <a:rPr lang="en-US" dirty="0"/>
+              <a:t>lang, </a:t>
             </a:r>
             <a:r>
               <a:rPr lang="ru-RU" dirty="0"/>
@@ -20907,6 +21070,46 @@
             </a:r>
             <a:r>
               <a:rPr lang="en-US" dirty="0" err="1"/>
+              <a:t>Bsymbolic</a:t>
+            </a:r>
+            <a:r>
+              <a:rPr lang="en-US" dirty="0"/>
+              <a:t>-functions </a:t>
+            </a:r>
+            <a:r>
+              <a:rPr lang="ru-RU" dirty="0"/>
+              <a:t>при сборке </a:t>
+            </a:r>
+            <a:r>
+              <a:rPr lang="en-US" dirty="0"/>
+              <a:t>Clang </a:t>
+            </a:r>
+            <a:r>
+              <a:rPr lang="ru-RU" dirty="0"/>
+              <a:t>даёт до </a:t>
+            </a:r>
+            <a:r>
+              <a:rPr lang="en-US" dirty="0"/>
+              <a:t>10% </a:t>
+            </a:r>
+            <a:r>
+              <a:rPr lang="ru-RU" dirty="0"/>
+              <a:t>прироста производительности</a:t>
+            </a:r>
+            <a:endParaRPr lang="en-US" dirty="0"/>
+          </a:p>
+          <a:p>
+            <a:pPr lvl="1"/>
+            <a:r>
+              <a:rPr lang="ru-RU" dirty="0"/>
+              <a:t>Использование </a:t>
+            </a:r>
+            <a:r>
+              <a:rPr lang="en-US" dirty="0"/>
+              <a:t>-</a:t>
+            </a:r>
+            <a:r>
+              <a:rPr lang="en-US" dirty="0" err="1"/>
               <a:t>fno</a:t>
             </a:r>
             <a:r>
@@ -20939,46 +21142,6 @@
               <a:rPr lang="en-US" dirty="0"/>
               <a:t>)</a:t>
             </a:r>
-          </a:p>
-          <a:p>
-            <a:pPr lvl="1"/>
-            <a:r>
-              <a:rPr lang="ru-RU" dirty="0"/>
-              <a:t>Использование </a:t>
-            </a:r>
-            <a:r>
-              <a:rPr lang="en-US" dirty="0"/>
-              <a:t>-</a:t>
-            </a:r>
-            <a:r>
-              <a:rPr lang="en-US" dirty="0" err="1"/>
-              <a:t>Bsymbolic</a:t>
-            </a:r>
-            <a:r>
-              <a:rPr lang="en-US" dirty="0"/>
-              <a:t>-functions </a:t>
-            </a:r>
-            <a:r>
-              <a:rPr lang="ru-RU" dirty="0"/>
-              <a:t>в </a:t>
-            </a:r>
-            <a:r>
-              <a:rPr lang="en-US" dirty="0"/>
-              <a:t>Clang </a:t>
-            </a:r>
-            <a:r>
-              <a:rPr lang="ru-RU" dirty="0"/>
-              <a:t>даёт до </a:t>
-            </a:r>
-            <a:r>
-              <a:rPr lang="en-US" dirty="0"/>
-              <a:t>10% </a:t>
-            </a:r>
-            <a:r>
-              <a:rPr lang="ru-RU" dirty="0"/>
-              <a:t>прироста производительности</a:t>
-            </a:r>
-            <a:endParaRPr lang="en-US" dirty="0"/>
           </a:p>
         </p:txBody>
       </p:sp>
@@ -21506,7 +21669,7 @@
           <a:p>
             <a:r>
               <a:rPr lang="ru-RU" dirty="0"/>
-              <a:t>Избыточные экспорты должны быть удалены</a:t>
+              <a:t>Избыточные экспорты должны быть скрыты</a:t>
             </a:r>
             <a:endParaRPr lang="en-US" dirty="0"/>
           </a:p>
@@ -21985,7 +22148,7 @@
         </p:spPr>
         <p:txBody>
           <a:bodyPr>
-            <a:normAutofit fontScale="92500" lnSpcReduction="10000"/>
+            <a:normAutofit fontScale="92500" lnSpcReduction="20000"/>
           </a:bodyPr>
           <a:lstStyle/>
           <a:p>
@@ -21993,39 +22156,66 @@
               <a:buNone/>
             </a:pPr>
             <a:r>
-              <a:rPr lang="en-US" dirty="0"/>
+              <a:rPr lang="en-US" dirty="0">
+                <a:latin typeface="Courier New" panose="02070309020205020404" pitchFamily="49" charset="0"/>
+                <a:cs typeface="Courier New" panose="02070309020205020404" pitchFamily="49" charset="0"/>
+              </a:rPr>
               <a:t>$ </a:t>
             </a:r>
             <a:r>
-              <a:rPr lang="en-US" dirty="0" err="1"/>
+              <a:rPr lang="en-US" dirty="0" err="1">
+                <a:latin typeface="Courier New" panose="02070309020205020404" pitchFamily="49" charset="0"/>
+                <a:cs typeface="Courier New" panose="02070309020205020404" pitchFamily="49" charset="0"/>
+              </a:rPr>
               <a:t>read_header_api</a:t>
             </a:r>
             <a:r>
-              <a:rPr lang="en-US" dirty="0"/>
+              <a:rPr lang="en-US" dirty="0">
+                <a:latin typeface="Courier New" panose="02070309020205020404" pitchFamily="49" charset="0"/>
+                <a:cs typeface="Courier New" panose="02070309020205020404" pitchFamily="49" charset="0"/>
+              </a:rPr>
               <a:t> --only-</a:t>
             </a:r>
             <a:r>
-              <a:rPr lang="en-US" dirty="0" err="1"/>
+              <a:rPr lang="en-US" dirty="0" err="1">
+                <a:latin typeface="Courier New" panose="02070309020205020404" pitchFamily="49" charset="0"/>
+                <a:cs typeface="Courier New" panose="02070309020205020404" pitchFamily="49" charset="0"/>
+              </a:rPr>
               <a:t>args</a:t>
             </a:r>
             <a:r>
-              <a:rPr lang="en-US" dirty="0"/>
+              <a:rPr lang="en-US" dirty="0">
+                <a:latin typeface="Courier New" panose="02070309020205020404" pitchFamily="49" charset="0"/>
+                <a:cs typeface="Courier New" panose="02070309020205020404" pitchFamily="49" charset="0"/>
+              </a:rPr>
               <a:t> /</a:t>
             </a:r>
             <a:r>
-              <a:rPr lang="en-US" dirty="0" err="1"/>
+              <a:rPr lang="en-US" dirty="0" err="1">
+                <a:latin typeface="Courier New" panose="02070309020205020404" pitchFamily="49" charset="0"/>
+                <a:cs typeface="Courier New" panose="02070309020205020404" pitchFamily="49" charset="0"/>
+              </a:rPr>
               <a:t>usr</a:t>
             </a:r>
             <a:r>
-              <a:rPr lang="en-US" dirty="0"/>
+              <a:rPr lang="en-US" dirty="0">
+                <a:latin typeface="Courier New" panose="02070309020205020404" pitchFamily="49" charset="0"/>
+                <a:cs typeface="Courier New" panose="02070309020205020404" pitchFamily="49" charset="0"/>
+              </a:rPr>
               <a:t>/include/x86_64-linux-gnu/</a:t>
             </a:r>
             <a:r>
-              <a:rPr lang="en-US" dirty="0" err="1"/>
+              <a:rPr lang="en-US" dirty="0" err="1">
+                <a:latin typeface="Courier New" panose="02070309020205020404" pitchFamily="49" charset="0"/>
+                <a:cs typeface="Courier New" panose="02070309020205020404" pitchFamily="49" charset="0"/>
+              </a:rPr>
               <a:t>gmp.h</a:t>
             </a:r>
             <a:r>
-              <a:rPr lang="en-US" dirty="0"/>
+              <a:rPr lang="en-US" dirty="0">
+                <a:latin typeface="Courier New" panose="02070309020205020404" pitchFamily="49" charset="0"/>
+                <a:cs typeface="Courier New" panose="02070309020205020404" pitchFamily="49" charset="0"/>
+              </a:rPr>
               <a:t> &gt; api.txt</a:t>
             </a:r>
           </a:p>
@@ -22033,30 +22223,48 @@
             <a:pPr marL="457200" lvl="1" indent="0">
               <a:buNone/>
             </a:pPr>
-            <a:endParaRPr lang="en-US" dirty="0"/>
+            <a:endParaRPr lang="en-US" dirty="0">
+              <a:latin typeface="Courier New" panose="02070309020205020404" pitchFamily="49" charset="0"/>
+              <a:cs typeface="Courier New" panose="02070309020205020404" pitchFamily="49" charset="0"/>
+            </a:endParaRPr>
           </a:p>
           <a:p>
             <a:pPr marL="457200" lvl="1" indent="0">
               <a:buNone/>
             </a:pPr>
             <a:r>
-              <a:rPr lang="en-US" dirty="0"/>
+              <a:rPr lang="en-US" dirty="0">
+                <a:latin typeface="Courier New" panose="02070309020205020404" pitchFamily="49" charset="0"/>
+                <a:cs typeface="Courier New" panose="02070309020205020404" pitchFamily="49" charset="0"/>
+              </a:rPr>
               <a:t>$ </a:t>
             </a:r>
             <a:r>
-              <a:rPr lang="en-US" dirty="0" err="1"/>
+              <a:rPr lang="en-US" dirty="0" err="1">
+                <a:latin typeface="Courier New" panose="02070309020205020404" pitchFamily="49" charset="0"/>
+                <a:cs typeface="Courier New" panose="02070309020205020404" pitchFamily="49" charset="0"/>
+              </a:rPr>
               <a:t>read_binary_api</a:t>
             </a:r>
             <a:r>
-              <a:rPr lang="en-US" dirty="0"/>
+              <a:rPr lang="en-US" dirty="0">
+                <a:latin typeface="Courier New" panose="02070309020205020404" pitchFamily="49" charset="0"/>
+                <a:cs typeface="Courier New" panose="02070309020205020404" pitchFamily="49" charset="0"/>
+              </a:rPr>
               <a:t> --permissive /</a:t>
             </a:r>
             <a:r>
-              <a:rPr lang="en-US" dirty="0" err="1"/>
+              <a:rPr lang="en-US" dirty="0" err="1">
+                <a:latin typeface="Courier New" panose="02070309020205020404" pitchFamily="49" charset="0"/>
+                <a:cs typeface="Courier New" panose="02070309020205020404" pitchFamily="49" charset="0"/>
+              </a:rPr>
               <a:t>usr</a:t>
             </a:r>
             <a:r>
-              <a:rPr lang="en-US" dirty="0"/>
+              <a:rPr lang="en-US" dirty="0">
+                <a:latin typeface="Courier New" panose="02070309020205020404" pitchFamily="49" charset="0"/>
+                <a:cs typeface="Courier New" panose="02070309020205020404" pitchFamily="49" charset="0"/>
+              </a:rPr>
               <a:t>/lib/x86_64-linux-gnu/libgmp.so.10.4.1 &gt; abi.txt</a:t>
             </a:r>
           </a:p>
@@ -22064,22 +22272,34 @@
             <a:pPr marL="457200" lvl="1" indent="0">
               <a:buNone/>
             </a:pPr>
-            <a:endParaRPr lang="en-US" dirty="0"/>
+            <a:endParaRPr lang="en-US" dirty="0">
+              <a:latin typeface="Courier New" panose="02070309020205020404" pitchFamily="49" charset="0"/>
+              <a:cs typeface="Courier New" panose="02070309020205020404" pitchFamily="49" charset="0"/>
+            </a:endParaRPr>
           </a:p>
           <a:p>
             <a:pPr marL="457200" lvl="1" indent="0">
               <a:buNone/>
             </a:pPr>
             <a:r>
-              <a:rPr lang="en-US" dirty="0"/>
+              <a:rPr lang="en-US" dirty="0">
+                <a:latin typeface="Courier New" panose="02070309020205020404" pitchFamily="49" charset="0"/>
+                <a:cs typeface="Courier New" panose="02070309020205020404" pitchFamily="49" charset="0"/>
+              </a:rPr>
               <a:t>$ diff api.txt abi.txt | </a:t>
             </a:r>
             <a:r>
-              <a:rPr lang="en-US" dirty="0" err="1"/>
+              <a:rPr lang="en-US" dirty="0" err="1">
+                <a:latin typeface="Courier New" panose="02070309020205020404" pitchFamily="49" charset="0"/>
+                <a:cs typeface="Courier New" panose="02070309020205020404" pitchFamily="49" charset="0"/>
+              </a:rPr>
               <a:t>wc</a:t>
             </a:r>
             <a:r>
-              <a:rPr lang="en-US" dirty="0"/>
+              <a:rPr lang="en-US" dirty="0">
+                <a:latin typeface="Courier New" panose="02070309020205020404" pitchFamily="49" charset="0"/>
+                <a:cs typeface="Courier New" panose="02070309020205020404" pitchFamily="49" charset="0"/>
+              </a:rPr>
               <a:t> -l</a:t>
             </a:r>
           </a:p>
@@ -22088,7 +22308,10 @@
               <a:buNone/>
             </a:pPr>
             <a:r>
-              <a:rPr lang="en-US" b="1" dirty="0"/>
+              <a:rPr lang="en-US" b="1" dirty="0">
+                <a:latin typeface="Courier New" panose="02070309020205020404" pitchFamily="49" charset="0"/>
+                <a:cs typeface="Courier New" panose="02070309020205020404" pitchFamily="49" charset="0"/>
+              </a:rPr>
               <a:t>323</a:t>
             </a:r>
           </a:p>
@@ -22096,14 +22319,20 @@
             <a:pPr marL="457200" lvl="1" indent="0">
               <a:buNone/>
             </a:pPr>
-            <a:endParaRPr lang="en-US" dirty="0"/>
+            <a:endParaRPr lang="en-US" dirty="0">
+              <a:latin typeface="Courier New" panose="02070309020205020404" pitchFamily="49" charset="0"/>
+              <a:cs typeface="Courier New" panose="02070309020205020404" pitchFamily="49" charset="0"/>
+            </a:endParaRPr>
           </a:p>
           <a:p>
             <a:pPr marL="457200" lvl="1" indent="0">
               <a:buNone/>
             </a:pPr>
             <a:r>
-              <a:rPr lang="en-US" dirty="0"/>
+              <a:rPr lang="en-US" dirty="0">
+                <a:latin typeface="Courier New" panose="02070309020205020404" pitchFamily="49" charset="0"/>
+                <a:cs typeface="Courier New" panose="02070309020205020404" pitchFamily="49" charset="0"/>
+              </a:rPr>
               <a:t>$ diff api.txt abi.txt</a:t>
             </a:r>
           </a:p>
@@ -22112,7 +22341,10 @@
               <a:buNone/>
             </a:pPr>
             <a:r>
-              <a:rPr lang="en-US" dirty="0"/>
+              <a:rPr lang="en-US" dirty="0">
+                <a:latin typeface="Courier New" panose="02070309020205020404" pitchFamily="49" charset="0"/>
+                <a:cs typeface="Courier New" panose="02070309020205020404" pitchFamily="49" charset="0"/>
+              </a:rPr>
               <a:t>0a1,10</a:t>
             </a:r>
           </a:p>
@@ -22121,7 +22353,10 @@
               <a:buNone/>
             </a:pPr>
             <a:r>
-              <a:rPr lang="en-US" b="1" dirty="0"/>
+              <a:rPr lang="en-US" b="1" dirty="0">
+                <a:latin typeface="Courier New" panose="02070309020205020404" pitchFamily="49" charset="0"/>
+                <a:cs typeface="Courier New" panose="02070309020205020404" pitchFamily="49" charset="0"/>
+              </a:rPr>
               <a:t>&gt; __gmp_0</a:t>
             </a:r>
           </a:p>
@@ -22130,49 +22365,79 @@
               <a:buNone/>
             </a:pPr>
             <a:r>
-              <a:rPr lang="en-US" b="1" dirty="0"/>
+              <a:rPr lang="en-US" b="1" dirty="0">
+                <a:latin typeface="Courier New" panose="02070309020205020404" pitchFamily="49" charset="0"/>
+                <a:cs typeface="Courier New" panose="02070309020205020404" pitchFamily="49" charset="0"/>
+              </a:rPr>
               <a:t>&gt; __</a:t>
             </a:r>
             <a:r>
-              <a:rPr lang="en-US" b="1" dirty="0" err="1"/>
+              <a:rPr lang="en-US" b="1" dirty="0" err="1">
+                <a:latin typeface="Courier New" panose="02070309020205020404" pitchFamily="49" charset="0"/>
+                <a:cs typeface="Courier New" panose="02070309020205020404" pitchFamily="49" charset="0"/>
+              </a:rPr>
               <a:t>gmp_allocate_func</a:t>
             </a:r>
-            <a:endParaRPr lang="en-US" b="1" dirty="0"/>
+            <a:endParaRPr lang="en-US" b="1" dirty="0">
+              <a:latin typeface="Courier New" panose="02070309020205020404" pitchFamily="49" charset="0"/>
+              <a:cs typeface="Courier New" panose="02070309020205020404" pitchFamily="49" charset="0"/>
+            </a:endParaRPr>
           </a:p>
           <a:p>
             <a:pPr marL="457200" lvl="1" indent="0">
               <a:buNone/>
             </a:pPr>
             <a:r>
-              <a:rPr lang="en-US" b="1" dirty="0"/>
+              <a:rPr lang="en-US" b="1" dirty="0">
+                <a:latin typeface="Courier New" panose="02070309020205020404" pitchFamily="49" charset="0"/>
+                <a:cs typeface="Courier New" panose="02070309020205020404" pitchFamily="49" charset="0"/>
+              </a:rPr>
               <a:t>&gt; __</a:t>
             </a:r>
             <a:r>
-              <a:rPr lang="en-US" b="1" dirty="0" err="1"/>
+              <a:rPr lang="en-US" b="1" dirty="0" err="1">
+                <a:latin typeface="Courier New" panose="02070309020205020404" pitchFamily="49" charset="0"/>
+                <a:cs typeface="Courier New" panose="02070309020205020404" pitchFamily="49" charset="0"/>
+              </a:rPr>
               <a:t>gmp_asprintf_final</a:t>
             </a:r>
-            <a:endParaRPr lang="en-US" b="1" dirty="0"/>
+            <a:endParaRPr lang="en-US" b="1" dirty="0">
+              <a:latin typeface="Courier New" panose="02070309020205020404" pitchFamily="49" charset="0"/>
+              <a:cs typeface="Courier New" panose="02070309020205020404" pitchFamily="49" charset="0"/>
+            </a:endParaRPr>
           </a:p>
           <a:p>
             <a:pPr marL="457200" lvl="1" indent="0">
               <a:buNone/>
             </a:pPr>
             <a:r>
-              <a:rPr lang="en-US" b="1" dirty="0"/>
+              <a:rPr lang="en-US" b="1" dirty="0">
+                <a:latin typeface="Courier New" panose="02070309020205020404" pitchFamily="49" charset="0"/>
+                <a:cs typeface="Courier New" panose="02070309020205020404" pitchFamily="49" charset="0"/>
+              </a:rPr>
               <a:t>&gt; __</a:t>
             </a:r>
             <a:r>
-              <a:rPr lang="en-US" b="1" dirty="0" err="1"/>
+              <a:rPr lang="en-US" b="1" dirty="0" err="1">
+                <a:latin typeface="Courier New" panose="02070309020205020404" pitchFamily="49" charset="0"/>
+                <a:cs typeface="Courier New" panose="02070309020205020404" pitchFamily="49" charset="0"/>
+              </a:rPr>
               <a:t>gmp_asprintf_funs</a:t>
             </a:r>
-            <a:endParaRPr lang="en-US" b="1" dirty="0"/>
+            <a:endParaRPr lang="en-US" b="1" dirty="0">
+              <a:latin typeface="Courier New" panose="02070309020205020404" pitchFamily="49" charset="0"/>
+              <a:cs typeface="Courier New" panose="02070309020205020404" pitchFamily="49" charset="0"/>
+            </a:endParaRPr>
           </a:p>
           <a:p>
             <a:pPr marL="457200" lvl="1" indent="0">
               <a:buNone/>
             </a:pPr>
             <a:r>
-              <a:rPr lang="en-US" b="1" dirty="0"/>
+              <a:rPr lang="en-US" b="1" dirty="0">
+                <a:latin typeface="Courier New" panose="02070309020205020404" pitchFamily="49" charset="0"/>
+                <a:cs typeface="Courier New" panose="02070309020205020404" pitchFamily="49" charset="0"/>
+              </a:rPr>
               <a:t>…</a:t>
             </a:r>
           </a:p>
@@ -24363,7 +24628,7 @@
           <p:cNvPr id="2" name="Title 1">
             <a:extLst>
               <a:ext uri="{FF2B5EF4-FFF2-40B4-BE49-F238E27FC236}">
-                <a16:creationId xmlns:a16="http://schemas.microsoft.com/office/drawing/2014/main" id="{BA4A0742-007F-4576-9460-A8607D634745}"/>
+                <a16:creationId xmlns:a16="http://schemas.microsoft.com/office/drawing/2014/main" id="{E20D1D78-8C9F-4C59-9456-FF1FD01FE452}"/>
               </a:ext>
             </a:extLst>
           </p:cNvPr>
@@ -24381,12 +24646,9 @@
           <a:p>
             <a:r>
               <a:rPr lang="ru-RU" dirty="0"/>
-              <a:t>Преимущества </a:t>
-            </a:r>
-            <a:r>
-              <a:rPr lang="en-US" dirty="0"/>
-              <a:t>DLL</a:t>
-            </a:r>
+              <a:t>Использование динамических библиотек</a:t>
+            </a:r>
+            <a:endParaRPr lang="en-US" dirty="0"/>
           </a:p>
         </p:txBody>
       </p:sp>
@@ -24395,7 +24657,7 @@
           <p:cNvPr id="3" name="Content Placeholder 2">
             <a:extLst>
               <a:ext uri="{FF2B5EF4-FFF2-40B4-BE49-F238E27FC236}">
-                <a16:creationId xmlns:a16="http://schemas.microsoft.com/office/drawing/2014/main" id="{800FC03B-9AD8-4AE4-B8AF-6C64E29AB20E}"/>
+                <a16:creationId xmlns:a16="http://schemas.microsoft.com/office/drawing/2014/main" id="{C7C9F386-0B77-47F8-9C2F-C0FBAF3FCA37}"/>
               </a:ext>
             </a:extLst>
           </p:cNvPr>
@@ -24409,147 +24671,185 @@
         <p:spPr/>
         <p:txBody>
           <a:bodyPr>
-            <a:normAutofit fontScale="92500"/>
+            <a:normAutofit lnSpcReduction="10000"/>
           </a:bodyPr>
           <a:lstStyle/>
           <a:p>
             <a:r>
               <a:rPr lang="ru-RU" dirty="0"/>
-              <a:t>Быстрые системные обновления </a:t>
+              <a:t>Два основных способа</a:t>
+            </a:r>
+            <a:r>
+              <a:rPr lang="en-US" dirty="0"/>
+              <a:t>:</a:t>
             </a:r>
           </a:p>
           <a:p>
             <a:pPr lvl="1"/>
             <a:r>
               <a:rPr lang="ru-RU" dirty="0"/>
-              <a:t>Зависимые файлы не нужно перекомпилировать при обновлении библиотеки</a:t>
-            </a:r>
-          </a:p>
-          <a:p>
-            <a:r>
-              <a:rPr lang="ru-RU" dirty="0"/>
-              <a:t>Экономия оперативной памяти и диска</a:t>
+              <a:t>Традиционное </a:t>
+            </a:r>
+            <a:r>
+              <a:rPr lang="en-US" dirty="0"/>
+              <a:t>link-time </a:t>
+            </a:r>
+            <a:r>
+              <a:rPr lang="ru-RU" dirty="0"/>
+              <a:t>связывание</a:t>
             </a:r>
             <a:endParaRPr lang="en-US" dirty="0"/>
           </a:p>
           <a:p>
+            <a:pPr marL="914400" lvl="2" indent="0">
+              <a:buNone/>
+            </a:pPr>
+            <a:r>
+              <a:rPr lang="en-US" dirty="0" err="1">
+                <a:latin typeface="Courier New" panose="02070309020205020404" pitchFamily="49" charset="0"/>
+                <a:cs typeface="Courier New" panose="02070309020205020404" pitchFamily="49" charset="0"/>
+              </a:rPr>
+              <a:t>gcc</a:t>
+            </a:r>
+            <a:r>
+              <a:rPr lang="en-US" dirty="0">
+                <a:latin typeface="Courier New" panose="02070309020205020404" pitchFamily="49" charset="0"/>
+                <a:cs typeface="Courier New" panose="02070309020205020404" pitchFamily="49" charset="0"/>
+              </a:rPr>
+              <a:t> </a:t>
+            </a:r>
+            <a:r>
+              <a:rPr lang="en-US" dirty="0" err="1">
+                <a:latin typeface="Courier New" panose="02070309020205020404" pitchFamily="49" charset="0"/>
+                <a:cs typeface="Courier New" panose="02070309020205020404" pitchFamily="49" charset="0"/>
+              </a:rPr>
+              <a:t>program.o</a:t>
+            </a:r>
+            <a:r>
+              <a:rPr lang="en-US" dirty="0">
+                <a:latin typeface="Courier New" panose="02070309020205020404" pitchFamily="49" charset="0"/>
+                <a:cs typeface="Courier New" panose="02070309020205020404" pitchFamily="49" charset="0"/>
+              </a:rPr>
+              <a:t> -</a:t>
+            </a:r>
+            <a:r>
+              <a:rPr lang="en-US" dirty="0" err="1">
+                <a:latin typeface="Courier New" panose="02070309020205020404" pitchFamily="49" charset="0"/>
+                <a:cs typeface="Courier New" panose="02070309020205020404" pitchFamily="49" charset="0"/>
+              </a:rPr>
+              <a:t>lgmp</a:t>
+            </a:r>
+            <a:endParaRPr lang="en-US" dirty="0">
+              <a:latin typeface="Courier New" panose="02070309020205020404" pitchFamily="49" charset="0"/>
+              <a:cs typeface="Courier New" panose="02070309020205020404" pitchFamily="49" charset="0"/>
+            </a:endParaRPr>
+          </a:p>
+          <a:p>
+            <a:pPr marL="914400" lvl="2" indent="0">
+              <a:buNone/>
+            </a:pPr>
+            <a:r>
+              <a:rPr lang="en-US" dirty="0">
+                <a:latin typeface="Courier New" panose="02070309020205020404" pitchFamily="49" charset="0"/>
+                <a:cs typeface="Courier New" panose="02070309020205020404" pitchFamily="49" charset="0"/>
+              </a:rPr>
+              <a:t>link.exe program.obj libgmp.lib</a:t>
+            </a:r>
+          </a:p>
+          <a:p>
             <a:pPr lvl="1"/>
             <a:r>
-              <a:rPr lang="en-US" dirty="0"/>
-              <a:t>~1.1G RAM </a:t>
-            </a:r>
-            <a:r>
-              <a:rPr lang="ru-RU" dirty="0"/>
-              <a:t>на </a:t>
-            </a:r>
-            <a:r>
-              <a:rPr lang="en-US" dirty="0"/>
-              <a:t>Ubuntu Desktop (</a:t>
-            </a:r>
-            <a:r>
-              <a:rPr lang="ru-RU" dirty="0"/>
-              <a:t>с запущенным </a:t>
-            </a:r>
-            <a:r>
-              <a:rPr lang="en-US" dirty="0"/>
-              <a:t>Firefox/</a:t>
-            </a:r>
-            <a:r>
-              <a:rPr lang="en-US" dirty="0" err="1"/>
-              <a:t>KOffice</a:t>
-            </a:r>
-            <a:r>
-              <a:rPr lang="en-US" dirty="0"/>
-              <a:t>/Thunderbird, </a:t>
-            </a:r>
-            <a:r>
-              <a:rPr lang="ru-RU" dirty="0"/>
-              <a:t>по методологии из </a:t>
-            </a:r>
+              <a:rPr lang="ru-RU" dirty="0"/>
+              <a:t>Связывание на этапе исполнения</a:t>
+            </a:r>
+            <a:r>
+              <a:rPr lang="en-US" dirty="0"/>
+              <a:t> (run-time loading, dynamic loading)</a:t>
+            </a:r>
+          </a:p>
+          <a:p>
+            <a:pPr marL="914400" lvl="2" indent="0">
+              <a:buNone/>
+            </a:pPr>
             <a:r>
               <a:rPr lang="en-US" dirty="0">
-                <a:hlinkClick r:id="rId3"/>
+                <a:latin typeface="Courier New" panose="02070309020205020404" pitchFamily="49" charset="0"/>
+                <a:cs typeface="Courier New" panose="02070309020205020404" pitchFamily="49" charset="0"/>
               </a:rPr>
-              <a:t>No significant memory savings from shared libraries</a:t>
-            </a:r>
-            <a:r>
-              <a:rPr lang="en-US" dirty="0"/>
-              <a:t>)</a:t>
-            </a:r>
+              <a:t>void *lib = </a:t>
+            </a:r>
+            <a:r>
+              <a:rPr lang="en-US" dirty="0" err="1">
+                <a:latin typeface="Courier New" panose="02070309020205020404" pitchFamily="49" charset="0"/>
+                <a:cs typeface="Courier New" panose="02070309020205020404" pitchFamily="49" charset="0"/>
+              </a:rPr>
+              <a:t>dlopen</a:t>
+            </a:r>
+            <a:r>
+              <a:rPr lang="en-US" dirty="0">
+                <a:latin typeface="Courier New" panose="02070309020205020404" pitchFamily="49" charset="0"/>
+                <a:cs typeface="Courier New" panose="02070309020205020404" pitchFamily="49" charset="0"/>
+              </a:rPr>
+              <a:t>(“libgmp.so”, RTLD_LAZY | RTLD_GLOBAL);</a:t>
+            </a:r>
+          </a:p>
+          <a:p>
+            <a:pPr marL="914400" lvl="2" indent="0">
+              <a:buNone/>
+            </a:pPr>
+            <a:r>
+              <a:rPr lang="en-US" dirty="0">
+                <a:latin typeface="Courier New" panose="02070309020205020404" pitchFamily="49" charset="0"/>
+                <a:cs typeface="Courier New" panose="02070309020205020404" pitchFamily="49" charset="0"/>
+              </a:rPr>
+              <a:t>HANDLE lib = </a:t>
+            </a:r>
+            <a:r>
+              <a:rPr lang="en-US" dirty="0" err="1">
+                <a:latin typeface="Courier New" panose="02070309020205020404" pitchFamily="49" charset="0"/>
+                <a:cs typeface="Courier New" panose="02070309020205020404" pitchFamily="49" charset="0"/>
+              </a:rPr>
+              <a:t>LoadLibrary</a:t>
+            </a:r>
+            <a:r>
+              <a:rPr lang="en-US" dirty="0">
+                <a:latin typeface="Courier New" panose="02070309020205020404" pitchFamily="49" charset="0"/>
+                <a:cs typeface="Courier New" panose="02070309020205020404" pitchFamily="49" charset="0"/>
+              </a:rPr>
+              <a:t>(“libgmp.dll”);</a:t>
+            </a:r>
+            <a:endParaRPr lang="ru-RU" dirty="0">
+              <a:latin typeface="Courier New" panose="02070309020205020404" pitchFamily="49" charset="0"/>
+              <a:cs typeface="Courier New" panose="02070309020205020404" pitchFamily="49" charset="0"/>
+            </a:endParaRPr>
+          </a:p>
+          <a:p>
+            <a:r>
+              <a:rPr lang="ru-RU" dirty="0"/>
+              <a:t>При традиционном связывании библиотека будет загружена на старте программы</a:t>
+            </a:r>
+          </a:p>
+          <a:p>
+            <a:r>
+              <a:rPr lang="ru-RU" dirty="0"/>
+              <a:t>При втором варианте – в любом месте программы</a:t>
+            </a:r>
+            <a:endParaRPr lang="en-US" dirty="0"/>
           </a:p>
           <a:p>
             <a:pPr lvl="1"/>
             <a:r>
-              <a:rPr lang="en-US" dirty="0"/>
-              <a:t>~20G HDD </a:t>
-            </a:r>
-            <a:r>
-              <a:rPr lang="ru-RU" dirty="0"/>
-              <a:t>на </a:t>
-            </a:r>
-            <a:r>
-              <a:rPr lang="en-US" dirty="0"/>
-              <a:t>Ubuntu Desktop (</a:t>
-            </a:r>
-            <a:r>
-              <a:rPr lang="ru-RU" dirty="0"/>
-              <a:t>с </a:t>
-            </a:r>
-            <a:r>
-              <a:rPr lang="en-US" dirty="0" err="1"/>
-              <a:t>KOffice</a:t>
-            </a:r>
-            <a:r>
-              <a:rPr lang="en-US" dirty="0"/>
-              <a:t>, Firefox, etc.)</a:t>
-            </a:r>
-            <a:endParaRPr lang="ru-RU" dirty="0"/>
-          </a:p>
-          <a:p>
-            <a:r>
-              <a:rPr lang="ru-RU" dirty="0"/>
-              <a:t>Поддержка более сложных сценариев работы</a:t>
-            </a:r>
-            <a:r>
-              <a:rPr lang="en-US" dirty="0"/>
-              <a:t>:</a:t>
-            </a:r>
-          </a:p>
-          <a:p>
-            <a:pPr lvl="1"/>
-            <a:r>
-              <a:rPr lang="ru-RU" dirty="0"/>
-              <a:t>Отложенная загрузка </a:t>
-            </a:r>
-            <a:r>
-              <a:rPr lang="en-US" dirty="0"/>
-              <a:t>DLL (lazy loading)</a:t>
-            </a:r>
-          </a:p>
-          <a:p>
-            <a:pPr lvl="1"/>
-            <a:r>
-              <a:rPr lang="ru-RU" dirty="0"/>
-              <a:t>Загрузка пользовательских динамических расширений (плагинов)</a:t>
-            </a:r>
-          </a:p>
-          <a:p>
-            <a:pPr lvl="1"/>
-            <a:r>
-              <a:rPr lang="ru-RU" dirty="0"/>
-              <a:t>Загрузка</a:t>
-            </a:r>
-            <a:r>
-              <a:rPr lang="en-US" dirty="0"/>
-              <a:t> </a:t>
-            </a:r>
-            <a:r>
-              <a:rPr lang="ru-RU" dirty="0"/>
-              <a:t>наиболее различных версий библиотеки в зависимости от окружения (например от возможностей процессора)</a:t>
-            </a:r>
-            <a:endParaRPr lang="en-US" dirty="0"/>
-          </a:p>
-          <a:p>
+              <a:rPr lang="ru-RU" dirty="0"/>
+              <a:t>Открывает возможность для использования </a:t>
+            </a:r>
+            <a:r>
+              <a:rPr lang="en-US" dirty="0"/>
+              <a:t>lazy loading, </a:t>
+            </a:r>
+            <a:r>
+              <a:rPr lang="ru-RU" dirty="0"/>
+              <a:t>плагинов и пр.</a:t>
+            </a:r>
             <a:endParaRPr lang="en-US" dirty="0"/>
           </a:p>
         </p:txBody>
@@ -24557,7 +24857,7 @@
     </p:spTree>
     <p:extLst>
       <p:ext uri="{BB962C8B-B14F-4D97-AF65-F5344CB8AC3E}">
-        <p14:creationId xmlns:p14="http://schemas.microsoft.com/office/powerpoint/2010/main" val="107301343"/>
+        <p14:creationId xmlns:p14="http://schemas.microsoft.com/office/powerpoint/2010/main" val="1420442731"/>
       </p:ext>
     </p:extLst>
   </p:cSld>
@@ -24607,7 +24907,7 @@
           <a:p>
             <a:r>
               <a:rPr lang="ru-RU" dirty="0"/>
-              <a:t>Недостатки </a:t>
+              <a:t>Преимущества </a:t>
             </a:r>
             <a:r>
               <a:rPr lang="en-US" dirty="0"/>
@@ -24634,49 +24934,148 @@
         </p:nvSpPr>
         <p:spPr/>
         <p:txBody>
-          <a:bodyPr/>
-          <a:lstStyle/>
-          <a:p>
-            <a:r>
-              <a:rPr lang="ru-RU" dirty="0"/>
-              <a:t>Накладные загрузки при старте программы</a:t>
+          <a:bodyPr>
+            <a:normAutofit fontScale="92500"/>
+          </a:bodyPr>
+          <a:lstStyle/>
+          <a:p>
+            <a:r>
+              <a:rPr lang="ru-RU" dirty="0"/>
+              <a:t>Быстрые системные обновления </a:t>
             </a:r>
           </a:p>
           <a:p>
             <a:pPr lvl="1"/>
             <a:r>
               <a:rPr lang="ru-RU" dirty="0"/>
-              <a:t>Поиск и загрузка библиотек, разрешение символов</a:t>
-            </a:r>
-          </a:p>
-          <a:p>
-            <a:r>
-              <a:rPr lang="ru-RU" dirty="0"/>
-              <a:t>Накладные расходы при вызове библиотечных функций</a:t>
+              <a:t>Зависимые файлы не нужно перекомпилировать при обновлении библиотеки</a:t>
+            </a:r>
+          </a:p>
+          <a:p>
+            <a:r>
+              <a:rPr lang="ru-RU" dirty="0"/>
+              <a:t>Экономия оперативной памяти и диска</a:t>
             </a:r>
             <a:endParaRPr lang="en-US" dirty="0"/>
           </a:p>
           <a:p>
-            <a:r>
-              <a:rPr lang="ru-RU" dirty="0"/>
-              <a:t>Более хрупкая инфраструктура</a:t>
+            <a:pPr lvl="1"/>
+            <a:r>
+              <a:rPr lang="en-US" dirty="0"/>
+              <a:t>~1.1G RAM </a:t>
+            </a:r>
+            <a:r>
+              <a:rPr lang="ru-RU" dirty="0"/>
+              <a:t>на </a:t>
+            </a:r>
+            <a:r>
+              <a:rPr lang="en-US" dirty="0"/>
+              <a:t>Ubuntu Desktop (</a:t>
+            </a:r>
+            <a:r>
+              <a:rPr lang="ru-RU" dirty="0"/>
+              <a:t>с запущенным </a:t>
+            </a:r>
+            <a:r>
+              <a:rPr lang="en-US" dirty="0"/>
+              <a:t>Firefox/</a:t>
+            </a:r>
+            <a:r>
+              <a:rPr lang="en-US" dirty="0" err="1"/>
+              <a:t>KOffice</a:t>
+            </a:r>
+            <a:r>
+              <a:rPr lang="en-US" dirty="0"/>
+              <a:t>/Thunderbird, </a:t>
+            </a:r>
+            <a:r>
+              <a:rPr lang="ru-RU" dirty="0"/>
+              <a:t>по методологии из </a:t>
+            </a:r>
+            <a:r>
+              <a:rPr lang="en-US" dirty="0">
+                <a:hlinkClick r:id="rId3"/>
+              </a:rPr>
+              <a:t>No significant memory savings from shared libraries</a:t>
+            </a:r>
+            <a:r>
+              <a:rPr lang="en-US" dirty="0"/>
+              <a:t>)</a:t>
+            </a:r>
+          </a:p>
+          <a:p>
+            <a:pPr lvl="1"/>
+            <a:r>
+              <a:rPr lang="en-US" dirty="0"/>
+              <a:t>~20G HDD </a:t>
+            </a:r>
+            <a:r>
+              <a:rPr lang="ru-RU" dirty="0"/>
+              <a:t>на </a:t>
+            </a:r>
+            <a:r>
+              <a:rPr lang="en-US" dirty="0"/>
+              <a:t>Ubuntu Desktop (</a:t>
+            </a:r>
+            <a:r>
+              <a:rPr lang="ru-RU" dirty="0"/>
+              <a:t>с </a:t>
+            </a:r>
+            <a:r>
+              <a:rPr lang="en-US" dirty="0" err="1"/>
+              <a:t>KOffice</a:t>
+            </a:r>
+            <a:r>
+              <a:rPr lang="en-US" dirty="0"/>
+              <a:t>, Firefox, etc.)</a:t>
+            </a:r>
+            <a:endParaRPr lang="ru-RU" dirty="0"/>
+          </a:p>
+          <a:p>
+            <a:r>
+              <a:rPr lang="ru-RU" dirty="0"/>
+              <a:t>Поддержка более сложных сценариев работы</a:t>
+            </a:r>
+            <a:r>
+              <a:rPr lang="en-US" dirty="0"/>
+              <a:t>:</a:t>
+            </a:r>
+          </a:p>
+          <a:p>
+            <a:pPr lvl="1"/>
+            <a:r>
+              <a:rPr lang="ru-RU" dirty="0"/>
+              <a:t>Отложенная загрузка </a:t>
+            </a:r>
+            <a:r>
+              <a:rPr lang="en-US" dirty="0"/>
+              <a:t>DLL (lazy loading)</a:t>
+            </a:r>
+          </a:p>
+          <a:p>
+            <a:pPr lvl="1"/>
+            <a:r>
+              <a:rPr lang="ru-RU" dirty="0"/>
+              <a:t>Загрузка пользовательских динамических расширений (плагинов)</a:t>
+            </a:r>
+          </a:p>
+          <a:p>
+            <a:pPr lvl="1"/>
+            <a:r>
+              <a:rPr lang="ru-RU" dirty="0"/>
+              <a:t>Загрузка</a:t>
+            </a:r>
+            <a:r>
+              <a:rPr lang="en-US" dirty="0"/>
+              <a:t> </a:t>
+            </a:r>
+            <a:r>
+              <a:rPr lang="ru-RU" dirty="0"/>
+              <a:t>наиболее различных версий библиотеки в зависимости от окружения (например от возможностей процессора)</a:t>
             </a:r>
             <a:endParaRPr lang="en-US" dirty="0"/>
           </a:p>
           <a:p>
-            <a:pPr lvl="1"/>
-            <a:r>
-              <a:rPr lang="ru-RU" dirty="0"/>
-              <a:t>Высокая вероятность сбоев при установке несовместимых версий библиотек (</a:t>
-            </a:r>
-            <a:r>
-              <a:rPr lang="en-US" dirty="0"/>
-              <a:t>DLL hell</a:t>
-            </a:r>
-            <a:r>
-              <a:rPr lang="ru-RU" dirty="0"/>
-              <a:t>)</a:t>
-            </a:r>
             <a:endParaRPr lang="en-US" dirty="0"/>
           </a:p>
         </p:txBody>
@@ -24684,7 +25083,7 @@
     </p:spTree>
     <p:extLst>
       <p:ext uri="{BB962C8B-B14F-4D97-AF65-F5344CB8AC3E}">
-        <p14:creationId xmlns:p14="http://schemas.microsoft.com/office/powerpoint/2010/main" val="2572590090"/>
+        <p14:creationId xmlns:p14="http://schemas.microsoft.com/office/powerpoint/2010/main" val="107301343"/>
       </p:ext>
     </p:extLst>
   </p:cSld>
@@ -24716,7 +25115,7 @@
           <p:cNvPr id="2" name="Title 1">
             <a:extLst>
               <a:ext uri="{FF2B5EF4-FFF2-40B4-BE49-F238E27FC236}">
-                <a16:creationId xmlns:a16="http://schemas.microsoft.com/office/drawing/2014/main" id="{E20D1D78-8C9F-4C59-9456-FF1FD01FE452}"/>
+                <a16:creationId xmlns:a16="http://schemas.microsoft.com/office/drawing/2014/main" id="{BA4A0742-007F-4576-9460-A8607D634745}"/>
               </a:ext>
             </a:extLst>
           </p:cNvPr>
@@ -24734,209 +25133,75 @@
           <a:p>
             <a:r>
               <a:rPr lang="ru-RU" dirty="0"/>
-              <a:t>Использование динамических библиотек</a:t>
+              <a:t>Недостатки </a:t>
+            </a:r>
+            <a:r>
+              <a:rPr lang="en-US" dirty="0"/>
+              <a:t>DLL</a:t>
+            </a:r>
+          </a:p>
+        </p:txBody>
+      </p:sp>
+      <p:sp>
+        <p:nvSpPr>
+          <p:cNvPr id="3" name="Content Placeholder 2">
+            <a:extLst>
+              <a:ext uri="{FF2B5EF4-FFF2-40B4-BE49-F238E27FC236}">
+                <a16:creationId xmlns:a16="http://schemas.microsoft.com/office/drawing/2014/main" id="{800FC03B-9AD8-4AE4-B8AF-6C64E29AB20E}"/>
+              </a:ext>
+            </a:extLst>
+          </p:cNvPr>
+          <p:cNvSpPr>
+            <a:spLocks noGrp="1"/>
+          </p:cNvSpPr>
+          <p:nvPr>
+            <p:ph idx="1"/>
+          </p:nvPr>
+        </p:nvSpPr>
+        <p:spPr/>
+        <p:txBody>
+          <a:bodyPr/>
+          <a:lstStyle/>
+          <a:p>
+            <a:r>
+              <a:rPr lang="ru-RU" dirty="0"/>
+              <a:t>Накладные загрузки при старте программы</a:t>
+            </a:r>
+          </a:p>
+          <a:p>
+            <a:pPr lvl="1"/>
+            <a:r>
+              <a:rPr lang="ru-RU" dirty="0"/>
+              <a:t>Поиск и загрузка библиотек, разрешение символов</a:t>
+            </a:r>
+          </a:p>
+          <a:p>
+            <a:r>
+              <a:rPr lang="ru-RU" dirty="0"/>
+              <a:t>Накладные расходы при вызове библиотечных функций</a:t>
             </a:r>
             <a:endParaRPr lang="en-US" dirty="0"/>
           </a:p>
-        </p:txBody>
-      </p:sp>
-      <p:sp>
-        <p:nvSpPr>
-          <p:cNvPr id="3" name="Content Placeholder 2">
-            <a:extLst>
-              <a:ext uri="{FF2B5EF4-FFF2-40B4-BE49-F238E27FC236}">
-                <a16:creationId xmlns:a16="http://schemas.microsoft.com/office/drawing/2014/main" id="{C7C9F386-0B77-47F8-9C2F-C0FBAF3FCA37}"/>
-              </a:ext>
-            </a:extLst>
-          </p:cNvPr>
-          <p:cNvSpPr>
-            <a:spLocks noGrp="1"/>
-          </p:cNvSpPr>
-          <p:nvPr>
-            <p:ph idx="1"/>
-          </p:nvPr>
-        </p:nvSpPr>
-        <p:spPr/>
-        <p:txBody>
-          <a:bodyPr>
-            <a:normAutofit lnSpcReduction="10000"/>
-          </a:bodyPr>
-          <a:lstStyle/>
-          <a:p>
-            <a:r>
-              <a:rPr lang="ru-RU" dirty="0"/>
-              <a:t>Два основных способа</a:t>
-            </a:r>
-            <a:r>
-              <a:rPr lang="en-US" dirty="0"/>
-              <a:t>:</a:t>
-            </a:r>
+          <a:p>
+            <a:r>
+              <a:rPr lang="ru-RU" dirty="0"/>
+              <a:t>Более хрупкая инфраструктура</a:t>
+            </a:r>
+            <a:endParaRPr lang="en-US" dirty="0"/>
           </a:p>
           <a:p>
             <a:pPr lvl="1"/>
             <a:r>
               <a:rPr lang="ru-RU" dirty="0"/>
-              <a:t>Традиционное </a:t>
-            </a:r>
-            <a:r>
-              <a:rPr lang="en-US" dirty="0"/>
-              <a:t>link-time </a:t>
-            </a:r>
-            <a:r>
-              <a:rPr lang="ru-RU" dirty="0"/>
-              <a:t>связывание</a:t>
-            </a:r>
-            <a:endParaRPr lang="en-US" dirty="0"/>
-          </a:p>
-          <a:p>
-            <a:pPr marL="914400" lvl="2" indent="0">
-              <a:buNone/>
-            </a:pPr>
-            <a:r>
-              <a:rPr lang="en-US" dirty="0" err="1">
-                <a:latin typeface="Courier New" panose="02070309020205020404" pitchFamily="49" charset="0"/>
-                <a:cs typeface="Courier New" panose="02070309020205020404" pitchFamily="49" charset="0"/>
-              </a:rPr>
-              <a:t>gcc</a:t>
-            </a:r>
-            <a:r>
-              <a:rPr lang="en-US" dirty="0">
-                <a:latin typeface="Courier New" panose="02070309020205020404" pitchFamily="49" charset="0"/>
-                <a:cs typeface="Courier New" panose="02070309020205020404" pitchFamily="49" charset="0"/>
-              </a:rPr>
-              <a:t> </a:t>
-            </a:r>
-            <a:r>
-              <a:rPr lang="en-US" dirty="0" err="1">
-                <a:latin typeface="Courier New" panose="02070309020205020404" pitchFamily="49" charset="0"/>
-                <a:cs typeface="Courier New" panose="02070309020205020404" pitchFamily="49" charset="0"/>
-              </a:rPr>
-              <a:t>program.o</a:t>
-            </a:r>
-            <a:r>
-              <a:rPr lang="en-US" dirty="0">
-                <a:latin typeface="Courier New" panose="02070309020205020404" pitchFamily="49" charset="0"/>
-                <a:cs typeface="Courier New" panose="02070309020205020404" pitchFamily="49" charset="0"/>
-              </a:rPr>
-              <a:t> -</a:t>
-            </a:r>
-            <a:r>
-              <a:rPr lang="en-US" dirty="0" err="1">
-                <a:latin typeface="Courier New" panose="02070309020205020404" pitchFamily="49" charset="0"/>
-                <a:cs typeface="Courier New" panose="02070309020205020404" pitchFamily="49" charset="0"/>
-              </a:rPr>
-              <a:t>lgmp</a:t>
-            </a:r>
-            <a:endParaRPr lang="en-US" dirty="0">
-              <a:latin typeface="Courier New" panose="02070309020205020404" pitchFamily="49" charset="0"/>
-              <a:cs typeface="Courier New" panose="02070309020205020404" pitchFamily="49" charset="0"/>
-            </a:endParaRPr>
-          </a:p>
-          <a:p>
-            <a:pPr marL="914400" lvl="2" indent="0">
-              <a:buNone/>
-            </a:pPr>
-            <a:r>
-              <a:rPr lang="en-US" dirty="0">
-                <a:latin typeface="Courier New" panose="02070309020205020404" pitchFamily="49" charset="0"/>
-                <a:cs typeface="Courier New" panose="02070309020205020404" pitchFamily="49" charset="0"/>
-              </a:rPr>
-              <a:t>link.exe program.obj libgmp.lib</a:t>
-            </a:r>
-          </a:p>
-          <a:p>
-            <a:pPr lvl="1"/>
-            <a:r>
-              <a:rPr lang="ru-RU" dirty="0"/>
-              <a:t>Связывание на этапе исполнения</a:t>
-            </a:r>
-            <a:r>
-              <a:rPr lang="en-US" dirty="0"/>
-              <a:t> (run-time loading, dynamic loading)</a:t>
-            </a:r>
-          </a:p>
-          <a:p>
-            <a:pPr marL="914400" lvl="2" indent="0">
-              <a:buNone/>
-            </a:pPr>
-            <a:r>
-              <a:rPr lang="en-US" dirty="0">
-                <a:latin typeface="Courier New" panose="02070309020205020404" pitchFamily="49" charset="0"/>
-                <a:cs typeface="Courier New" panose="02070309020205020404" pitchFamily="49" charset="0"/>
-              </a:rPr>
-              <a:t>void *lib = </a:t>
-            </a:r>
-            <a:r>
-              <a:rPr lang="en-US" dirty="0" err="1">
-                <a:latin typeface="Courier New" panose="02070309020205020404" pitchFamily="49" charset="0"/>
-                <a:cs typeface="Courier New" panose="02070309020205020404" pitchFamily="49" charset="0"/>
-              </a:rPr>
-              <a:t>dlopen</a:t>
-            </a:r>
-            <a:r>
-              <a:rPr lang="en-US" dirty="0">
-                <a:latin typeface="Courier New" panose="02070309020205020404" pitchFamily="49" charset="0"/>
-                <a:cs typeface="Courier New" panose="02070309020205020404" pitchFamily="49" charset="0"/>
-              </a:rPr>
-              <a:t>(“libgmp.so”, RTLD_LAZY | RTLD_GLOBAL);</a:t>
-            </a:r>
-          </a:p>
-          <a:p>
-            <a:pPr marL="914400" lvl="2" indent="0">
-              <a:buNone/>
-            </a:pPr>
-            <a:r>
-              <a:rPr lang="en-US" dirty="0">
-                <a:latin typeface="Courier New" panose="02070309020205020404" pitchFamily="49" charset="0"/>
-                <a:cs typeface="Courier New" panose="02070309020205020404" pitchFamily="49" charset="0"/>
-              </a:rPr>
-              <a:t>HANDLE lib = </a:t>
-            </a:r>
-            <a:r>
-              <a:rPr lang="en-US" dirty="0" err="1">
-                <a:latin typeface="Courier New" panose="02070309020205020404" pitchFamily="49" charset="0"/>
-                <a:cs typeface="Courier New" panose="02070309020205020404" pitchFamily="49" charset="0"/>
-              </a:rPr>
-              <a:t>LoadLibrary</a:t>
-            </a:r>
-            <a:r>
-              <a:rPr lang="en-US" dirty="0">
-                <a:latin typeface="Courier New" panose="02070309020205020404" pitchFamily="49" charset="0"/>
-                <a:cs typeface="Courier New" panose="02070309020205020404" pitchFamily="49" charset="0"/>
-              </a:rPr>
-              <a:t>(“libgmp.dll”);</a:t>
-            </a:r>
-            <a:endParaRPr lang="ru-RU" dirty="0">
-              <a:latin typeface="Courier New" panose="02070309020205020404" pitchFamily="49" charset="0"/>
-              <a:cs typeface="Courier New" panose="02070309020205020404" pitchFamily="49" charset="0"/>
-            </a:endParaRPr>
-          </a:p>
-          <a:p>
-            <a:r>
-              <a:rPr lang="ru-RU" dirty="0"/>
-              <a:t>При традиционном связывании библиотека будет загружена на старте программы</a:t>
-            </a:r>
-          </a:p>
-          <a:p>
-            <a:r>
-              <a:rPr lang="ru-RU" dirty="0"/>
-              <a:t>При втором варианте – в любом месте программы</a:t>
-            </a:r>
-            <a:endParaRPr lang="en-US" dirty="0"/>
-          </a:p>
-          <a:p>
-            <a:pPr lvl="1"/>
-            <a:r>
-              <a:rPr lang="ru-RU" dirty="0"/>
-              <a:t>Открывает возможность для использования </a:t>
-            </a:r>
-            <a:r>
-              <a:rPr lang="en-US" dirty="0"/>
-              <a:t>lazy loading, </a:t>
-            </a:r>
-            <a:r>
-              <a:rPr lang="ru-RU" dirty="0"/>
-              <a:t>плагинов и пр.</a:t>
+              <a:t>Высокая вероятность сбоев при установке несовместимых версий библиотек (</a:t>
+            </a:r>
+            <a:r>
+              <a:rPr lang="en-US" dirty="0"/>
+              <a:t>DLL hell</a:t>
+            </a:r>
+            <a:r>
+              <a:rPr lang="ru-RU" dirty="0"/>
+              <a:t>)</a:t>
             </a:r>
             <a:endParaRPr lang="en-US" dirty="0"/>
           </a:p>
@@ -24945,7 +25210,7 @@
     </p:spTree>
     <p:extLst>
       <p:ext uri="{BB962C8B-B14F-4D97-AF65-F5344CB8AC3E}">
-        <p14:creationId xmlns:p14="http://schemas.microsoft.com/office/powerpoint/2010/main" val="1420442731"/>
+        <p14:creationId xmlns:p14="http://schemas.microsoft.com/office/powerpoint/2010/main" val="2572590090"/>
       </p:ext>
     </p:extLst>
   </p:cSld>

</xml_diff>

<commit_message>
Added initial version of English slides.
</commit_message>
<xml_diff>
--- a/2024/RU.pptx
+++ b/2024/RU.pptx
@@ -278,7 +278,7 @@
           <a:p>
             <a:fld id="{A36A2EB4-42A0-4A9F-94AC-04D10C1F231A}" type="datetimeFigureOut">
               <a:rPr lang="en-US" smtClean="0"/>
-              <a:t>5/5/2024</a:t>
+              <a:t>5/7/2024</a:t>
             </a:fld>
             <a:endParaRPr lang="en-US"/>
           </a:p>
@@ -4116,18 +4116,6 @@
           <a:bodyPr/>
           <a:lstStyle/>
           <a:p>
-            <a:r>
-              <a:rPr lang="ru-RU" dirty="0"/>
-              <a:t>Рассмотрим теперь поочерёдно перечисленные нами накладные расходы</a:t>
-            </a:r>
-            <a:r>
-              <a:rPr lang="en-US" dirty="0"/>
-              <a:t>. </a:t>
-            </a:r>
-            <a:r>
-              <a:rPr lang="ru-RU" dirty="0"/>
-              <a:t>Начнём с релокации.</a:t>
-            </a:r>
             <a:endParaRPr lang="en-US" dirty="0"/>
           </a:p>
         </p:txBody>
@@ -4149,7 +4137,7 @@
           <a:p>
             <a:fld id="{3AC94D10-082F-46D7-A834-266F9222130F}" type="slidenum">
               <a:rPr lang="en-US" smtClean="0"/>
-              <a:t>42</a:t>
+              <a:t>40</a:t>
             </a:fld>
             <a:endParaRPr lang="en-US"/>
           </a:p>
@@ -4158,7 +4146,7 @@
     </p:spTree>
     <p:extLst>
       <p:ext uri="{BB962C8B-B14F-4D97-AF65-F5344CB8AC3E}">
-        <p14:creationId xmlns:p14="http://schemas.microsoft.com/office/powerpoint/2010/main" val="940538028"/>
+        <p14:creationId xmlns:p14="http://schemas.microsoft.com/office/powerpoint/2010/main" val="1031465222"/>
       </p:ext>
     </p:extLst>
   </p:cSld>
@@ -4212,44 +4200,6 @@
           <a:bodyPr/>
           <a:lstStyle/>
           <a:p>
-            <a:r>
-              <a:rPr lang="ru-RU" dirty="0"/>
-              <a:t>Сразу скажу что решения для этой части в современных </a:t>
-            </a:r>
-            <a:r>
-              <a:rPr lang="en-US" dirty="0"/>
-              <a:t>Windows </a:t>
-            </a:r>
-            <a:r>
-              <a:rPr lang="ru-RU" dirty="0"/>
-              <a:t>и </a:t>
-            </a:r>
-            <a:r>
-              <a:rPr lang="en-US" dirty="0"/>
-              <a:t>Linux </a:t>
-            </a:r>
-            <a:r>
-              <a:rPr lang="ru-RU" dirty="0"/>
-              <a:t>нет. Но они существовали и использовались долгое время и вы до сих пор можете с ними столкнуться в статьях, поэтому посвятим им несколько слов.</a:t>
-            </a:r>
-            <a:endParaRPr lang="en-US" dirty="0"/>
-          </a:p>
-          <a:p>
-            <a:endParaRPr lang="en-US" dirty="0"/>
-          </a:p>
-          <a:p>
-            <a:r>
-              <a:rPr lang="ru-RU" dirty="0"/>
-              <a:t>Основная идея заключается в том, что мы можем заранее для всех используемых </a:t>
-            </a:r>
-            <a:r>
-              <a:rPr lang="en-US" dirty="0"/>
-              <a:t>DLL </a:t>
-            </a:r>
-            <a:r>
-              <a:rPr lang="ru-RU" dirty="0"/>
-              <a:t>выбрать непересекающиеся адреса в адресном простанстве процесса и слинковать их, исходя из того что они будут загружены по этим адресам. Загрузчик при загрузке увидит что адреса свободны и не будет проводить релокацию.</a:t>
-            </a:r>
             <a:endParaRPr lang="en-US" dirty="0"/>
           </a:p>
         </p:txBody>
@@ -4271,7 +4221,7 @@
           <a:p>
             <a:fld id="{3AC94D10-082F-46D7-A834-266F9222130F}" type="slidenum">
               <a:rPr lang="en-US" smtClean="0"/>
-              <a:t>43</a:t>
+              <a:t>41</a:t>
             </a:fld>
             <a:endParaRPr lang="en-US"/>
           </a:p>
@@ -4280,7 +4230,7 @@
     </p:spTree>
     <p:extLst>
       <p:ext uri="{BB962C8B-B14F-4D97-AF65-F5344CB8AC3E}">
-        <p14:creationId xmlns:p14="http://schemas.microsoft.com/office/powerpoint/2010/main" val="3043525197"/>
+        <p14:creationId xmlns:p14="http://schemas.microsoft.com/office/powerpoint/2010/main" val="620556484"/>
       </p:ext>
     </p:extLst>
   </p:cSld>
@@ -4336,66 +4286,17 @@
           <a:p>
             <a:r>
               <a:rPr lang="ru-RU" dirty="0"/>
-              <a:t>Решение это было реализовано и для </a:t>
-            </a:r>
-            <a:r>
-              <a:rPr lang="en-US" dirty="0"/>
-              <a:t>Windows, </a:t>
-            </a:r>
-            <a:r>
-              <a:rPr lang="ru-RU" dirty="0"/>
-              <a:t>и для </a:t>
-            </a:r>
-            <a:r>
-              <a:rPr lang="en-US" dirty="0"/>
-              <a:t>Linux, </a:t>
-            </a:r>
-            <a:r>
-              <a:rPr lang="ru-RU" dirty="0"/>
-              <a:t>но к сожалению вошло в противоречие с современными требованиями к безопасности, которые заключаются в том, что адрес загрузки </a:t>
-            </a:r>
-            <a:r>
-              <a:rPr lang="en-US" dirty="0"/>
-              <a:t>DLL </a:t>
-            </a:r>
-            <a:r>
-              <a:rPr lang="ru-RU" dirty="0"/>
-              <a:t>должен быть случайным (чтобы не упрощать подбор адресов хакерам).</a:t>
+              <a:t>Рассмотрим теперь поочерёдно перечисленные нами накладные расходы</a:t>
+            </a:r>
+            <a:r>
+              <a:rPr lang="en-US" dirty="0"/>
+              <a:t>. </a:t>
+            </a:r>
+            <a:r>
+              <a:rPr lang="ru-RU" dirty="0"/>
+              <a:t>Начнём с релокации.</a:t>
             </a:r>
             <a:endParaRPr lang="en-US" dirty="0"/>
-          </a:p>
-          <a:p>
-            <a:endParaRPr lang="en-US" dirty="0"/>
-          </a:p>
-          <a:p>
-            <a:r>
-              <a:rPr lang="ru-RU" dirty="0"/>
-              <a:t>Поэтому сейчас этот метод не применяется</a:t>
-            </a:r>
-            <a:r>
-              <a:rPr lang="en-US" dirty="0"/>
-              <a:t>, </a:t>
-            </a:r>
-            <a:r>
-              <a:rPr lang="ru-RU" dirty="0"/>
-              <a:t>а поддержка </a:t>
-            </a:r>
-            <a:r>
-              <a:rPr lang="en-US" dirty="0" err="1"/>
-              <a:t>Prelink</a:t>
-            </a:r>
-            <a:r>
-              <a:rPr lang="en-US" dirty="0"/>
-              <a:t> </a:t>
-            </a:r>
-            <a:r>
-              <a:rPr lang="ru-RU" dirty="0"/>
-              <a:t>даже была удалена в последних версиях </a:t>
-            </a:r>
-            <a:r>
-              <a:rPr lang="en-US" dirty="0"/>
-              <a:t>Glibc.</a:t>
-            </a:r>
           </a:p>
         </p:txBody>
       </p:sp>
@@ -4416,7 +4317,7 @@
           <a:p>
             <a:fld id="{3AC94D10-082F-46D7-A834-266F9222130F}" type="slidenum">
               <a:rPr lang="en-US" smtClean="0"/>
-              <a:t>44</a:t>
+              <a:t>42</a:t>
             </a:fld>
             <a:endParaRPr lang="en-US"/>
           </a:p>
@@ -4425,7 +4326,7 @@
     </p:spTree>
     <p:extLst>
       <p:ext uri="{BB962C8B-B14F-4D97-AF65-F5344CB8AC3E}">
-        <p14:creationId xmlns:p14="http://schemas.microsoft.com/office/powerpoint/2010/main" val="1998125518"/>
+        <p14:creationId xmlns:p14="http://schemas.microsoft.com/office/powerpoint/2010/main" val="940538028"/>
       </p:ext>
     </p:extLst>
   </p:cSld>
@@ -4596,7 +4497,41 @@
           <a:p>
             <a:r>
               <a:rPr lang="ru-RU" dirty="0"/>
-              <a:t>Обратимся теперь к накладным расходам на связывание символов.</a:t>
+              <a:t>Сразу скажу что решения для этой части в современных </a:t>
+            </a:r>
+            <a:r>
+              <a:rPr lang="en-US" dirty="0"/>
+              <a:t>Windows </a:t>
+            </a:r>
+            <a:r>
+              <a:rPr lang="ru-RU" dirty="0"/>
+              <a:t>и </a:t>
+            </a:r>
+            <a:r>
+              <a:rPr lang="en-US" dirty="0"/>
+              <a:t>Linux </a:t>
+            </a:r>
+            <a:r>
+              <a:rPr lang="ru-RU" dirty="0"/>
+              <a:t>нет. Но они существовали и использовались долгое время и вы до сих пор можете с ними столкнуться в статьях, поэтому посвятим им несколько слов.</a:t>
+            </a:r>
+            <a:endParaRPr lang="en-US" dirty="0"/>
+          </a:p>
+          <a:p>
+            <a:endParaRPr lang="en-US" dirty="0"/>
+          </a:p>
+          <a:p>
+            <a:r>
+              <a:rPr lang="ru-RU" dirty="0"/>
+              <a:t>Основная идея заключается в том, что мы можем заранее для всех используемых </a:t>
+            </a:r>
+            <a:r>
+              <a:rPr lang="en-US" dirty="0"/>
+              <a:t>DLL </a:t>
+            </a:r>
+            <a:r>
+              <a:rPr lang="ru-RU" dirty="0"/>
+              <a:t>выбрать непересекающиеся адреса в адресном простанстве процесса и слинковать их, исходя из того что они будут загружены по этим адресам. Загрузчик при загрузке увидит что адреса свободны и не будет проводить релокацию.</a:t>
             </a:r>
             <a:endParaRPr lang="en-US" dirty="0"/>
           </a:p>
@@ -4619,7 +4554,7 @@
           <a:p>
             <a:fld id="{3AC94D10-082F-46D7-A834-266F9222130F}" type="slidenum">
               <a:rPr lang="en-US" smtClean="0"/>
-              <a:t>45</a:t>
+              <a:t>43</a:t>
             </a:fld>
             <a:endParaRPr lang="en-US"/>
           </a:p>
@@ -4628,7 +4563,7 @@
     </p:spTree>
     <p:extLst>
       <p:ext uri="{BB962C8B-B14F-4D97-AF65-F5344CB8AC3E}">
-        <p14:creationId xmlns:p14="http://schemas.microsoft.com/office/powerpoint/2010/main" val="3397731765"/>
+        <p14:creationId xmlns:p14="http://schemas.microsoft.com/office/powerpoint/2010/main" val="3043525197"/>
       </p:ext>
     </p:extLst>
   </p:cSld>
@@ -4684,47 +4619,31 @@
           <a:p>
             <a:r>
               <a:rPr lang="ru-RU" dirty="0"/>
-              <a:t>Самый простой подход к связыванию символов</a:t>
-            </a:r>
-            <a:r>
-              <a:rPr lang="en-US" dirty="0"/>
-              <a:t>: </a:t>
-            </a:r>
-            <a:r>
-              <a:rPr lang="ru-RU" dirty="0"/>
-              <a:t>оптимизация размера соответсвующих таблиц поиска. Обычно рекомендуется использовать две опции</a:t>
-            </a:r>
-            <a:r>
-              <a:rPr lang="en-US" dirty="0"/>
-              <a:t>: hash-style </a:t>
-            </a:r>
-            <a:r>
-              <a:rPr lang="ru-RU" dirty="0"/>
-              <a:t>и </a:t>
-            </a:r>
-            <a:r>
-              <a:rPr lang="en-US" dirty="0"/>
-              <a:t>O1. </a:t>
-            </a:r>
-            <a:r>
-              <a:rPr lang="ru-RU" dirty="0"/>
-              <a:t>Первая из них уже по умолчанию включена в современных дистрибутивах (</a:t>
-            </a:r>
-            <a:r>
-              <a:rPr lang="en-US" dirty="0"/>
-              <a:t>RHEL </a:t>
-            </a:r>
-            <a:r>
-              <a:rPr lang="ru-RU" dirty="0"/>
-              <a:t>и </a:t>
-            </a:r>
-            <a:r>
-              <a:rPr lang="en-US" dirty="0"/>
-              <a:t>Ubuntu)</a:t>
-            </a:r>
-            <a:r>
-              <a:rPr lang="ru-RU" dirty="0"/>
-              <a:t>, а вторая по моим замерам не оказывает существенного влияния на производительность.</a:t>
+              <a:t>Решение это было реализовано и для </a:t>
+            </a:r>
+            <a:r>
+              <a:rPr lang="en-US" dirty="0"/>
+              <a:t>Windows, </a:t>
+            </a:r>
+            <a:r>
+              <a:rPr lang="ru-RU" dirty="0"/>
+              <a:t>и для </a:t>
+            </a:r>
+            <a:r>
+              <a:rPr lang="en-US" dirty="0"/>
+              <a:t>Linux, </a:t>
+            </a:r>
+            <a:r>
+              <a:rPr lang="ru-RU" dirty="0"/>
+              <a:t>но к сожалению вошло в противоречие с современными требованиями к безопасности, которые заключаются в том, что адрес загрузки </a:t>
+            </a:r>
+            <a:r>
+              <a:rPr lang="en-US" dirty="0"/>
+              <a:t>DLL </a:t>
+            </a:r>
+            <a:r>
+              <a:rPr lang="ru-RU" dirty="0"/>
+              <a:t>должен быть случайным (чтобы не упрощать подбор адресов хакерам).</a:t>
             </a:r>
             <a:endParaRPr lang="en-US" dirty="0"/>
           </a:p>
@@ -4734,9 +4653,32 @@
           <a:p>
             <a:r>
               <a:rPr lang="ru-RU" dirty="0"/>
-              <a:t>Резюмируя данный слайд можно сказать что дефолтные настройки тулчейнов в данном контексте оптимальны.</a:t>
-            </a:r>
-            <a:endParaRPr lang="en-US" dirty="0"/>
+              <a:t>Поэтому сейчас этот метод не применяется</a:t>
+            </a:r>
+            <a:r>
+              <a:rPr lang="en-US" dirty="0"/>
+              <a:t>, </a:t>
+            </a:r>
+            <a:r>
+              <a:rPr lang="ru-RU" dirty="0"/>
+              <a:t>а поддержка </a:t>
+            </a:r>
+            <a:r>
+              <a:rPr lang="en-US" dirty="0" err="1"/>
+              <a:t>Prelink</a:t>
+            </a:r>
+            <a:r>
+              <a:rPr lang="en-US" dirty="0"/>
+              <a:t> </a:t>
+            </a:r>
+            <a:r>
+              <a:rPr lang="ru-RU" dirty="0"/>
+              <a:t>даже была удалена в последних версиях </a:t>
+            </a:r>
+            <a:r>
+              <a:rPr lang="en-US" dirty="0"/>
+              <a:t>Glibc.</a:t>
+            </a:r>
           </a:p>
         </p:txBody>
       </p:sp>
@@ -4757,7 +4699,7 @@
           <a:p>
             <a:fld id="{3AC94D10-082F-46D7-A834-266F9222130F}" type="slidenum">
               <a:rPr lang="en-US" smtClean="0"/>
-              <a:t>46</a:t>
+              <a:t>44</a:t>
             </a:fld>
             <a:endParaRPr lang="en-US"/>
           </a:p>
@@ -4766,7 +4708,7 @@
     </p:spTree>
     <p:extLst>
       <p:ext uri="{BB962C8B-B14F-4D97-AF65-F5344CB8AC3E}">
-        <p14:creationId xmlns:p14="http://schemas.microsoft.com/office/powerpoint/2010/main" val="1118954411"/>
+        <p14:creationId xmlns:p14="http://schemas.microsoft.com/office/powerpoint/2010/main" val="1998125518"/>
       </p:ext>
     </p:extLst>
   </p:cSld>
@@ -4822,57 +4764,7 @@
           <a:p>
             <a:r>
               <a:rPr lang="ru-RU" dirty="0"/>
-              <a:t>Самый простой подход к связыванию символов</a:t>
-            </a:r>
-            <a:r>
-              <a:rPr lang="en-US" dirty="0"/>
-              <a:t>: </a:t>
-            </a:r>
-            <a:r>
-              <a:rPr lang="ru-RU" dirty="0"/>
-              <a:t>оптимизация размера соответсвующих таблиц поиска. Обычно рекомендуется использовать две опции</a:t>
-            </a:r>
-            <a:r>
-              <a:rPr lang="en-US" dirty="0"/>
-              <a:t>: hash-style </a:t>
-            </a:r>
-            <a:r>
-              <a:rPr lang="ru-RU" dirty="0"/>
-              <a:t>и </a:t>
-            </a:r>
-            <a:r>
-              <a:rPr lang="en-US" dirty="0"/>
-              <a:t>O1. </a:t>
-            </a:r>
-            <a:r>
-              <a:rPr lang="ru-RU" dirty="0"/>
-              <a:t>Первая из них уже по умолчанию включена в современных дистрибутивах (</a:t>
-            </a:r>
-            <a:r>
-              <a:rPr lang="en-US" dirty="0"/>
-              <a:t>RHEL </a:t>
-            </a:r>
-            <a:r>
-              <a:rPr lang="ru-RU" dirty="0"/>
-              <a:t>и </a:t>
-            </a:r>
-            <a:r>
-              <a:rPr lang="en-US" dirty="0"/>
-              <a:t>Ubuntu)</a:t>
-            </a:r>
-            <a:r>
-              <a:rPr lang="ru-RU" dirty="0"/>
-              <a:t>, а вторая по моим замерам не оказывает существенного влияния на производительность.</a:t>
-            </a:r>
-            <a:endParaRPr lang="en-US" dirty="0"/>
-          </a:p>
-          <a:p>
-            <a:endParaRPr lang="en-US" dirty="0"/>
-          </a:p>
-          <a:p>
-            <a:r>
-              <a:rPr lang="ru-RU" dirty="0"/>
-              <a:t>Резюмируя данный слайд можно сказать что дефолтные настройки тулчейнов в данном контексте оптимальны.</a:t>
+              <a:t>Обратимся теперь к накладным расходам на связывание символов.</a:t>
             </a:r>
             <a:endParaRPr lang="en-US" dirty="0"/>
           </a:p>
@@ -4895,7 +4787,7 @@
           <a:p>
             <a:fld id="{3AC94D10-082F-46D7-A834-266F9222130F}" type="slidenum">
               <a:rPr lang="en-US" smtClean="0"/>
-              <a:t>47</a:t>
+              <a:t>45</a:t>
             </a:fld>
             <a:endParaRPr lang="en-US"/>
           </a:p>
@@ -4904,7 +4796,7 @@
     </p:spTree>
     <p:extLst>
       <p:ext uri="{BB962C8B-B14F-4D97-AF65-F5344CB8AC3E}">
-        <p14:creationId xmlns:p14="http://schemas.microsoft.com/office/powerpoint/2010/main" val="1525720301"/>
+        <p14:creationId xmlns:p14="http://schemas.microsoft.com/office/powerpoint/2010/main" val="3397731765"/>
       </p:ext>
     </p:extLst>
   </p:cSld>
@@ -4960,32 +4852,19 @@
           <a:p>
             <a:r>
               <a:rPr lang="ru-RU" dirty="0"/>
-              <a:t>Мы уже упоминали что ленивое связывание на </a:t>
-            </a:r>
-            <a:r>
-              <a:rPr lang="en-US" dirty="0"/>
-              <a:t>Linux </a:t>
-            </a:r>
-            <a:r>
-              <a:rPr lang="ru-RU" dirty="0"/>
-              <a:t>добавляет лишний вызов заглушки при вызове библиотечной функции.</a:t>
-            </a:r>
-          </a:p>
-          <a:p>
-            <a:endParaRPr lang="ru-RU" dirty="0"/>
-          </a:p>
-          <a:p>
-            <a:r>
-              <a:rPr lang="ru-RU" dirty="0"/>
-              <a:t>Современные </a:t>
-            </a:r>
-            <a:r>
-              <a:rPr lang="en-US" dirty="0" err="1"/>
-              <a:t>gcc</a:t>
-            </a:r>
-            <a:r>
-              <a:rPr lang="en-US" dirty="0"/>
-              <a:t> </a:t>
+              <a:t>Самый простой подход к связыванию символов</a:t>
+            </a:r>
+            <a:r>
+              <a:rPr lang="en-US" dirty="0"/>
+              <a:t>: </a:t>
+            </a:r>
+            <a:r>
+              <a:rPr lang="ru-RU" dirty="0"/>
+              <a:t>оптимизация размера соответсвующих таблиц поиска. Обычно рекомендуется использовать две опции</a:t>
+            </a:r>
+            <a:r>
+              <a:rPr lang="en-US" dirty="0"/>
+              <a:t>: hash-style </a:t>
             </a:r>
             <a:r>
               <a:rPr lang="ru-RU" dirty="0"/>
@@ -4993,77 +4872,37 @@
             </a:r>
             <a:r>
               <a:rPr lang="en-US" dirty="0"/>
-              <a:t>clang </a:t>
-            </a:r>
-            <a:r>
-              <a:rPr lang="ru-RU" dirty="0"/>
-              <a:t>позволяют избежать этого с помощью специальной опции компиляции</a:t>
-            </a:r>
-            <a:r>
-              <a:rPr lang="en-US" dirty="0"/>
-              <a:t> –</a:t>
-            </a:r>
-            <a:r>
-              <a:rPr lang="en-US" dirty="0" err="1"/>
-              <a:t>fno-plt</a:t>
-            </a:r>
-            <a:r>
-              <a:rPr lang="en-US" dirty="0"/>
-              <a:t>.</a:t>
-            </a:r>
-          </a:p>
-          <a:p>
+              <a:t>O1. </a:t>
+            </a:r>
+            <a:r>
+              <a:rPr lang="ru-RU" dirty="0"/>
+              <a:t>Первая из них уже по умолчанию включена в современных дистрибутивах (</a:t>
+            </a:r>
+            <a:r>
+              <a:rPr lang="en-US" dirty="0"/>
+              <a:t>RHEL </a:t>
+            </a:r>
+            <a:r>
+              <a:rPr lang="ru-RU" dirty="0"/>
+              <a:t>и </a:t>
+            </a:r>
+            <a:r>
+              <a:rPr lang="en-US" dirty="0"/>
+              <a:t>Ubuntu)</a:t>
+            </a:r>
+            <a:r>
+              <a:rPr lang="ru-RU" dirty="0"/>
+              <a:t>, а вторая по моим замерам не оказывает существенного влияния на производительность.</a:t>
+            </a:r>
             <a:endParaRPr lang="en-US" dirty="0"/>
           </a:p>
           <a:p>
-            <a:r>
-              <a:rPr lang="ru-RU" dirty="0"/>
-              <a:t>Её использование замедлит загрузку </a:t>
-            </a:r>
-            <a:r>
-              <a:rPr lang="en-US" dirty="0"/>
-              <a:t>DLL</a:t>
-            </a:r>
-            <a:r>
-              <a:rPr lang="ru-RU" dirty="0"/>
-              <a:t>, т.к. теперь все функции потребуется разрешить и связать на старте программы, но с другой стороны ускорит работу программы в дальнейшем, т.к. избавится от </a:t>
-            </a:r>
-            <a:r>
-              <a:rPr lang="en-US" dirty="0"/>
-              <a:t>PLT-</a:t>
-            </a:r>
-            <a:r>
-              <a:rPr lang="ru-RU" dirty="0"/>
-              <a:t>заглушки</a:t>
-            </a:r>
-            <a:r>
-              <a:rPr lang="en-US" dirty="0"/>
-              <a:t>.</a:t>
-            </a:r>
-          </a:p>
-          <a:p>
             <a:endParaRPr lang="en-US" dirty="0"/>
           </a:p>
           <a:p>
             <a:r>
               <a:rPr lang="ru-RU" dirty="0"/>
-              <a:t>Также этот флаг позволит загружать адрес функции из таблицы </a:t>
-            </a:r>
-            <a:r>
-              <a:rPr lang="en-US" dirty="0"/>
-              <a:t>GOT </a:t>
-            </a:r>
-            <a:r>
-              <a:rPr lang="ru-RU" dirty="0"/>
-              <a:t>только один раз на несколько вызовов одной и той же функции</a:t>
-            </a:r>
-            <a:r>
-              <a:rPr lang="en-US" dirty="0"/>
-              <a:t>, </a:t>
-            </a:r>
-            <a:r>
-              <a:rPr lang="ru-RU" dirty="0"/>
-              <a:t>т.е. сократит количество обращений в память.</a:t>
+              <a:t>Резюмируя данный слайд можно сказать что дефолтные настройки тулчейнов в данном контексте оптимальны.</a:t>
             </a:r>
             <a:endParaRPr lang="en-US" dirty="0"/>
           </a:p>
@@ -5086,7 +4925,7 @@
           <a:p>
             <a:fld id="{3AC94D10-082F-46D7-A834-266F9222130F}" type="slidenum">
               <a:rPr lang="en-US" smtClean="0"/>
-              <a:t>48</a:t>
+              <a:t>46</a:t>
             </a:fld>
             <a:endParaRPr lang="en-US"/>
           </a:p>
@@ -5095,7 +4934,7 @@
     </p:spTree>
     <p:extLst>
       <p:ext uri="{BB962C8B-B14F-4D97-AF65-F5344CB8AC3E}">
-        <p14:creationId xmlns:p14="http://schemas.microsoft.com/office/powerpoint/2010/main" val="305821099"/>
+        <p14:creationId xmlns:p14="http://schemas.microsoft.com/office/powerpoint/2010/main" val="1118954411"/>
       </p:ext>
     </p:extLst>
   </p:cSld>
@@ -5149,6 +4988,60 @@
           <a:bodyPr/>
           <a:lstStyle/>
           <a:p>
+            <a:r>
+              <a:rPr lang="ru-RU" dirty="0"/>
+              <a:t>Самый простой подход к связыванию символов</a:t>
+            </a:r>
+            <a:r>
+              <a:rPr lang="en-US" dirty="0"/>
+              <a:t>: </a:t>
+            </a:r>
+            <a:r>
+              <a:rPr lang="ru-RU" dirty="0"/>
+              <a:t>оптимизация размера соответсвующих таблиц поиска. Обычно рекомендуется использовать две опции</a:t>
+            </a:r>
+            <a:r>
+              <a:rPr lang="en-US" dirty="0"/>
+              <a:t>: hash-style </a:t>
+            </a:r>
+            <a:r>
+              <a:rPr lang="ru-RU" dirty="0"/>
+              <a:t>и </a:t>
+            </a:r>
+            <a:r>
+              <a:rPr lang="en-US" dirty="0"/>
+              <a:t>O1. </a:t>
+            </a:r>
+            <a:r>
+              <a:rPr lang="ru-RU" dirty="0"/>
+              <a:t>Первая из них уже по умолчанию включена в современных дистрибутивах (</a:t>
+            </a:r>
+            <a:r>
+              <a:rPr lang="en-US" dirty="0"/>
+              <a:t>RHEL </a:t>
+            </a:r>
+            <a:r>
+              <a:rPr lang="ru-RU" dirty="0"/>
+              <a:t>и </a:t>
+            </a:r>
+            <a:r>
+              <a:rPr lang="en-US" dirty="0"/>
+              <a:t>Ubuntu)</a:t>
+            </a:r>
+            <a:r>
+              <a:rPr lang="ru-RU" dirty="0"/>
+              <a:t>, а вторая по моим замерам не оказывает существенного влияния на производительность.</a:t>
+            </a:r>
+            <a:endParaRPr lang="en-US" dirty="0"/>
+          </a:p>
+          <a:p>
+            <a:endParaRPr lang="en-US" dirty="0"/>
+          </a:p>
+          <a:p>
+            <a:r>
+              <a:rPr lang="ru-RU" dirty="0"/>
+              <a:t>Резюмируя данный слайд можно сказать что дефолтные настройки тулчейнов в данном контексте оптимальны.</a:t>
+            </a:r>
             <a:endParaRPr lang="en-US" dirty="0"/>
           </a:p>
         </p:txBody>
@@ -5170,7 +5063,7 @@
           <a:p>
             <a:fld id="{3AC94D10-082F-46D7-A834-266F9222130F}" type="slidenum">
               <a:rPr lang="en-US" smtClean="0"/>
-              <a:t>49</a:t>
+              <a:t>47</a:t>
             </a:fld>
             <a:endParaRPr lang="en-US"/>
           </a:p>
@@ -5179,7 +5072,7 @@
     </p:spTree>
     <p:extLst>
       <p:ext uri="{BB962C8B-B14F-4D97-AF65-F5344CB8AC3E}">
-        <p14:creationId xmlns:p14="http://schemas.microsoft.com/office/powerpoint/2010/main" val="3696372151"/>
+        <p14:creationId xmlns:p14="http://schemas.microsoft.com/office/powerpoint/2010/main" val="1525720301"/>
       </p:ext>
     </p:extLst>
   </p:cSld>
@@ -5233,6 +5126,113 @@
           <a:bodyPr/>
           <a:lstStyle/>
           <a:p>
+            <a:r>
+              <a:rPr lang="ru-RU" dirty="0"/>
+              <a:t>Мы уже упоминали что ленивое связывание на </a:t>
+            </a:r>
+            <a:r>
+              <a:rPr lang="en-US" dirty="0"/>
+              <a:t>Linux </a:t>
+            </a:r>
+            <a:r>
+              <a:rPr lang="ru-RU" dirty="0"/>
+              <a:t>добавляет лишний вызов заглушки при вызове библиотечной функции.</a:t>
+            </a:r>
+          </a:p>
+          <a:p>
+            <a:endParaRPr lang="ru-RU" dirty="0"/>
+          </a:p>
+          <a:p>
+            <a:r>
+              <a:rPr lang="ru-RU" dirty="0"/>
+              <a:t>Современные </a:t>
+            </a:r>
+            <a:r>
+              <a:rPr lang="en-US" dirty="0" err="1"/>
+              <a:t>gcc</a:t>
+            </a:r>
+            <a:r>
+              <a:rPr lang="en-US" dirty="0"/>
+              <a:t> </a:t>
+            </a:r>
+            <a:r>
+              <a:rPr lang="ru-RU" dirty="0"/>
+              <a:t>и </a:t>
+            </a:r>
+            <a:r>
+              <a:rPr lang="en-US" dirty="0"/>
+              <a:t>clang </a:t>
+            </a:r>
+            <a:r>
+              <a:rPr lang="ru-RU" dirty="0"/>
+              <a:t>позволяют избежать этого с помощью специальной опции компиляции</a:t>
+            </a:r>
+            <a:r>
+              <a:rPr lang="en-US" dirty="0"/>
+              <a:t> –</a:t>
+            </a:r>
+            <a:r>
+              <a:rPr lang="en-US" dirty="0" err="1"/>
+              <a:t>fno-plt</a:t>
+            </a:r>
+            <a:r>
+              <a:rPr lang="en-US" dirty="0"/>
+              <a:t>.</a:t>
+            </a:r>
+          </a:p>
+          <a:p>
+            <a:endParaRPr lang="en-US" dirty="0"/>
+          </a:p>
+          <a:p>
+            <a:r>
+              <a:rPr lang="ru-RU" dirty="0"/>
+              <a:t>Её использование замедлит загрузку </a:t>
+            </a:r>
+            <a:r>
+              <a:rPr lang="en-US" dirty="0"/>
+              <a:t>DLL</a:t>
+            </a:r>
+            <a:r>
+              <a:rPr lang="ru-RU" dirty="0"/>
+              <a:t>, т.к. теперь все функции потребуется разрешить и связать на старте программы, но с другой стороны ускорит работу программы в дальнейшем, т.к. избавится от </a:t>
+            </a:r>
+            <a:r>
+              <a:rPr lang="en-US" dirty="0"/>
+              <a:t>PLT-</a:t>
+            </a:r>
+            <a:r>
+              <a:rPr lang="ru-RU" dirty="0"/>
+              <a:t>заглушки</a:t>
+            </a:r>
+            <a:r>
+              <a:rPr lang="en-US" dirty="0"/>
+              <a:t>.</a:t>
+            </a:r>
+          </a:p>
+          <a:p>
+            <a:endParaRPr lang="en-US" dirty="0"/>
+          </a:p>
+          <a:p>
+            <a:r>
+              <a:rPr lang="ru-RU" dirty="0"/>
+              <a:t>Также этот флаг позволит загружать адрес функции из таблицы </a:t>
+            </a:r>
+            <a:r>
+              <a:rPr lang="en-US" dirty="0"/>
+              <a:t>GOT </a:t>
+            </a:r>
+            <a:r>
+              <a:rPr lang="ru-RU" dirty="0"/>
+              <a:t>только один раз на несколько вызовов одной и той же функции</a:t>
+            </a:r>
+            <a:r>
+              <a:rPr lang="en-US" dirty="0"/>
+              <a:t>, </a:t>
+            </a:r>
+            <a:r>
+              <a:rPr lang="ru-RU" dirty="0"/>
+              <a:t>т.е. сократит количество обращений в память.</a:t>
+            </a:r>
             <a:endParaRPr lang="en-US" dirty="0"/>
           </a:p>
         </p:txBody>
@@ -5254,7 +5254,7 @@
           <a:p>
             <a:fld id="{3AC94D10-082F-46D7-A834-266F9222130F}" type="slidenum">
               <a:rPr lang="en-US" smtClean="0"/>
-              <a:t>50</a:t>
+              <a:t>48</a:t>
             </a:fld>
             <a:endParaRPr lang="en-US"/>
           </a:p>
@@ -5263,7 +5263,7 @@
     </p:spTree>
     <p:extLst>
       <p:ext uri="{BB962C8B-B14F-4D97-AF65-F5344CB8AC3E}">
-        <p14:creationId xmlns:p14="http://schemas.microsoft.com/office/powerpoint/2010/main" val="1863594613"/>
+        <p14:creationId xmlns:p14="http://schemas.microsoft.com/office/powerpoint/2010/main" val="305821099"/>
       </p:ext>
     </p:extLst>
   </p:cSld>
@@ -5317,24 +5317,7 @@
           <a:bodyPr/>
           <a:lstStyle/>
           <a:p>
-            <a:r>
-              <a:rPr lang="ru-RU" dirty="0"/>
-              <a:t>Перейдём наконец к последнему пункту в списке накладных расходов. А именно рассмотрим как можно ускорить вызовы библиотечных функций.</a:t>
-            </a:r>
             <a:endParaRPr lang="en-US" dirty="0"/>
-          </a:p>
-          <a:p>
-            <a:endParaRPr lang="en-US" dirty="0"/>
-          </a:p>
-          <a:p>
-            <a:r>
-              <a:rPr lang="ru-RU" dirty="0"/>
-              <a:t>Эта часть в основном будет посвящена </a:t>
-            </a:r>
-            <a:r>
-              <a:rPr lang="en-US" dirty="0"/>
-              <a:t>Linux.</a:t>
-            </a:r>
           </a:p>
         </p:txBody>
       </p:sp>
@@ -5355,7 +5338,7 @@
           <a:p>
             <a:fld id="{3AC94D10-082F-46D7-A834-266F9222130F}" type="slidenum">
               <a:rPr lang="en-US" smtClean="0"/>
-              <a:t>51</a:t>
+              <a:t>49</a:t>
             </a:fld>
             <a:endParaRPr lang="en-US"/>
           </a:p>
@@ -5364,7 +5347,7 @@
     </p:spTree>
     <p:extLst>
       <p:ext uri="{BB962C8B-B14F-4D97-AF65-F5344CB8AC3E}">
-        <p14:creationId xmlns:p14="http://schemas.microsoft.com/office/powerpoint/2010/main" val="3270444806"/>
+        <p14:creationId xmlns:p14="http://schemas.microsoft.com/office/powerpoint/2010/main" val="3696372151"/>
       </p:ext>
     </p:extLst>
   </p:cSld>
@@ -5418,53 +5401,6 @@
           <a:bodyPr/>
           <a:lstStyle/>
           <a:p>
-            <a:r>
-              <a:rPr lang="ru-RU" dirty="0"/>
-              <a:t>Дело в том что на </a:t>
-            </a:r>
-            <a:r>
-              <a:rPr lang="en-US" dirty="0"/>
-              <a:t>Linux </a:t>
-            </a:r>
-            <a:r>
-              <a:rPr lang="ru-RU" dirty="0"/>
-              <a:t>все библиотечные функции по умолчанию являются экспортируемыми (для того чтобы </a:t>
-            </a:r>
-            <a:r>
-              <a:rPr lang="en-US" dirty="0"/>
-              <a:t>DLL </a:t>
-            </a:r>
-            <a:r>
-              <a:rPr lang="ru-RU" dirty="0"/>
-              <a:t>были более похожи на статические библиотеки).</a:t>
-            </a:r>
-            <a:endParaRPr lang="en-US" dirty="0"/>
-          </a:p>
-          <a:p>
-            <a:endParaRPr lang="ru-RU" dirty="0"/>
-          </a:p>
-          <a:p>
-            <a:r>
-              <a:rPr lang="ru-RU" dirty="0"/>
-              <a:t>Это приводит к тому что вызовы функций даже внутри библиотеки делаются не напрямую, а через таблицу диспетчеризации, с соответствующими накладными расходами</a:t>
-            </a:r>
-            <a:r>
-              <a:rPr lang="en-US" dirty="0"/>
-              <a:t> </a:t>
-            </a:r>
-            <a:r>
-              <a:rPr lang="ru-RU" dirty="0"/>
-              <a:t>на косвенные вызовы.</a:t>
-            </a:r>
-          </a:p>
-          <a:p>
-            <a:endParaRPr lang="ru-RU" dirty="0"/>
-          </a:p>
-          <a:p>
-            <a:r>
-              <a:rPr lang="ru-RU" dirty="0"/>
-              <a:t>Кроме того из-за того что функции экспортируются возникает возможность их перехвата и компилятору приходится это учитывать и существенно ограничивать оптимизации.</a:t>
-            </a:r>
             <a:endParaRPr lang="en-US" dirty="0"/>
           </a:p>
         </p:txBody>
@@ -5486,7 +5422,7 @@
           <a:p>
             <a:fld id="{3AC94D10-082F-46D7-A834-266F9222130F}" type="slidenum">
               <a:rPr lang="en-US" smtClean="0"/>
-              <a:t>52</a:t>
+              <a:t>50</a:t>
             </a:fld>
             <a:endParaRPr lang="en-US"/>
           </a:p>
@@ -5495,7 +5431,7 @@
     </p:spTree>
     <p:extLst>
       <p:ext uri="{BB962C8B-B14F-4D97-AF65-F5344CB8AC3E}">
-        <p14:creationId xmlns:p14="http://schemas.microsoft.com/office/powerpoint/2010/main" val="1185757282"/>
+        <p14:creationId xmlns:p14="http://schemas.microsoft.com/office/powerpoint/2010/main" val="1863594613"/>
       </p:ext>
     </p:extLst>
   </p:cSld>
@@ -5551,57 +5487,22 @@
           <a:p>
             <a:r>
               <a:rPr lang="ru-RU" dirty="0"/>
-              <a:t>На данном слайде можно видеть пример отмены оптимизации</a:t>
-            </a:r>
-            <a:r>
-              <a:rPr lang="en-US" dirty="0"/>
-              <a:t>: </a:t>
-            </a:r>
-            <a:r>
-              <a:rPr lang="ru-RU" dirty="0"/>
-              <a:t>компилятор не может</a:t>
-            </a:r>
-            <a:r>
-              <a:rPr lang="en-US" dirty="0"/>
-              <a:t> </a:t>
-            </a:r>
-            <a:r>
-              <a:rPr lang="ru-RU" dirty="0"/>
-              <a:t>встроить вызов </a:t>
-            </a:r>
-            <a:r>
-              <a:rPr lang="en-US" dirty="0"/>
-              <a:t>foo </a:t>
-            </a:r>
-            <a:r>
-              <a:rPr lang="ru-RU" dirty="0"/>
-              <a:t>в </a:t>
-            </a:r>
-            <a:r>
-              <a:rPr lang="en-US" dirty="0"/>
-              <a:t>bar </a:t>
-            </a:r>
-            <a:r>
-              <a:rPr lang="ru-RU" dirty="0"/>
-              <a:t>из-за того что </a:t>
-            </a:r>
-            <a:r>
-              <a:rPr lang="en-US" dirty="0"/>
-              <a:t>foo </a:t>
-            </a:r>
-            <a:r>
-              <a:rPr lang="ru-RU" dirty="0"/>
-              <a:t>может быть перехвачена в рантайме</a:t>
-            </a:r>
-            <a:r>
-              <a:rPr lang="en-US" dirty="0"/>
-              <a:t> (</a:t>
-            </a:r>
-            <a:r>
-              <a:rPr lang="ru-RU" dirty="0"/>
-              <a:t>и соответственно её семантика может быть изменена).</a:t>
+              <a:t>Перейдём наконец к последнему пункту в списке накладных расходов. А именно рассмотрим как можно ускорить вызовы библиотечных функций.</a:t>
             </a:r>
             <a:endParaRPr lang="en-US" dirty="0"/>
+          </a:p>
+          <a:p>
+            <a:endParaRPr lang="en-US" dirty="0"/>
+          </a:p>
+          <a:p>
+            <a:r>
+              <a:rPr lang="ru-RU" dirty="0"/>
+              <a:t>Эта часть в основном будет посвящена </a:t>
+            </a:r>
+            <a:r>
+              <a:rPr lang="en-US" dirty="0"/>
+              <a:t>Linux.</a:t>
+            </a:r>
           </a:p>
         </p:txBody>
       </p:sp>
@@ -5622,7 +5523,7 @@
           <a:p>
             <a:fld id="{3AC94D10-082F-46D7-A834-266F9222130F}" type="slidenum">
               <a:rPr lang="en-US" smtClean="0"/>
-              <a:t>53</a:t>
+              <a:t>51</a:t>
             </a:fld>
             <a:endParaRPr lang="en-US"/>
           </a:p>
@@ -5631,7 +5532,7 @@
     </p:spTree>
     <p:extLst>
       <p:ext uri="{BB962C8B-B14F-4D97-AF65-F5344CB8AC3E}">
-        <p14:creationId xmlns:p14="http://schemas.microsoft.com/office/powerpoint/2010/main" val="2752840744"/>
+        <p14:creationId xmlns:p14="http://schemas.microsoft.com/office/powerpoint/2010/main" val="3270444806"/>
       </p:ext>
     </p:extLst>
   </p:cSld>
@@ -5687,8 +5588,25 @@
           <a:p>
             <a:r>
               <a:rPr lang="ru-RU" dirty="0"/>
-              <a:t>Бороться с таким неэффективным поведением можно несколькими способами.</a:t>
-            </a:r>
+              <a:t>Дело в том что на </a:t>
+            </a:r>
+            <a:r>
+              <a:rPr lang="en-US" dirty="0"/>
+              <a:t>Linux </a:t>
+            </a:r>
+            <a:r>
+              <a:rPr lang="ru-RU" dirty="0"/>
+              <a:t>все библиотечные функции по умолчанию являются экспортируемыми (для того чтобы </a:t>
+            </a:r>
+            <a:r>
+              <a:rPr lang="en-US" dirty="0"/>
+              <a:t>DLL </a:t>
+            </a:r>
+            <a:r>
+              <a:rPr lang="ru-RU" dirty="0"/>
+              <a:t>были более похожи на статические библиотеки).</a:t>
+            </a:r>
+            <a:endParaRPr lang="en-US" dirty="0"/>
           </a:p>
           <a:p>
             <a:endParaRPr lang="ru-RU" dirty="0"/>
@@ -5696,61 +5614,24 @@
           <a:p>
             <a:r>
               <a:rPr lang="ru-RU" dirty="0"/>
-              <a:t>Во-первых есть специальные флаги компиляции</a:t>
-            </a:r>
-            <a:r>
-              <a:rPr lang="en-US" dirty="0"/>
-              <a:t>: </a:t>
-            </a:r>
-            <a:r>
-              <a:rPr lang="ru-RU" dirty="0"/>
-              <a:t>один, </a:t>
-            </a:r>
-            <a:r>
-              <a:rPr lang="en-US" dirty="0"/>
-              <a:t>-</a:t>
-            </a:r>
-            <a:r>
-              <a:rPr lang="en-US" dirty="0" err="1"/>
-              <a:t>Bsymbolic</a:t>
-            </a:r>
-            <a:r>
-              <a:rPr lang="ru-RU" dirty="0"/>
-              <a:t>, для линковки, чтобы вместо косвенных вызовы внутренних функций </a:t>
-            </a:r>
-            <a:r>
-              <a:rPr lang="en-US" dirty="0"/>
-              <a:t>DLL </a:t>
-            </a:r>
-            <a:r>
-              <a:rPr lang="ru-RU" dirty="0"/>
-              <a:t>использовать прямые. А второй</a:t>
-            </a:r>
-            <a:r>
-              <a:rPr lang="en-US" dirty="0"/>
-              <a:t>, -</a:t>
-            </a:r>
-            <a:r>
-              <a:rPr lang="en-US" dirty="0" err="1"/>
-              <a:t>fno</a:t>
-            </a:r>
-            <a:r>
-              <a:rPr lang="en-US" dirty="0"/>
-              <a:t>-semantic-interposition, </a:t>
-            </a:r>
-            <a:r>
-              <a:rPr lang="ru-RU" dirty="0"/>
-              <a:t>чтобы позволить компилятору при оптимизации игнорировать возможность перехвата функций.</a:t>
-            </a:r>
-            <a:endParaRPr lang="en-US" dirty="0"/>
-          </a:p>
-          <a:p>
-            <a:endParaRPr lang="en-US" dirty="0"/>
-          </a:p>
-          <a:p>
-            <a:r>
-              <a:rPr lang="ru-RU" dirty="0"/>
-              <a:t>Для оптимальной производительности требуется включить оба флага.</a:t>
+              <a:t>Это приводит к тому что вызовы функций даже внутри библиотеки делаются не напрямую, а через таблицу диспетчеризации, с соответствующими накладными расходами</a:t>
+            </a:r>
+            <a:r>
+              <a:rPr lang="en-US" dirty="0"/>
+              <a:t> </a:t>
+            </a:r>
+            <a:r>
+              <a:rPr lang="ru-RU" dirty="0"/>
+              <a:t>на косвенные вызовы.</a:t>
+            </a:r>
+          </a:p>
+          <a:p>
+            <a:endParaRPr lang="ru-RU" dirty="0"/>
+          </a:p>
+          <a:p>
+            <a:r>
+              <a:rPr lang="ru-RU" dirty="0"/>
+              <a:t>Кроме того из-за того что функции экспортируются возникает возможность их перехвата и компилятору приходится это учитывать и существенно ограничивать оптимизации.</a:t>
             </a:r>
             <a:endParaRPr lang="en-US" dirty="0"/>
           </a:p>
@@ -5773,7 +5654,7 @@
           <a:p>
             <a:fld id="{3AC94D10-082F-46D7-A834-266F9222130F}" type="slidenum">
               <a:rPr lang="en-US" smtClean="0"/>
-              <a:t>54</a:t>
+              <a:t>52</a:t>
             </a:fld>
             <a:endParaRPr lang="en-US"/>
           </a:p>
@@ -5782,7 +5663,7 @@
     </p:spTree>
     <p:extLst>
       <p:ext uri="{BB962C8B-B14F-4D97-AF65-F5344CB8AC3E}">
-        <p14:creationId xmlns:p14="http://schemas.microsoft.com/office/powerpoint/2010/main" val="3733641060"/>
+        <p14:creationId xmlns:p14="http://schemas.microsoft.com/office/powerpoint/2010/main" val="1185757282"/>
       </p:ext>
     </p:extLst>
   </p:cSld>
@@ -5953,24 +5834,15 @@
           <a:p>
             <a:r>
               <a:rPr lang="ru-RU" dirty="0"/>
-              <a:t>Помимо использования флагов есть второй, более традиционный способ, который заключается в сокращении интерфейса библиотеки, т.е. уменьшении количества функций, которые она экспортирует.</a:t>
-            </a:r>
-          </a:p>
-          <a:p>
-            <a:endParaRPr lang="ru-RU" dirty="0"/>
-          </a:p>
-          <a:p>
-            <a:r>
-              <a:rPr lang="ru-RU" dirty="0"/>
-              <a:t>Суть его заключается в том, что мы явно помечаем экспортируемые функции специальным атрибутом </a:t>
-            </a:r>
-            <a:r>
-              <a:rPr lang="en-US" dirty="0"/>
-              <a:t>visibility</a:t>
-            </a:r>
-            <a:r>
-              <a:rPr lang="ru-RU" dirty="0"/>
-              <a:t>, а все остальные символы делаем внутренними</a:t>
+              <a:t>На данном слайде можно видеть пример отмены оптимизации</a:t>
+            </a:r>
+            <a:r>
+              <a:rPr lang="en-US" dirty="0"/>
+              <a:t>: </a:t>
+            </a:r>
+            <a:r>
+              <a:rPr lang="ru-RU" dirty="0"/>
+              <a:t>компилятор не может</a:t>
             </a:r>
             <a:r>
               <a:rPr lang="en-US" dirty="0"/>
@@ -5978,23 +5850,31 @@
             </a:r>
             <a:r>
               <a:rPr lang="ru-RU" dirty="0"/>
-              <a:t>с помощью флага. Соответственно для всех скрытых, неэкспортируемых функций </a:t>
-            </a:r>
-            <a:r>
-              <a:rPr lang="en-US" dirty="0"/>
-              <a:t>(</a:t>
-            </a:r>
-            <a:r>
-              <a:rPr lang="ru-RU" dirty="0"/>
-              <a:t>которых гораздо больше</a:t>
-            </a:r>
-            <a:r>
-              <a:rPr lang="en-US" dirty="0"/>
-              <a:t>) </a:t>
-            </a:r>
-            <a:r>
-              <a:rPr lang="ru-RU" dirty="0"/>
-              <a:t>компилятор сможет применять более агрессивные оптимизации и при генерации кода использовать прямые вызовы</a:t>
+              <a:t>встроить вызов </a:t>
+            </a:r>
+            <a:r>
+              <a:rPr lang="en-US" dirty="0"/>
+              <a:t>foo </a:t>
+            </a:r>
+            <a:r>
+              <a:rPr lang="ru-RU" dirty="0"/>
+              <a:t>в </a:t>
+            </a:r>
+            <a:r>
+              <a:rPr lang="en-US" dirty="0"/>
+              <a:t>bar </a:t>
+            </a:r>
+            <a:r>
+              <a:rPr lang="ru-RU" dirty="0"/>
+              <a:t>из-за того что </a:t>
+            </a:r>
+            <a:r>
+              <a:rPr lang="en-US" dirty="0"/>
+              <a:t>foo </a:t>
+            </a:r>
+            <a:r>
+              <a:rPr lang="ru-RU" dirty="0"/>
+              <a:t>может быть перехвачена в рантайме</a:t>
             </a:r>
             <a:r>
               <a:rPr lang="en-US" dirty="0"/>
@@ -6002,25 +5882,7 @@
             </a:r>
             <a:r>
               <a:rPr lang="ru-RU" dirty="0"/>
-              <a:t>вместо косвенных).</a:t>
-            </a:r>
-            <a:endParaRPr lang="en-US" dirty="0"/>
-          </a:p>
-          <a:p>
-            <a:endParaRPr lang="en-US" dirty="0"/>
-          </a:p>
-          <a:p>
-            <a:r>
-              <a:rPr lang="ru-RU" dirty="0"/>
-              <a:t>Помимо оптимизации у этого подхода есть ещё одно преимущество</a:t>
-            </a:r>
-            <a:r>
-              <a:rPr lang="en-US" dirty="0"/>
-              <a:t>: </a:t>
-            </a:r>
-            <a:r>
-              <a:rPr lang="ru-RU" dirty="0"/>
-              <a:t>мы скрываем от пользователя внутренние детали реализации библиотеки и не даём возможности использовать её недокументированным образом.</a:t>
+              <a:t>и соответственно её семантика может быть изменена).</a:t>
             </a:r>
             <a:endParaRPr lang="en-US" dirty="0"/>
           </a:p>
@@ -6043,7 +5905,7 @@
           <a:p>
             <a:fld id="{3AC94D10-082F-46D7-A834-266F9222130F}" type="slidenum">
               <a:rPr lang="en-US" smtClean="0"/>
-              <a:t>56</a:t>
+              <a:t>53</a:t>
             </a:fld>
             <a:endParaRPr lang="en-US"/>
           </a:p>
@@ -6052,7 +5914,7 @@
     </p:spTree>
     <p:extLst>
       <p:ext uri="{BB962C8B-B14F-4D97-AF65-F5344CB8AC3E}">
-        <p14:creationId xmlns:p14="http://schemas.microsoft.com/office/powerpoint/2010/main" val="1530341260"/>
+        <p14:creationId xmlns:p14="http://schemas.microsoft.com/office/powerpoint/2010/main" val="2752840744"/>
       </p:ext>
     </p:extLst>
   </p:cSld>
@@ -6108,23 +5970,7 @@
           <a:p>
             <a:r>
               <a:rPr lang="ru-RU" dirty="0"/>
-              <a:t>Если вы захотите применить оптимизацию сокрытия символов к большой кодовой базе, например к дистрибутиву </a:t>
-            </a:r>
-            <a:r>
-              <a:rPr lang="en-US" dirty="0"/>
-              <a:t>Linux, </a:t>
-            </a:r>
-            <a:r>
-              <a:rPr lang="ru-RU" dirty="0"/>
-              <a:t>то придётся вручную</a:t>
-            </a:r>
-            <a:r>
-              <a:rPr lang="en-US" dirty="0"/>
-              <a:t> </a:t>
-            </a:r>
-            <a:r>
-              <a:rPr lang="ru-RU" dirty="0"/>
-              <a:t>по очереди анализировать каждую библиотеку на предмет того экспортируются ли из неё ненужные символы и если да, то какие.</a:t>
+              <a:t>Бороться с таким неэффективным поведением можно несколькими способами.</a:t>
             </a:r>
           </a:p>
           <a:p>
@@ -6133,7 +5979,61 @@
           <a:p>
             <a:r>
               <a:rPr lang="ru-RU" dirty="0"/>
-              <a:t>Эту задачу можно упростить с помощью автоматизации.</a:t>
+              <a:t>Во-первых есть специальные флаги компиляции</a:t>
+            </a:r>
+            <a:r>
+              <a:rPr lang="en-US" dirty="0"/>
+              <a:t>: </a:t>
+            </a:r>
+            <a:r>
+              <a:rPr lang="ru-RU" dirty="0"/>
+              <a:t>один, </a:t>
+            </a:r>
+            <a:r>
+              <a:rPr lang="en-US" dirty="0"/>
+              <a:t>-</a:t>
+            </a:r>
+            <a:r>
+              <a:rPr lang="en-US" dirty="0" err="1"/>
+              <a:t>Bsymbolic</a:t>
+            </a:r>
+            <a:r>
+              <a:rPr lang="ru-RU" dirty="0"/>
+              <a:t>, для линковки, чтобы вместо косвенных вызовы внутренних функций </a:t>
+            </a:r>
+            <a:r>
+              <a:rPr lang="en-US" dirty="0"/>
+              <a:t>DLL </a:t>
+            </a:r>
+            <a:r>
+              <a:rPr lang="ru-RU" dirty="0"/>
+              <a:t>использовать прямые. А второй</a:t>
+            </a:r>
+            <a:r>
+              <a:rPr lang="en-US" dirty="0"/>
+              <a:t>, -</a:t>
+            </a:r>
+            <a:r>
+              <a:rPr lang="en-US" dirty="0" err="1"/>
+              <a:t>fno</a:t>
+            </a:r>
+            <a:r>
+              <a:rPr lang="en-US" dirty="0"/>
+              <a:t>-semantic-interposition, </a:t>
+            </a:r>
+            <a:r>
+              <a:rPr lang="ru-RU" dirty="0"/>
+              <a:t>чтобы позволить компилятору при оптимизации игнорировать возможность перехвата функций.</a:t>
+            </a:r>
+            <a:endParaRPr lang="en-US" dirty="0"/>
+          </a:p>
+          <a:p>
+            <a:endParaRPr lang="en-US" dirty="0"/>
+          </a:p>
+          <a:p>
+            <a:r>
+              <a:rPr lang="ru-RU" dirty="0"/>
+              <a:t>Для оптимальной производительности требуется включить оба флага.</a:t>
             </a:r>
             <a:endParaRPr lang="en-US" dirty="0"/>
           </a:p>
@@ -6156,7 +6056,7 @@
           <a:p>
             <a:fld id="{3AC94D10-082F-46D7-A834-266F9222130F}" type="slidenum">
               <a:rPr lang="en-US" smtClean="0"/>
-              <a:t>57</a:t>
+              <a:t>54</a:t>
             </a:fld>
             <a:endParaRPr lang="en-US"/>
           </a:p>
@@ -6165,7 +6065,7 @@
     </p:spTree>
     <p:extLst>
       <p:ext uri="{BB962C8B-B14F-4D97-AF65-F5344CB8AC3E}">
-        <p14:creationId xmlns:p14="http://schemas.microsoft.com/office/powerpoint/2010/main" val="3687863370"/>
+        <p14:creationId xmlns:p14="http://schemas.microsoft.com/office/powerpoint/2010/main" val="3733641060"/>
       </p:ext>
     </p:extLst>
   </p:cSld>
@@ -6219,37 +6119,6 @@
           <a:bodyPr/>
           <a:lstStyle/>
           <a:p>
-            <a:r>
-              <a:rPr lang="ru-RU" dirty="0"/>
-              <a:t>Утилита </a:t>
-            </a:r>
-            <a:r>
-              <a:rPr lang="en-US" dirty="0" err="1"/>
-              <a:t>ShlibVisibilityChecker</a:t>
-            </a:r>
-            <a:r>
-              <a:rPr lang="en-US" dirty="0"/>
-              <a:t> </a:t>
-            </a:r>
-            <a:r>
-              <a:rPr lang="ru-RU" dirty="0"/>
-              <a:t>по бинарному файлу библиотеки</a:t>
-            </a:r>
-            <a:r>
-              <a:rPr lang="en-US" dirty="0"/>
-              <a:t> </a:t>
-            </a:r>
-            <a:r>
-              <a:rPr lang="ru-RU" dirty="0"/>
-              <a:t>и её заголовочным файлам скажет какие символы нужно скрыть. Я успешно применял эту утилиту для поиска проблемных библиотек в </a:t>
-            </a:r>
-            <a:r>
-              <a:rPr lang="en-US" dirty="0"/>
-              <a:t>Ubuntu.</a:t>
-            </a:r>
-            <a:endParaRPr lang="ru-RU" dirty="0"/>
-          </a:p>
-          <a:p>
             <a:endParaRPr lang="en-US" dirty="0"/>
           </a:p>
         </p:txBody>
@@ -6271,7 +6140,7 @@
           <a:p>
             <a:fld id="{3AC94D10-082F-46D7-A834-266F9222130F}" type="slidenum">
               <a:rPr lang="en-US" smtClean="0"/>
-              <a:t>58</a:t>
+              <a:t>55</a:t>
             </a:fld>
             <a:endParaRPr lang="en-US"/>
           </a:p>
@@ -6280,7 +6149,7 @@
     </p:spTree>
     <p:extLst>
       <p:ext uri="{BB962C8B-B14F-4D97-AF65-F5344CB8AC3E}">
-        <p14:creationId xmlns:p14="http://schemas.microsoft.com/office/powerpoint/2010/main" val="286087877"/>
+        <p14:creationId xmlns:p14="http://schemas.microsoft.com/office/powerpoint/2010/main" val="22341218"/>
       </p:ext>
     </p:extLst>
   </p:cSld>
@@ -6336,31 +6205,74 @@
           <a:p>
             <a:r>
               <a:rPr lang="ru-RU" dirty="0"/>
-              <a:t>На слайде приведён пример анализа популярной библиотеки</a:t>
+              <a:t>Помимо использования флагов есть второй, более традиционный способ, который заключается в сокращении интерфейса библиотеки, т.е. уменьшении количества функций, которые она экспортирует.</a:t>
+            </a:r>
+          </a:p>
+          <a:p>
+            <a:endParaRPr lang="ru-RU" dirty="0"/>
+          </a:p>
+          <a:p>
+            <a:r>
+              <a:rPr lang="ru-RU" dirty="0"/>
+              <a:t>Суть его заключается в том, что мы явно помечаем экспортируемые функции специальным атрибутом </a:t>
+            </a:r>
+            <a:r>
+              <a:rPr lang="en-US" dirty="0"/>
+              <a:t>visibility</a:t>
+            </a:r>
+            <a:r>
+              <a:rPr lang="ru-RU" dirty="0"/>
+              <a:t>, а все остальные символы делаем внутренними</a:t>
             </a:r>
             <a:r>
               <a:rPr lang="en-US" dirty="0"/>
               <a:t> </a:t>
             </a:r>
             <a:r>
-              <a:rPr lang="en-US" dirty="0" err="1"/>
-              <a:t>libgmp</a:t>
-            </a:r>
-            <a:r>
-              <a:rPr lang="en-US" dirty="0"/>
-              <a:t> </a:t>
-            </a:r>
-            <a:r>
-              <a:rPr lang="ru-RU" dirty="0"/>
-              <a:t>для вычислений произвольной точности.</a:t>
-            </a:r>
-            <a:r>
-              <a:rPr lang="en-US" dirty="0"/>
-              <a:t> </a:t>
-            </a:r>
-            <a:r>
-              <a:rPr lang="ru-RU" dirty="0"/>
-              <a:t>Можно видеть что библиотека экспортирует большое количество ненужных символов.</a:t>
+              <a:rPr lang="ru-RU" dirty="0"/>
+              <a:t>с помощью флага. Соответственно для всех скрытых, неэкспортируемых функций </a:t>
+            </a:r>
+            <a:r>
+              <a:rPr lang="en-US" dirty="0"/>
+              <a:t>(</a:t>
+            </a:r>
+            <a:r>
+              <a:rPr lang="ru-RU" dirty="0"/>
+              <a:t>которых гораздо больше</a:t>
+            </a:r>
+            <a:r>
+              <a:rPr lang="en-US" dirty="0"/>
+              <a:t>) </a:t>
+            </a:r>
+            <a:r>
+              <a:rPr lang="ru-RU" dirty="0"/>
+              <a:t>компилятор сможет применять более агрессивные оптимизации и при генерации кода использовать прямые вызовы</a:t>
+            </a:r>
+            <a:r>
+              <a:rPr lang="en-US" dirty="0"/>
+              <a:t> (</a:t>
+            </a:r>
+            <a:r>
+              <a:rPr lang="ru-RU" dirty="0"/>
+              <a:t>вместо косвенных).</a:t>
+            </a:r>
+            <a:endParaRPr lang="en-US" dirty="0"/>
+          </a:p>
+          <a:p>
+            <a:endParaRPr lang="en-US" dirty="0"/>
+          </a:p>
+          <a:p>
+            <a:r>
+              <a:rPr lang="ru-RU" dirty="0"/>
+              <a:t>Помимо оптимизации у этого подхода есть ещё одно преимущество</a:t>
+            </a:r>
+            <a:r>
+              <a:rPr lang="en-US" dirty="0"/>
+              <a:t>: </a:t>
+            </a:r>
+            <a:r>
+              <a:rPr lang="ru-RU" dirty="0"/>
+              <a:t>мы скрываем от пользователя внутренние детали реализации библиотеки и не даём возможности использовать её недокументированным образом.</a:t>
             </a:r>
             <a:endParaRPr lang="en-US" dirty="0"/>
           </a:p>
@@ -6383,7 +6295,7 @@
           <a:p>
             <a:fld id="{3AC94D10-082F-46D7-A834-266F9222130F}" type="slidenum">
               <a:rPr lang="en-US" smtClean="0"/>
-              <a:t>59</a:t>
+              <a:t>56</a:t>
             </a:fld>
             <a:endParaRPr lang="en-US"/>
           </a:p>
@@ -6392,7 +6304,7 @@
     </p:spTree>
     <p:extLst>
       <p:ext uri="{BB962C8B-B14F-4D97-AF65-F5344CB8AC3E}">
-        <p14:creationId xmlns:p14="http://schemas.microsoft.com/office/powerpoint/2010/main" val="492988692"/>
+        <p14:creationId xmlns:p14="http://schemas.microsoft.com/office/powerpoint/2010/main" val="1530341260"/>
       </p:ext>
     </p:extLst>
   </p:cSld>
@@ -6446,6 +6358,35 @@
           <a:bodyPr/>
           <a:lstStyle/>
           <a:p>
+            <a:r>
+              <a:rPr lang="ru-RU" dirty="0"/>
+              <a:t>Если вы захотите применить оптимизацию сокрытия символов к большой кодовой базе, например к дистрибутиву </a:t>
+            </a:r>
+            <a:r>
+              <a:rPr lang="en-US" dirty="0"/>
+              <a:t>Linux, </a:t>
+            </a:r>
+            <a:r>
+              <a:rPr lang="ru-RU" dirty="0"/>
+              <a:t>то придётся вручную</a:t>
+            </a:r>
+            <a:r>
+              <a:rPr lang="en-US" dirty="0"/>
+              <a:t> </a:t>
+            </a:r>
+            <a:r>
+              <a:rPr lang="ru-RU" dirty="0"/>
+              <a:t>по очереди анализировать каждую библиотеку на предмет того экспортируются ли из неё ненужные символы и если да, то какие.</a:t>
+            </a:r>
+          </a:p>
+          <a:p>
+            <a:endParaRPr lang="ru-RU" dirty="0"/>
+          </a:p>
+          <a:p>
+            <a:r>
+              <a:rPr lang="ru-RU" dirty="0"/>
+              <a:t>Эту задачу можно упростить с помощью автоматизации.</a:t>
+            </a:r>
             <a:endParaRPr lang="en-US" dirty="0"/>
           </a:p>
         </p:txBody>
@@ -6467,7 +6408,7 @@
           <a:p>
             <a:fld id="{3AC94D10-082F-46D7-A834-266F9222130F}" type="slidenum">
               <a:rPr lang="en-US" smtClean="0"/>
-              <a:t>60</a:t>
+              <a:t>57</a:t>
             </a:fld>
             <a:endParaRPr lang="en-US"/>
           </a:p>
@@ -6476,7 +6417,7 @@
     </p:spTree>
     <p:extLst>
       <p:ext uri="{BB962C8B-B14F-4D97-AF65-F5344CB8AC3E}">
-        <p14:creationId xmlns:p14="http://schemas.microsoft.com/office/powerpoint/2010/main" val="1220552600"/>
+        <p14:creationId xmlns:p14="http://schemas.microsoft.com/office/powerpoint/2010/main" val="3687863370"/>
       </p:ext>
     </p:extLst>
   </p:cSld>
@@ -6530,6 +6471,37 @@
           <a:bodyPr/>
           <a:lstStyle/>
           <a:p>
+            <a:r>
+              <a:rPr lang="ru-RU" dirty="0"/>
+              <a:t>Утилита </a:t>
+            </a:r>
+            <a:r>
+              <a:rPr lang="en-US" dirty="0" err="1"/>
+              <a:t>ShlibVisibilityChecker</a:t>
+            </a:r>
+            <a:r>
+              <a:rPr lang="en-US" dirty="0"/>
+              <a:t> </a:t>
+            </a:r>
+            <a:r>
+              <a:rPr lang="ru-RU" dirty="0"/>
+              <a:t>по бинарному файлу библиотеки</a:t>
+            </a:r>
+            <a:r>
+              <a:rPr lang="en-US" dirty="0"/>
+              <a:t> </a:t>
+            </a:r>
+            <a:r>
+              <a:rPr lang="ru-RU" dirty="0"/>
+              <a:t>и её заголовочным файлам скажет какие символы нужно скрыть. Я успешно применял эту утилиту для поиска проблемных библиотек в </a:t>
+            </a:r>
+            <a:r>
+              <a:rPr lang="en-US" dirty="0"/>
+              <a:t>Ubuntu.</a:t>
+            </a:r>
+            <a:endParaRPr lang="ru-RU" dirty="0"/>
+          </a:p>
+          <a:p>
             <a:endParaRPr lang="en-US" dirty="0"/>
           </a:p>
         </p:txBody>
@@ -6551,7 +6523,7 @@
           <a:p>
             <a:fld id="{3AC94D10-082F-46D7-A834-266F9222130F}" type="slidenum">
               <a:rPr lang="en-US" smtClean="0"/>
-              <a:t>61</a:t>
+              <a:t>58</a:t>
             </a:fld>
             <a:endParaRPr lang="en-US"/>
           </a:p>
@@ -6560,7 +6532,7 @@
     </p:spTree>
     <p:extLst>
       <p:ext uri="{BB962C8B-B14F-4D97-AF65-F5344CB8AC3E}">
-        <p14:creationId xmlns:p14="http://schemas.microsoft.com/office/powerpoint/2010/main" val="499940782"/>
+        <p14:creationId xmlns:p14="http://schemas.microsoft.com/office/powerpoint/2010/main" val="286087877"/>
       </p:ext>
     </p:extLst>
   </p:cSld>
@@ -6614,6 +6586,34 @@
           <a:bodyPr/>
           <a:lstStyle/>
           <a:p>
+            <a:r>
+              <a:rPr lang="ru-RU" dirty="0"/>
+              <a:t>На слайде приведён пример анализа популярной библиотеки</a:t>
+            </a:r>
+            <a:r>
+              <a:rPr lang="en-US" dirty="0"/>
+              <a:t> </a:t>
+            </a:r>
+            <a:r>
+              <a:rPr lang="en-US" dirty="0" err="1"/>
+              <a:t>libgmp</a:t>
+            </a:r>
+            <a:r>
+              <a:rPr lang="en-US" dirty="0"/>
+              <a:t> </a:t>
+            </a:r>
+            <a:r>
+              <a:rPr lang="ru-RU" dirty="0"/>
+              <a:t>для вычислений произвольной точности.</a:t>
+            </a:r>
+            <a:r>
+              <a:rPr lang="en-US" dirty="0"/>
+              <a:t> </a:t>
+            </a:r>
+            <a:r>
+              <a:rPr lang="ru-RU" dirty="0"/>
+              <a:t>Можно видеть что библиотека экспортирует большое количество ненужных символов.</a:t>
+            </a:r>
             <a:endParaRPr lang="en-US" dirty="0"/>
           </a:p>
         </p:txBody>
@@ -6635,7 +6635,7 @@
           <a:p>
             <a:fld id="{3AC94D10-082F-46D7-A834-266F9222130F}" type="slidenum">
               <a:rPr lang="en-US" smtClean="0"/>
-              <a:t>62</a:t>
+              <a:t>59</a:t>
             </a:fld>
             <a:endParaRPr lang="en-US"/>
           </a:p>
@@ -6644,7 +6644,7 @@
     </p:spTree>
     <p:extLst>
       <p:ext uri="{BB962C8B-B14F-4D97-AF65-F5344CB8AC3E}">
-        <p14:creationId xmlns:p14="http://schemas.microsoft.com/office/powerpoint/2010/main" val="2809069906"/>
+        <p14:creationId xmlns:p14="http://schemas.microsoft.com/office/powerpoint/2010/main" val="492988692"/>
       </p:ext>
     </p:extLst>
   </p:cSld>
@@ -6719,7 +6719,7 @@
           <a:p>
             <a:fld id="{3AC94D10-082F-46D7-A834-266F9222130F}" type="slidenum">
               <a:rPr lang="en-US" smtClean="0"/>
-              <a:t>63</a:t>
+              <a:t>60</a:t>
             </a:fld>
             <a:endParaRPr lang="en-US"/>
           </a:p>
@@ -6728,7 +6728,175 @@
     </p:spTree>
     <p:extLst>
       <p:ext uri="{BB962C8B-B14F-4D97-AF65-F5344CB8AC3E}">
-        <p14:creationId xmlns:p14="http://schemas.microsoft.com/office/powerpoint/2010/main" val="4042281356"/>
+        <p14:creationId xmlns:p14="http://schemas.microsoft.com/office/powerpoint/2010/main" val="1220552600"/>
+      </p:ext>
+    </p:extLst>
+  </p:cSld>
+  <p:clrMapOvr>
+    <a:masterClrMapping/>
+  </p:clrMapOvr>
+</p:notes>
+</file>
+
+<file path=ppt/notesSlides/notesSlide58.xml><?xml version="1.0" encoding="utf-8"?>
+<p:notes xmlns:a="http://schemas.openxmlformats.org/drawingml/2006/main" xmlns:r="http://schemas.openxmlformats.org/officeDocument/2006/relationships" xmlns:p="http://schemas.openxmlformats.org/presentationml/2006/main">
+  <p:cSld>
+    <p:spTree>
+      <p:nvGrpSpPr>
+        <p:cNvPr id="1" name=""/>
+        <p:cNvGrpSpPr/>
+        <p:nvPr/>
+      </p:nvGrpSpPr>
+      <p:grpSpPr>
+        <a:xfrm>
+          <a:off x="0" y="0"/>
+          <a:ext cx="0" cy="0"/>
+          <a:chOff x="0" y="0"/>
+          <a:chExt cx="0" cy="0"/>
+        </a:xfrm>
+      </p:grpSpPr>
+      <p:sp>
+        <p:nvSpPr>
+          <p:cNvPr id="2" name="Slide Image Placeholder 1"/>
+          <p:cNvSpPr>
+            <a:spLocks noGrp="1" noRot="1" noChangeAspect="1"/>
+          </p:cNvSpPr>
+          <p:nvPr>
+            <p:ph type="sldImg"/>
+          </p:nvPr>
+        </p:nvSpPr>
+        <p:spPr/>
+      </p:sp>
+      <p:sp>
+        <p:nvSpPr>
+          <p:cNvPr id="3" name="Notes Placeholder 2"/>
+          <p:cNvSpPr>
+            <a:spLocks noGrp="1"/>
+          </p:cNvSpPr>
+          <p:nvPr>
+            <p:ph type="body" idx="1"/>
+          </p:nvPr>
+        </p:nvSpPr>
+        <p:spPr/>
+        <p:txBody>
+          <a:bodyPr/>
+          <a:lstStyle/>
+          <a:p>
+            <a:endParaRPr lang="en-US" dirty="0"/>
+          </a:p>
+        </p:txBody>
+      </p:sp>
+      <p:sp>
+        <p:nvSpPr>
+          <p:cNvPr id="4" name="Slide Number Placeholder 3"/>
+          <p:cNvSpPr>
+            <a:spLocks noGrp="1"/>
+          </p:cNvSpPr>
+          <p:nvPr>
+            <p:ph type="sldNum" sz="quarter" idx="5"/>
+          </p:nvPr>
+        </p:nvSpPr>
+        <p:spPr/>
+        <p:txBody>
+          <a:bodyPr/>
+          <a:lstStyle/>
+          <a:p>
+            <a:fld id="{3AC94D10-082F-46D7-A834-266F9222130F}" type="slidenum">
+              <a:rPr lang="en-US" smtClean="0"/>
+              <a:t>61</a:t>
+            </a:fld>
+            <a:endParaRPr lang="en-US"/>
+          </a:p>
+        </p:txBody>
+      </p:sp>
+    </p:spTree>
+    <p:extLst>
+      <p:ext uri="{BB962C8B-B14F-4D97-AF65-F5344CB8AC3E}">
+        <p14:creationId xmlns:p14="http://schemas.microsoft.com/office/powerpoint/2010/main" val="499940782"/>
+      </p:ext>
+    </p:extLst>
+  </p:cSld>
+  <p:clrMapOvr>
+    <a:masterClrMapping/>
+  </p:clrMapOvr>
+</p:notes>
+</file>
+
+<file path=ppt/notesSlides/notesSlide59.xml><?xml version="1.0" encoding="utf-8"?>
+<p:notes xmlns:a="http://schemas.openxmlformats.org/drawingml/2006/main" xmlns:r="http://schemas.openxmlformats.org/officeDocument/2006/relationships" xmlns:p="http://schemas.openxmlformats.org/presentationml/2006/main">
+  <p:cSld>
+    <p:spTree>
+      <p:nvGrpSpPr>
+        <p:cNvPr id="1" name=""/>
+        <p:cNvGrpSpPr/>
+        <p:nvPr/>
+      </p:nvGrpSpPr>
+      <p:grpSpPr>
+        <a:xfrm>
+          <a:off x="0" y="0"/>
+          <a:ext cx="0" cy="0"/>
+          <a:chOff x="0" y="0"/>
+          <a:chExt cx="0" cy="0"/>
+        </a:xfrm>
+      </p:grpSpPr>
+      <p:sp>
+        <p:nvSpPr>
+          <p:cNvPr id="2" name="Slide Image Placeholder 1"/>
+          <p:cNvSpPr>
+            <a:spLocks noGrp="1" noRot="1" noChangeAspect="1"/>
+          </p:cNvSpPr>
+          <p:nvPr>
+            <p:ph type="sldImg"/>
+          </p:nvPr>
+        </p:nvSpPr>
+        <p:spPr/>
+      </p:sp>
+      <p:sp>
+        <p:nvSpPr>
+          <p:cNvPr id="3" name="Notes Placeholder 2"/>
+          <p:cNvSpPr>
+            <a:spLocks noGrp="1"/>
+          </p:cNvSpPr>
+          <p:nvPr>
+            <p:ph type="body" idx="1"/>
+          </p:nvPr>
+        </p:nvSpPr>
+        <p:spPr/>
+        <p:txBody>
+          <a:bodyPr/>
+          <a:lstStyle/>
+          <a:p>
+            <a:endParaRPr lang="en-US" dirty="0"/>
+          </a:p>
+        </p:txBody>
+      </p:sp>
+      <p:sp>
+        <p:nvSpPr>
+          <p:cNvPr id="4" name="Slide Number Placeholder 3"/>
+          <p:cNvSpPr>
+            <a:spLocks noGrp="1"/>
+          </p:cNvSpPr>
+          <p:nvPr>
+            <p:ph type="sldNum" sz="quarter" idx="5"/>
+          </p:nvPr>
+        </p:nvSpPr>
+        <p:spPr/>
+        <p:txBody>
+          <a:bodyPr/>
+          <a:lstStyle/>
+          <a:p>
+            <a:fld id="{3AC94D10-082F-46D7-A834-266F9222130F}" type="slidenum">
+              <a:rPr lang="en-US" smtClean="0"/>
+              <a:t>62</a:t>
+            </a:fld>
+            <a:endParaRPr lang="en-US"/>
+          </a:p>
+        </p:txBody>
+      </p:sp>
+    </p:spTree>
+    <p:extLst>
+      <p:ext uri="{BB962C8B-B14F-4D97-AF65-F5344CB8AC3E}">
+        <p14:creationId xmlns:p14="http://schemas.microsoft.com/office/powerpoint/2010/main" val="2809069906"/>
       </p:ext>
     </p:extLst>
   </p:cSld>
@@ -6844,6 +7012,90 @@
     <p:extLst>
       <p:ext uri="{BB962C8B-B14F-4D97-AF65-F5344CB8AC3E}">
         <p14:creationId xmlns:p14="http://schemas.microsoft.com/office/powerpoint/2010/main" val="2647935613"/>
+      </p:ext>
+    </p:extLst>
+  </p:cSld>
+  <p:clrMapOvr>
+    <a:masterClrMapping/>
+  </p:clrMapOvr>
+</p:notes>
+</file>
+
+<file path=ppt/notesSlides/notesSlide60.xml><?xml version="1.0" encoding="utf-8"?>
+<p:notes xmlns:a="http://schemas.openxmlformats.org/drawingml/2006/main" xmlns:r="http://schemas.openxmlformats.org/officeDocument/2006/relationships" xmlns:p="http://schemas.openxmlformats.org/presentationml/2006/main">
+  <p:cSld>
+    <p:spTree>
+      <p:nvGrpSpPr>
+        <p:cNvPr id="1" name=""/>
+        <p:cNvGrpSpPr/>
+        <p:nvPr/>
+      </p:nvGrpSpPr>
+      <p:grpSpPr>
+        <a:xfrm>
+          <a:off x="0" y="0"/>
+          <a:ext cx="0" cy="0"/>
+          <a:chOff x="0" y="0"/>
+          <a:chExt cx="0" cy="0"/>
+        </a:xfrm>
+      </p:grpSpPr>
+      <p:sp>
+        <p:nvSpPr>
+          <p:cNvPr id="2" name="Slide Image Placeholder 1"/>
+          <p:cNvSpPr>
+            <a:spLocks noGrp="1" noRot="1" noChangeAspect="1"/>
+          </p:cNvSpPr>
+          <p:nvPr>
+            <p:ph type="sldImg"/>
+          </p:nvPr>
+        </p:nvSpPr>
+        <p:spPr/>
+      </p:sp>
+      <p:sp>
+        <p:nvSpPr>
+          <p:cNvPr id="3" name="Notes Placeholder 2"/>
+          <p:cNvSpPr>
+            <a:spLocks noGrp="1"/>
+          </p:cNvSpPr>
+          <p:nvPr>
+            <p:ph type="body" idx="1"/>
+          </p:nvPr>
+        </p:nvSpPr>
+        <p:spPr/>
+        <p:txBody>
+          <a:bodyPr/>
+          <a:lstStyle/>
+          <a:p>
+            <a:endParaRPr lang="en-US" dirty="0"/>
+          </a:p>
+        </p:txBody>
+      </p:sp>
+      <p:sp>
+        <p:nvSpPr>
+          <p:cNvPr id="4" name="Slide Number Placeholder 3"/>
+          <p:cNvSpPr>
+            <a:spLocks noGrp="1"/>
+          </p:cNvSpPr>
+          <p:nvPr>
+            <p:ph type="sldNum" sz="quarter" idx="5"/>
+          </p:nvPr>
+        </p:nvSpPr>
+        <p:spPr/>
+        <p:txBody>
+          <a:bodyPr/>
+          <a:lstStyle/>
+          <a:p>
+            <a:fld id="{3AC94D10-082F-46D7-A834-266F9222130F}" type="slidenum">
+              <a:rPr lang="en-US" smtClean="0"/>
+              <a:t>63</a:t>
+            </a:fld>
+            <a:endParaRPr lang="en-US"/>
+          </a:p>
+        </p:txBody>
+      </p:sp>
+    </p:spTree>
+    <p:extLst>
+      <p:ext uri="{BB962C8B-B14F-4D97-AF65-F5344CB8AC3E}">
+        <p14:creationId xmlns:p14="http://schemas.microsoft.com/office/powerpoint/2010/main" val="4042281356"/>
       </p:ext>
     </p:extLst>
   </p:cSld>
@@ -7336,7 +7588,7 @@
           <a:p>
             <a:fld id="{83D30A23-1FB6-43A1-891F-95145083C4E9}" type="datetime1">
               <a:rPr lang="en-US" smtClean="0"/>
-              <a:t>5/5/2024</a:t>
+              <a:t>5/7/2024</a:t>
             </a:fld>
             <a:endParaRPr lang="en-US"/>
           </a:p>
@@ -7534,7 +7786,7 @@
           <a:p>
             <a:fld id="{A4B03399-60D8-4226-8AC7-3F159D57E860}" type="datetime1">
               <a:rPr lang="en-US" smtClean="0"/>
-              <a:t>5/5/2024</a:t>
+              <a:t>5/7/2024</a:t>
             </a:fld>
             <a:endParaRPr lang="en-US"/>
           </a:p>
@@ -7742,7 +7994,7 @@
           <a:p>
             <a:fld id="{1A646459-A066-416D-8E21-9D451FB1CBED}" type="datetime1">
               <a:rPr lang="en-US" smtClean="0"/>
-              <a:t>5/5/2024</a:t>
+              <a:t>5/7/2024</a:t>
             </a:fld>
             <a:endParaRPr lang="en-US"/>
           </a:p>
@@ -7940,7 +8192,7 @@
           <a:p>
             <a:fld id="{0636B939-1A2A-498F-9013-EEF28820D750}" type="datetime1">
               <a:rPr lang="en-US" smtClean="0"/>
-              <a:t>5/5/2024</a:t>
+              <a:t>5/7/2024</a:t>
             </a:fld>
             <a:endParaRPr lang="en-US"/>
           </a:p>
@@ -8254,7 +8506,7 @@
           <a:p>
             <a:fld id="{97D3760A-E884-42F2-A44C-F32FAA030BF6}" type="datetime1">
               <a:rPr lang="en-US" smtClean="0"/>
-              <a:t>5/5/2024</a:t>
+              <a:t>5/7/2024</a:t>
             </a:fld>
             <a:endParaRPr lang="en-US"/>
           </a:p>
@@ -8519,7 +8771,7 @@
           <a:p>
             <a:fld id="{4FC7535E-ABF1-4A69-B09E-251EF8B13143}" type="datetime1">
               <a:rPr lang="en-US" smtClean="0"/>
-              <a:t>5/5/2024</a:t>
+              <a:t>5/7/2024</a:t>
             </a:fld>
             <a:endParaRPr lang="en-US"/>
           </a:p>
@@ -8931,7 +9183,7 @@
           <a:p>
             <a:fld id="{CE54BCFC-68A7-4C68-9600-D4AAA16CF9A6}" type="datetime1">
               <a:rPr lang="en-US" smtClean="0"/>
-              <a:t>5/5/2024</a:t>
+              <a:t>5/7/2024</a:t>
             </a:fld>
             <a:endParaRPr lang="en-US"/>
           </a:p>
@@ -9072,7 +9324,7 @@
           <a:p>
             <a:fld id="{0F981744-C4F3-4F58-9E0E-AF6C4E78D03B}" type="datetime1">
               <a:rPr lang="en-US" smtClean="0"/>
-              <a:t>5/5/2024</a:t>
+              <a:t>5/7/2024</a:t>
             </a:fld>
             <a:endParaRPr lang="en-US"/>
           </a:p>
@@ -9185,7 +9437,7 @@
           <a:p>
             <a:fld id="{98ED47E1-EA96-4683-9629-E838295B20BC}" type="datetime1">
               <a:rPr lang="en-US" smtClean="0"/>
-              <a:t>5/5/2024</a:t>
+              <a:t>5/7/2024</a:t>
             </a:fld>
             <a:endParaRPr lang="en-US"/>
           </a:p>
@@ -9496,7 +9748,7 @@
           <a:p>
             <a:fld id="{2F2A1627-B435-455B-A0CA-0808E5748D61}" type="datetime1">
               <a:rPr lang="en-US" smtClean="0"/>
-              <a:t>5/5/2024</a:t>
+              <a:t>5/7/2024</a:t>
             </a:fld>
             <a:endParaRPr lang="en-US"/>
           </a:p>
@@ -9784,7 +10036,7 @@
           <a:p>
             <a:fld id="{FE11CB43-EB9E-4C41-ACD2-0EC61FB429F2}" type="datetime1">
               <a:rPr lang="en-US" smtClean="0"/>
-              <a:t>5/5/2024</a:t>
+              <a:t>5/7/2024</a:t>
             </a:fld>
             <a:endParaRPr lang="en-US"/>
           </a:p>
@@ -10025,7 +10277,7 @@
           <a:p>
             <a:fld id="{CC0B8F92-0932-40E4-878B-3E2E4AAA6810}" type="datetime1">
               <a:rPr lang="en-US" smtClean="0"/>
-              <a:t>5/5/2024</a:t>
+              <a:t>5/7/2024</a:t>
             </a:fld>
             <a:endParaRPr lang="en-US"/>
           </a:p>
@@ -16446,64 +16698,6 @@
           </a:fontRef>
         </p:style>
       </p:cxnSp>
-      <p:sp>
-        <p:nvSpPr>
-          <p:cNvPr id="12" name="Title 1">
-            <a:extLst>
-              <a:ext uri="{FF2B5EF4-FFF2-40B4-BE49-F238E27FC236}">
-                <a16:creationId xmlns:a16="http://schemas.microsoft.com/office/drawing/2014/main" id="{B1EF5697-ECE4-4697-BF14-9837998FF827}"/>
-              </a:ext>
-            </a:extLst>
-          </p:cNvPr>
-          <p:cNvSpPr txBox="1">
-            <a:spLocks/>
-          </p:cNvSpPr>
-          <p:nvPr/>
-        </p:nvSpPr>
-        <p:spPr>
-          <a:xfrm>
-            <a:off x="838200" y="343354"/>
-            <a:ext cx="10515600" cy="1325563"/>
-          </a:xfrm>
-          <a:prstGeom prst="rect">
-            <a:avLst/>
-          </a:prstGeom>
-        </p:spPr>
-        <p:txBody>
-          <a:bodyPr vert="horz" lIns="91440" tIns="45720" rIns="91440" bIns="45720" rtlCol="0" anchor="ctr">
-            <a:normAutofit/>
-          </a:bodyPr>
-          <a:lstStyle>
-            <a:lvl1pPr algn="l" defTabSz="914400" rtl="0" eaLnBrk="1" latinLnBrk="0" hangingPunct="1">
-              <a:lnSpc>
-                <a:spcPct val="90000"/>
-              </a:lnSpc>
-              <a:spcBef>
-                <a:spcPct val="0"/>
-              </a:spcBef>
-              <a:buNone/>
-              <a:defRPr sz="4400" kern="1200">
-                <a:solidFill>
-                  <a:schemeClr val="tx1"/>
-                </a:solidFill>
-                <a:latin typeface="+mj-lt"/>
-                <a:ea typeface="+mj-ea"/>
-                <a:cs typeface="+mj-cs"/>
-              </a:defRPr>
-            </a:lvl1pPr>
-          </a:lstStyle>
-          <a:p>
-            <a:r>
-              <a:rPr lang="ru-RU" dirty="0"/>
-              <a:t>Процесс загрузки </a:t>
-            </a:r>
-            <a:r>
-              <a:rPr lang="en-US" dirty="0"/>
-              <a:t>DLL</a:t>
-            </a:r>
-          </a:p>
-        </p:txBody>
-      </p:sp>
       <p:cxnSp>
         <p:nvCxnSpPr>
           <p:cNvPr id="14" name="Straight Arrow Connector 13">
@@ -16731,31 +16925,6 @@
           </a:fontRef>
         </p:style>
       </p:cxnSp>
-      <p:sp>
-        <p:nvSpPr>
-          <p:cNvPr id="7" name="Content Placeholder 6">
-            <a:extLst>
-              <a:ext uri="{FF2B5EF4-FFF2-40B4-BE49-F238E27FC236}">
-                <a16:creationId xmlns:a16="http://schemas.microsoft.com/office/drawing/2014/main" id="{AB27C4D9-3AA5-4F00-944D-3872EF8FE4DB}"/>
-              </a:ext>
-            </a:extLst>
-          </p:cNvPr>
-          <p:cNvSpPr>
-            <a:spLocks noGrp="1"/>
-          </p:cNvSpPr>
-          <p:nvPr>
-            <p:ph idx="1"/>
-          </p:nvPr>
-        </p:nvSpPr>
-        <p:spPr/>
-        <p:txBody>
-          <a:bodyPr/>
-          <a:lstStyle/>
-          <a:p>
-            <a:endParaRPr lang="en-US"/>
-          </a:p>
-        </p:txBody>
-      </p:sp>
     </p:spTree>
     <p:extLst>
       <p:ext uri="{BB962C8B-B14F-4D97-AF65-F5344CB8AC3E}">
@@ -18745,64 +18914,6 @@
           </a:fontRef>
         </p:style>
       </p:cxnSp>
-      <p:sp>
-        <p:nvSpPr>
-          <p:cNvPr id="12" name="Title 1">
-            <a:extLst>
-              <a:ext uri="{FF2B5EF4-FFF2-40B4-BE49-F238E27FC236}">
-                <a16:creationId xmlns:a16="http://schemas.microsoft.com/office/drawing/2014/main" id="{B1EF5697-ECE4-4697-BF14-9837998FF827}"/>
-              </a:ext>
-            </a:extLst>
-          </p:cNvPr>
-          <p:cNvSpPr txBox="1">
-            <a:spLocks/>
-          </p:cNvSpPr>
-          <p:nvPr/>
-        </p:nvSpPr>
-        <p:spPr>
-          <a:xfrm>
-            <a:off x="838200" y="343354"/>
-            <a:ext cx="10515600" cy="1325563"/>
-          </a:xfrm>
-          <a:prstGeom prst="rect">
-            <a:avLst/>
-          </a:prstGeom>
-        </p:spPr>
-        <p:txBody>
-          <a:bodyPr vert="horz" lIns="91440" tIns="45720" rIns="91440" bIns="45720" rtlCol="0" anchor="ctr">
-            <a:normAutofit/>
-          </a:bodyPr>
-          <a:lstStyle>
-            <a:lvl1pPr algn="l" defTabSz="914400" rtl="0" eaLnBrk="1" latinLnBrk="0" hangingPunct="1">
-              <a:lnSpc>
-                <a:spcPct val="90000"/>
-              </a:lnSpc>
-              <a:spcBef>
-                <a:spcPct val="0"/>
-              </a:spcBef>
-              <a:buNone/>
-              <a:defRPr sz="4400" kern="1200">
-                <a:solidFill>
-                  <a:schemeClr val="tx1"/>
-                </a:solidFill>
-                <a:latin typeface="+mj-lt"/>
-                <a:ea typeface="+mj-ea"/>
-                <a:cs typeface="+mj-cs"/>
-              </a:defRPr>
-            </a:lvl1pPr>
-          </a:lstStyle>
-          <a:p>
-            <a:r>
-              <a:rPr lang="ru-RU" dirty="0"/>
-              <a:t>Процесс загрузки </a:t>
-            </a:r>
-            <a:r>
-              <a:rPr lang="en-US" dirty="0"/>
-              <a:t>DLL</a:t>
-            </a:r>
-          </a:p>
-        </p:txBody>
-      </p:sp>
       <p:cxnSp>
         <p:nvCxnSpPr>
           <p:cNvPr id="14" name="Straight Arrow Connector 13">
@@ -19032,31 +19143,6 @@
       </p:cxnSp>
       <p:sp>
         <p:nvSpPr>
-          <p:cNvPr id="7" name="Content Placeholder 6">
-            <a:extLst>
-              <a:ext uri="{FF2B5EF4-FFF2-40B4-BE49-F238E27FC236}">
-                <a16:creationId xmlns:a16="http://schemas.microsoft.com/office/drawing/2014/main" id="{AB27C4D9-3AA5-4F00-944D-3872EF8FE4DB}"/>
-              </a:ext>
-            </a:extLst>
-          </p:cNvPr>
-          <p:cNvSpPr>
-            <a:spLocks noGrp="1"/>
-          </p:cNvSpPr>
-          <p:nvPr>
-            <p:ph idx="1"/>
-          </p:nvPr>
-        </p:nvSpPr>
-        <p:spPr/>
-        <p:txBody>
-          <a:bodyPr/>
-          <a:lstStyle/>
-          <a:p>
-            <a:endParaRPr lang="en-US"/>
-          </a:p>
-        </p:txBody>
-      </p:sp>
-      <p:sp>
-        <p:nvSpPr>
           <p:cNvPr id="15" name="Rectangle 14">
             <a:extLst>
               <a:ext uri="{FF2B5EF4-FFF2-40B4-BE49-F238E27FC236}">
@@ -19781,38 +19867,6 @@
           <a:chExt cx="0" cy="0"/>
         </a:xfrm>
       </p:grpSpPr>
-      <p:sp>
-        <p:nvSpPr>
-          <p:cNvPr id="2" name="Title 1">
-            <a:extLst>
-              <a:ext uri="{FF2B5EF4-FFF2-40B4-BE49-F238E27FC236}">
-                <a16:creationId xmlns:a16="http://schemas.microsoft.com/office/drawing/2014/main" id="{D490002F-4CE0-45C4-8D68-71037BD46965}"/>
-              </a:ext>
-            </a:extLst>
-          </p:cNvPr>
-          <p:cNvSpPr>
-            <a:spLocks noGrp="1"/>
-          </p:cNvSpPr>
-          <p:nvPr>
-            <p:ph type="title"/>
-          </p:nvPr>
-        </p:nvSpPr>
-        <p:spPr/>
-        <p:txBody>
-          <a:bodyPr/>
-          <a:lstStyle/>
-          <a:p>
-            <a:r>
-              <a:rPr lang="ru-RU" dirty="0"/>
-              <a:t>Процесс загрузки </a:t>
-            </a:r>
-            <a:r>
-              <a:rPr lang="en-US" dirty="0"/>
-              <a:t>DLL</a:t>
-            </a:r>
-          </a:p>
-        </p:txBody>
-      </p:sp>
       <p:sp>
         <p:nvSpPr>
           <p:cNvPr id="4" name="Rectangle 3">
@@ -20077,7 +20131,7 @@
         </p:nvSpPr>
         <p:spPr>
           <a:xfrm>
-            <a:off x="838200" y="343354"/>
+            <a:off x="538643" y="205225"/>
             <a:ext cx="10515600" cy="1325563"/>
           </a:xfrm>
           <a:prstGeom prst="rect">
@@ -20346,31 +20400,6 @@
           </a:fontRef>
         </p:style>
       </p:cxnSp>
-      <p:sp>
-        <p:nvSpPr>
-          <p:cNvPr id="7" name="Content Placeholder 6">
-            <a:extLst>
-              <a:ext uri="{FF2B5EF4-FFF2-40B4-BE49-F238E27FC236}">
-                <a16:creationId xmlns:a16="http://schemas.microsoft.com/office/drawing/2014/main" id="{AB27C4D9-3AA5-4F00-944D-3872EF8FE4DB}"/>
-              </a:ext>
-            </a:extLst>
-          </p:cNvPr>
-          <p:cNvSpPr>
-            <a:spLocks noGrp="1"/>
-          </p:cNvSpPr>
-          <p:nvPr>
-            <p:ph idx="1"/>
-          </p:nvPr>
-        </p:nvSpPr>
-        <p:spPr/>
-        <p:txBody>
-          <a:bodyPr/>
-          <a:lstStyle/>
-          <a:p>
-            <a:endParaRPr lang="en-US"/>
-          </a:p>
-        </p:txBody>
-      </p:sp>
       <p:sp>
         <p:nvSpPr>
           <p:cNvPr id="15" name="Rectangle 14">
@@ -24123,7 +24152,7 @@
             <a:pPr lvl="1"/>
             <a:r>
               <a:rPr lang="ru-RU" dirty="0"/>
-              <a:t>Загрузка адреса приходится осуществлять при каждом вызове</a:t>
+              <a:t>Загрузку адреса приходится осуществлять при каждом вызове</a:t>
             </a:r>
           </a:p>
           <a:p>
@@ -25693,7 +25722,7 @@
             <a:pPr lvl="2"/>
             <a:r>
               <a:rPr lang="en-US" dirty="0">
-                <a:hlinkClick r:id="rId2"/>
+                <a:hlinkClick r:id="rId3"/>
               </a:rPr>
               <a:t>https://fedoraproject.org/wiki/Changes/PythonNoSemanticInterpositionSpeedup</a:t>
             </a:r>
@@ -25716,7 +25745,7 @@
           <p:nvPr/>
         </p:nvPicPr>
         <p:blipFill>
-          <a:blip r:embed="rId3">
+          <a:blip r:embed="rId4">
             <a:extLst>
               <a:ext uri="{28A0092B-C50C-407E-A947-70E740481C1C}">
                 <a14:useLocalDpi xmlns:a14="http://schemas.microsoft.com/office/drawing/2010/main" val="0"/>
@@ -26626,7 +26655,7 @@
           <a:p>
             <a:r>
               <a:rPr lang="ru-RU" dirty="0"/>
-              <a:t>Экспортируемые символы</a:t>
+              <a:t>Экспортируемые функции</a:t>
             </a:r>
             <a:endParaRPr lang="en-US" dirty="0"/>
           </a:p>
@@ -28362,7 +28391,7 @@
             <a:pPr lvl="1"/>
             <a:r>
               <a:rPr lang="ru-RU" dirty="0"/>
-              <a:t>При статической сборке не все функции библиотек будут использованы приложениями</a:t>
+              <a:t>При использовании статическх библиотек не все их функции будут использованы приложениями</a:t>
             </a:r>
           </a:p>
           <a:p>

</xml_diff>